<commit_message>
lecture ready : 250422 Git
</commit_message>
<xml_diff>
--- a/material/02_Git 기초.pptx
+++ b/material/02_Git 기초.pptx
@@ -5,7 +5,7 @@
     <p:sldMasterId id="2147483660" r:id="rId1"/>
   </p:sldMasterIdLst>
   <p:notesMasterIdLst>
-    <p:notesMasterId r:id="rId70"/>
+    <p:notesMasterId r:id="rId71"/>
   </p:notesMasterIdLst>
   <p:sldIdLst>
     <p:sldId id="659" r:id="rId2"/>
@@ -70,12 +70,13 @@
     <p:sldId id="845" r:id="rId61"/>
     <p:sldId id="846" r:id="rId62"/>
     <p:sldId id="847" r:id="rId63"/>
-    <p:sldId id="848" r:id="rId64"/>
-    <p:sldId id="835" r:id="rId65"/>
-    <p:sldId id="836" r:id="rId66"/>
-    <p:sldId id="837" r:id="rId67"/>
-    <p:sldId id="838" r:id="rId68"/>
-    <p:sldId id="839" r:id="rId69"/>
+    <p:sldId id="850" r:id="rId64"/>
+    <p:sldId id="848" r:id="rId65"/>
+    <p:sldId id="835" r:id="rId66"/>
+    <p:sldId id="836" r:id="rId67"/>
+    <p:sldId id="837" r:id="rId68"/>
+    <p:sldId id="838" r:id="rId69"/>
+    <p:sldId id="839" r:id="rId70"/>
   </p:sldIdLst>
   <p:sldSz cx="12192000" cy="6858000"/>
   <p:notesSz cx="6858000" cy="9144000"/>
@@ -264,7 +265,7 @@
           <a:p>
             <a:fld id="{F3DEFEDB-2439-49E8-84B2-1D6C2F3A631A}" type="datetimeFigureOut">
               <a:rPr lang="ko-KR" altLang="en-US" smtClean="0"/>
-              <a:t>2025-04-20</a:t>
+              <a:t>2025-04-21</a:t>
             </a:fld>
             <a:endParaRPr lang="ko-KR" altLang="en-US"/>
           </a:p>
@@ -2090,11 +2091,7 @@
             </a:pPr>
             <a:r>
               <a:rPr lang="ko-KR" altLang="en-US" dirty="0" smtClean="0"/>
-              <a:t>리눅스 명령어 체</a:t>
-            </a:r>
-            <a:r>
-              <a:rPr lang="ko-KR" altLang="en-US" dirty="0" smtClean="0"/>
-              <a:t>계</a:t>
+              <a:t>리눅스 명령어 체계</a:t>
             </a:r>
             <a:endParaRPr lang="en-US" altLang="ko-KR" dirty="0" smtClean="0"/>
           </a:p>
@@ -7646,6 +7643,63 @@
           <a:bodyPr/>
           <a:lstStyle/>
           <a:p>
+            <a:r>
+              <a:rPr lang="en-US" altLang="ko-KR" dirty="0" smtClean="0"/>
+              <a:t>2</a:t>
+            </a:r>
+            <a:r>
+              <a:rPr lang="ko-KR" altLang="en-US" dirty="0" smtClean="0"/>
+              <a:t>차 보안</a:t>
+            </a:r>
+            <a:endParaRPr lang="en-US" altLang="ko-KR" dirty="0" smtClean="0"/>
+          </a:p>
+          <a:p>
+            <a:pPr marL="171450" indent="-171450">
+              <a:buFont typeface="Symbol" panose="05050102010706020507" pitchFamily="18" charset="2"/>
+              <a:buChar char="Þ"/>
+            </a:pPr>
+            <a:r>
+              <a:rPr lang="en-US" altLang="ko-KR" baseline="0" dirty="0" smtClean="0"/>
+              <a:t>2</a:t>
+            </a:r>
+            <a:r>
+              <a:rPr lang="ko-KR" altLang="en-US" baseline="0" dirty="0" smtClean="0"/>
+              <a:t>단계 인증 </a:t>
+            </a:r>
+            <a:r>
+              <a:rPr lang="en-US" altLang="ko-KR" baseline="0" dirty="0" smtClean="0"/>
+              <a:t>(2FA, Two-Factor Authentication)</a:t>
+            </a:r>
+          </a:p>
+          <a:p>
+            <a:pPr marL="0" indent="0">
+              <a:buFont typeface="Symbol" panose="05050102010706020507" pitchFamily="18" charset="2"/>
+              <a:buNone/>
+            </a:pPr>
+            <a:r>
+              <a:rPr lang="en-US" altLang="ko-KR" dirty="0" smtClean="0">
+                <a:sym typeface="Wingdings" panose="05000000000000000000" pitchFamily="2" charset="2"/>
+              </a:rPr>
+              <a:t> notion</a:t>
+            </a:r>
+            <a:r>
+              <a:rPr lang="en-US" altLang="ko-KR" baseline="0" dirty="0" smtClean="0">
+                <a:sym typeface="Wingdings" panose="05000000000000000000" pitchFamily="2" charset="2"/>
+              </a:rPr>
+              <a:t> </a:t>
+            </a:r>
+            <a:r>
+              <a:rPr lang="ko-KR" altLang="en-US" baseline="0" dirty="0" smtClean="0">
+                <a:sym typeface="Wingdings" panose="05000000000000000000" pitchFamily="2" charset="2"/>
+              </a:rPr>
+              <a:t>보기</a:t>
+            </a:r>
+            <a:r>
+              <a:rPr lang="en-US" altLang="ko-KR" baseline="0" dirty="0" smtClean="0">
+                <a:sym typeface="Wingdings" panose="05000000000000000000" pitchFamily="2" charset="2"/>
+              </a:rPr>
+              <a:t>.</a:t>
+            </a:r>
             <a:endParaRPr lang="ko-KR" altLang="en-US" dirty="0"/>
           </a:p>
         </p:txBody>
@@ -7789,6 +7843,45 @@
             </a:r>
           </a:p>
           <a:p>
+            <a:r>
+              <a:rPr lang="en-US" altLang="ko-KR" dirty="0" smtClean="0"/>
+              <a:t>- </a:t>
+            </a:r>
+            <a:r>
+              <a:rPr lang="ko-KR" altLang="en-US" dirty="0" smtClean="0"/>
+              <a:t>절대 다른 사람과 공유하면 안됨 </a:t>
+            </a:r>
+            <a:r>
+              <a:rPr lang="en-US" altLang="ko-KR" dirty="0" smtClean="0"/>
+              <a:t>/ </a:t>
+            </a:r>
+            <a:r>
+              <a:rPr lang="ko-KR" altLang="en-US" dirty="0" smtClean="0"/>
+              <a:t>이 </a:t>
+            </a:r>
+            <a:r>
+              <a:rPr lang="ko-KR" altLang="en-US" dirty="0" err="1" smtClean="0"/>
+              <a:t>토근이</a:t>
+            </a:r>
+            <a:r>
+              <a:rPr lang="ko-KR" altLang="en-US" dirty="0" smtClean="0"/>
+              <a:t> 있으면 당신의 </a:t>
+            </a:r>
+            <a:r>
+              <a:rPr lang="ko-KR" altLang="en-US" dirty="0" err="1" smtClean="0"/>
+              <a:t>깃허브에</a:t>
+            </a:r>
+            <a:r>
+              <a:rPr lang="ko-KR" altLang="en-US" dirty="0" smtClean="0"/>
+              <a:t> 접근할 수 있음</a:t>
+            </a:r>
+            <a:r>
+              <a:rPr lang="en-US" altLang="ko-KR" dirty="0" smtClean="0"/>
+              <a:t>.</a:t>
+            </a:r>
+            <a:endParaRPr lang="en-US" altLang="ko-KR" dirty="0" smtClean="0"/>
+          </a:p>
+          <a:p>
             <a:endParaRPr lang="en-US" altLang="ko-KR" dirty="0" smtClean="0"/>
           </a:p>
           <a:p>
@@ -8521,252 +8614,50 @@
           <a:lstStyle/>
           <a:p>
             <a:r>
-              <a:rPr lang="ko-KR" altLang="en-US" b="1" dirty="0" smtClean="0"/>
-              <a:t>✅ </a:t>
-            </a:r>
-            <a:r>
-              <a:rPr lang="en-US" altLang="ko-KR" b="1" dirty="0" smtClean="0"/>
-              <a:t>origin</a:t>
-            </a:r>
-            <a:r>
-              <a:rPr lang="ko-KR" altLang="en-US" b="1" dirty="0" smtClean="0"/>
-              <a:t>이란</a:t>
-            </a:r>
-            <a:r>
-              <a:rPr lang="en-US" altLang="ko-KR" b="1" dirty="0" smtClean="0"/>
-              <a:t>?</a:t>
-            </a:r>
-          </a:p>
-          <a:p>
-            <a:r>
-              <a:rPr lang="ko-KR" altLang="en-US" b="1" dirty="0" smtClean="0"/>
-              <a:t>원격 저장소</a:t>
-            </a:r>
-            <a:r>
-              <a:rPr lang="en-US" altLang="ko-KR" b="1" dirty="0" smtClean="0"/>
-              <a:t>(Remote Repository)</a:t>
-            </a:r>
-            <a:r>
-              <a:rPr lang="ko-KR" altLang="en-US" b="1" dirty="0" smtClean="0"/>
-              <a:t>의 </a:t>
-            </a:r>
-            <a:r>
-              <a:rPr lang="en-US" altLang="ko-KR" b="1" dirty="0" smtClean="0"/>
-              <a:t>"</a:t>
-            </a:r>
-            <a:r>
-              <a:rPr lang="ko-KR" altLang="en-US" b="1" dirty="0" smtClean="0"/>
-              <a:t>별명</a:t>
-            </a:r>
-            <a:r>
-              <a:rPr lang="en-US" altLang="ko-KR" b="1" dirty="0" smtClean="0"/>
-              <a:t>(</a:t>
-            </a:r>
-            <a:r>
-              <a:rPr lang="ko-KR" altLang="en-US" b="1" dirty="0" smtClean="0"/>
-              <a:t>이름</a:t>
-            </a:r>
-            <a:r>
-              <a:rPr lang="en-US" altLang="ko-KR" b="1" dirty="0" smtClean="0"/>
-              <a:t>)"</a:t>
-            </a:r>
-            <a:r>
-              <a:rPr lang="ko-KR" altLang="en-US" b="1" dirty="0" smtClean="0"/>
-              <a:t>입니다</a:t>
-            </a:r>
-            <a:r>
-              <a:rPr lang="en-US" altLang="ko-KR" b="1" dirty="0" smtClean="0"/>
-              <a:t>.</a:t>
-            </a:r>
-            <a:endParaRPr lang="ko-KR" altLang="en-US" dirty="0" smtClean="0"/>
-          </a:p>
-          <a:p>
-            <a:r>
-              <a:rPr lang="en-US" altLang="ko-KR" dirty="0" err="1" smtClean="0"/>
-              <a:t>Git</a:t>
-            </a:r>
-            <a:r>
-              <a:rPr lang="ko-KR" altLang="en-US" dirty="0" smtClean="0"/>
-              <a:t>에서 원격 저장소</a:t>
-            </a:r>
-            <a:r>
-              <a:rPr lang="en-US" altLang="ko-KR" dirty="0" smtClean="0"/>
-              <a:t>(</a:t>
-            </a:r>
-            <a:r>
-              <a:rPr lang="ko-KR" altLang="en-US" dirty="0" smtClean="0"/>
-              <a:t>예</a:t>
-            </a:r>
-            <a:r>
-              <a:rPr lang="en-US" altLang="ko-KR" dirty="0" smtClean="0"/>
-              <a:t>: GitHub</a:t>
-            </a:r>
-            <a:r>
-              <a:rPr lang="ko-KR" altLang="en-US" dirty="0" smtClean="0"/>
-              <a:t>에 있는 저장소</a:t>
-            </a:r>
-            <a:r>
-              <a:rPr lang="en-US" altLang="ko-KR" dirty="0" smtClean="0"/>
-              <a:t>)</a:t>
-            </a:r>
-            <a:r>
-              <a:rPr lang="ko-KR" altLang="en-US" dirty="0" smtClean="0"/>
-              <a:t>를 연결할 때</a:t>
-            </a:r>
-            <a:br>
-              <a:rPr lang="ko-KR" altLang="en-US" dirty="0" smtClean="0"/>
-            </a:br>
-            <a:r>
-              <a:rPr lang="ko-KR" altLang="en-US" dirty="0" smtClean="0"/>
-              <a:t>매번 긴 주소를 쓰기 불편하니까</a:t>
-            </a:r>
-            <a:r>
-              <a:rPr lang="en-US" altLang="ko-KR" dirty="0" smtClean="0"/>
-              <a:t>,</a:t>
-            </a:r>
-            <a:br>
-              <a:rPr lang="en-US" altLang="ko-KR" dirty="0" smtClean="0"/>
-            </a:br>
-            <a:r>
-              <a:rPr lang="ko-KR" altLang="en-US" b="1" dirty="0" smtClean="0"/>
-              <a:t>짧은 별명을 하나 붙여두는 것</a:t>
-            </a:r>
-            <a:r>
-              <a:rPr lang="ko-KR" altLang="en-US" dirty="0" smtClean="0"/>
-              <a:t>이에요</a:t>
-            </a:r>
-            <a:r>
-              <a:rPr lang="en-US" altLang="ko-KR" dirty="0" smtClean="0"/>
-              <a:t>.</a:t>
-            </a:r>
-          </a:p>
-          <a:p>
-            <a:endParaRPr lang="en-US" altLang="ko-KR" dirty="0" smtClean="0"/>
-          </a:p>
-          <a:p>
-            <a:r>
-              <a:rPr lang="ko-KR" altLang="en-US" b="1" dirty="0" smtClean="0"/>
-              <a:t>✅ 그러면 </a:t>
-            </a:r>
-            <a:r>
-              <a:rPr lang="en-US" altLang="ko-KR" b="1" dirty="0" smtClean="0"/>
-              <a:t>origin</a:t>
-            </a:r>
-            <a:r>
-              <a:rPr lang="ko-KR" altLang="en-US" b="1" dirty="0" smtClean="0"/>
-              <a:t>은 뭘 의미하나요</a:t>
-            </a:r>
-            <a:r>
-              <a:rPr lang="en-US" altLang="ko-KR" b="1" dirty="0" smtClean="0"/>
-              <a:t>?</a:t>
-            </a:r>
-          </a:p>
-          <a:p>
-            <a:r>
-              <a:rPr lang="en-US" altLang="ko-KR" dirty="0" smtClean="0"/>
-              <a:t>"</a:t>
-            </a:r>
-            <a:r>
-              <a:rPr lang="ko-KR" altLang="en-US" dirty="0" smtClean="0"/>
-              <a:t>이 </a:t>
-            </a:r>
-            <a:r>
-              <a:rPr lang="en-US" altLang="ko-KR" dirty="0" smtClean="0"/>
-              <a:t>GitHub </a:t>
-            </a:r>
-            <a:r>
-              <a:rPr lang="ko-KR" altLang="en-US" dirty="0" smtClean="0"/>
-              <a:t>주소를 </a:t>
-            </a:r>
-            <a:r>
-              <a:rPr lang="en-US" altLang="ko-KR" dirty="0" smtClean="0"/>
-              <a:t>origin</a:t>
-            </a:r>
-            <a:r>
-              <a:rPr lang="ko-KR" altLang="en-US" dirty="0" smtClean="0"/>
-              <a:t>이라고 부르자</a:t>
-            </a:r>
-            <a:r>
-              <a:rPr lang="en-US" altLang="ko-KR" dirty="0" smtClean="0"/>
-              <a:t>" </a:t>
-            </a:r>
-            <a:r>
-              <a:rPr lang="ko-KR" altLang="en-US" dirty="0" smtClean="0"/>
-              <a:t>라고 약속하는 거예요</a:t>
-            </a:r>
-            <a:r>
-              <a:rPr lang="en-US" altLang="ko-KR" dirty="0" smtClean="0"/>
-              <a:t>.</a:t>
-            </a:r>
-          </a:p>
-          <a:p>
-            <a:endParaRPr lang="en-US" altLang="ko-KR" dirty="0" smtClean="0"/>
-          </a:p>
-          <a:p>
-            <a:r>
-              <a:rPr lang="ko-KR" altLang="en-US" b="1" dirty="0" smtClean="0"/>
-              <a:t>✅ 꼭 이름이 </a:t>
-            </a:r>
-            <a:r>
-              <a:rPr lang="en-US" altLang="ko-KR" b="1" dirty="0" smtClean="0"/>
-              <a:t>origin</a:t>
-            </a:r>
-            <a:r>
-              <a:rPr lang="ko-KR" altLang="en-US" b="1" dirty="0" smtClean="0"/>
-              <a:t>이어야 하나요</a:t>
-            </a:r>
-            <a:r>
-              <a:rPr lang="en-US" altLang="ko-KR" b="1" dirty="0" smtClean="0"/>
-              <a:t>?</a:t>
-            </a:r>
-          </a:p>
-          <a:p>
-            <a:r>
-              <a:rPr lang="ko-KR" altLang="en-US" dirty="0" smtClean="0"/>
-              <a:t>❌ 아닙니다</a:t>
-            </a:r>
-            <a:r>
-              <a:rPr lang="en-US" altLang="ko-KR" dirty="0" smtClean="0"/>
-              <a:t>!</a:t>
-            </a:r>
-            <a:br>
-              <a:rPr lang="en-US" altLang="ko-KR" dirty="0" smtClean="0"/>
-            </a:br>
-            <a:r>
-              <a:rPr lang="ko-KR" altLang="en-US" dirty="0" smtClean="0"/>
-              <a:t>원한다면 다른 이름도 붙일 수 있습니다</a:t>
-            </a:r>
-            <a:r>
-              <a:rPr lang="en-US" altLang="ko-KR" dirty="0" smtClean="0"/>
-              <a:t>.</a:t>
-            </a:r>
-          </a:p>
-          <a:p>
-            <a:r>
-              <a:rPr lang="ko-KR" altLang="en-US" dirty="0" smtClean="0"/>
-              <a:t>예</a:t>
-            </a:r>
-            <a:r>
-              <a:rPr lang="en-US" altLang="ko-KR" dirty="0" smtClean="0"/>
-              <a:t>:</a:t>
-            </a:r>
-          </a:p>
-          <a:p>
-            <a:r>
               <a:rPr lang="en-US" altLang="ko-KR" dirty="0" err="1" smtClean="0"/>
               <a:t>git</a:t>
             </a:r>
             <a:r>
               <a:rPr lang="en-US" altLang="ko-KR" dirty="0" smtClean="0"/>
-              <a:t> remote add </a:t>
+              <a:t> clone https://github.com/</a:t>
+            </a:r>
+            <a:r>
+              <a:rPr lang="ko-KR" altLang="en-US" dirty="0" smtClean="0"/>
+              <a:t>사용자아이디</a:t>
+            </a:r>
+            <a:r>
+              <a:rPr lang="en-US" altLang="ko-KR" dirty="0" smtClean="0"/>
+              <a:t>/</a:t>
             </a:r>
             <a:r>
               <a:rPr lang="en-US" altLang="ko-KR" dirty="0" err="1" smtClean="0"/>
-              <a:t>github</a:t>
-            </a:r>
+              <a:t>MyTestRepo.git</a:t>
+            </a:r>
+            <a:endParaRPr lang="en-US" altLang="ko-KR" dirty="0" smtClean="0"/>
+          </a:p>
+          <a:p>
             <a:r>
               <a:rPr lang="en-US" altLang="ko-KR" dirty="0" smtClean="0"/>
-              <a:t> https://github.com/Damon0527/TestSF5th.git </a:t>
+              <a:t>cd </a:t>
+            </a:r>
+            <a:r>
+              <a:rPr lang="en-US" altLang="ko-KR" dirty="0" err="1" smtClean="0"/>
+              <a:t>MyTestRepo</a:t>
+            </a:r>
+            <a:endParaRPr lang="en-US" altLang="ko-KR" dirty="0" smtClean="0"/>
+          </a:p>
+          <a:p>
+            <a:r>
+              <a:rPr lang="en-US" altLang="ko-KR" dirty="0" smtClean="0"/>
+              <a:t>echo "</a:t>
+            </a:r>
+            <a:r>
+              <a:rPr lang="ko-KR" altLang="en-US" dirty="0" smtClean="0"/>
+              <a:t>이건 새로 만든 파일입니다</a:t>
+            </a:r>
+            <a:r>
+              <a:rPr lang="en-US" altLang="ko-KR" dirty="0" smtClean="0"/>
+              <a:t>" &gt; new_file.txt</a:t>
             </a:r>
           </a:p>
           <a:p>
@@ -8776,268 +8667,31 @@
             </a:r>
             <a:r>
               <a:rPr lang="en-US" altLang="ko-KR" dirty="0" smtClean="0"/>
-              <a:t> push </a:t>
-            </a:r>
-            <a:r>
-              <a:rPr lang="en-US" altLang="ko-KR" dirty="0" err="1" smtClean="0"/>
-              <a:t>github</a:t>
-            </a:r>
-            <a:r>
-              <a:rPr lang="en-US" altLang="ko-KR" dirty="0" smtClean="0"/>
-              <a:t> main </a:t>
-            </a:r>
-          </a:p>
-          <a:p>
-            <a:r>
-              <a:rPr lang="ko-KR" altLang="en-US" dirty="0" smtClean="0"/>
-              <a:t>하지만 실무에서는 거의 다 </a:t>
-            </a:r>
-            <a:r>
-              <a:rPr lang="en-US" altLang="ko-KR" dirty="0" smtClean="0"/>
-              <a:t>origin</a:t>
-            </a:r>
-            <a:r>
-              <a:rPr lang="ko-KR" altLang="en-US" dirty="0" smtClean="0"/>
-              <a:t>을 쓰는 것이 </a:t>
-            </a:r>
-            <a:r>
-              <a:rPr lang="ko-KR" altLang="en-US" b="1" dirty="0" err="1" smtClean="0"/>
-              <a:t>관례이자</a:t>
-            </a:r>
-            <a:r>
-              <a:rPr lang="ko-KR" altLang="en-US" b="1" dirty="0" smtClean="0"/>
-              <a:t> 표준처럼 자리잡고</a:t>
-            </a:r>
-            <a:r>
-              <a:rPr lang="ko-KR" altLang="en-US" dirty="0" smtClean="0"/>
-              <a:t> 있어서</a:t>
-            </a:r>
-            <a:br>
-              <a:rPr lang="ko-KR" altLang="en-US" dirty="0" smtClean="0"/>
-            </a:br>
-            <a:r>
-              <a:rPr lang="ko-KR" altLang="en-US" dirty="0" smtClean="0"/>
-              <a:t>학생들에게도 기본은 </a:t>
-            </a:r>
-            <a:r>
-              <a:rPr lang="en-US" altLang="ko-KR" dirty="0" smtClean="0"/>
-              <a:t>origin</a:t>
-            </a:r>
-            <a:r>
-              <a:rPr lang="ko-KR" altLang="en-US" dirty="0" smtClean="0"/>
-              <a:t>으로 알려주는 것이 좋습니다</a:t>
-            </a:r>
-            <a:r>
-              <a:rPr lang="en-US" altLang="ko-KR" dirty="0" smtClean="0"/>
-              <a:t>.</a:t>
-            </a:r>
-          </a:p>
-          <a:p>
-            <a:endParaRPr lang="en-US" altLang="ko-KR" dirty="0" smtClean="0"/>
-          </a:p>
-          <a:p>
-            <a:r>
-              <a:rPr lang="ko-KR" altLang="en-US" b="1" dirty="0" smtClean="0"/>
-              <a:t>✅ 확인하고 싶다면</a:t>
-            </a:r>
-            <a:r>
-              <a:rPr lang="en-US" altLang="ko-KR" b="1" dirty="0" smtClean="0"/>
-              <a:t>? </a:t>
-            </a:r>
+              <a:t> add new_file.txt</a:t>
+            </a:r>
+          </a:p>
+          <a:p>
             <a:r>
               <a:rPr lang="en-US" altLang="ko-KR" dirty="0" err="1" smtClean="0"/>
               <a:t>git</a:t>
             </a:r>
             <a:r>
               <a:rPr lang="en-US" altLang="ko-KR" dirty="0" smtClean="0"/>
-              <a:t> remote -v </a:t>
-            </a:r>
-          </a:p>
-          <a:p>
-            <a:r>
-              <a:rPr lang="en-US" altLang="ko-KR" dirty="0" smtClean="0"/>
-              <a:t>→ </a:t>
-            </a:r>
-            <a:r>
-              <a:rPr lang="ko-KR" altLang="en-US" dirty="0" smtClean="0"/>
-              <a:t>연결된 원격 저장소 목록과 별명</a:t>
-            </a:r>
-            <a:r>
-              <a:rPr lang="en-US" altLang="ko-KR" dirty="0" smtClean="0"/>
-              <a:t>(origin </a:t>
-            </a:r>
-            <a:r>
-              <a:rPr lang="ko-KR" altLang="en-US" dirty="0" smtClean="0"/>
-              <a:t>등</a:t>
-            </a:r>
-            <a:r>
-              <a:rPr lang="en-US" altLang="ko-KR" dirty="0" smtClean="0"/>
-              <a:t>)</a:t>
-            </a:r>
-            <a:r>
-              <a:rPr lang="ko-KR" altLang="en-US" dirty="0" smtClean="0"/>
-              <a:t>을 확인할 수 있어요</a:t>
-            </a:r>
-            <a:r>
-              <a:rPr lang="en-US" altLang="ko-KR" dirty="0" smtClean="0"/>
-              <a:t>.</a:t>
-            </a:r>
-          </a:p>
-          <a:p>
-            <a:endParaRPr lang="en-US" altLang="ko-KR" dirty="0" smtClean="0"/>
-          </a:p>
-          <a:p>
-            <a:r>
-              <a:rPr lang="en-US" altLang="ko-KR" dirty="0" smtClean="0"/>
-              <a:t>fetch   </a:t>
-            </a:r>
-            <a:r>
-              <a:rPr lang="en-US" altLang="ko-KR" b="1" dirty="0" smtClean="0"/>
-              <a:t>GitHub</a:t>
-            </a:r>
-            <a:r>
-              <a:rPr lang="ko-KR" altLang="en-US" b="1" dirty="0" smtClean="0"/>
-              <a:t>에서 내 로컬로 가져오는 용도</a:t>
-            </a:r>
-            <a:r>
-              <a:rPr lang="ko-KR" altLang="en-US" dirty="0" smtClean="0"/>
-              <a:t> </a:t>
-            </a:r>
-            <a:r>
-              <a:rPr lang="en-US" altLang="ko-KR" dirty="0" smtClean="0"/>
-              <a:t>(</a:t>
-            </a:r>
-            <a:r>
-              <a:rPr lang="ko-KR" altLang="en-US" dirty="0" smtClean="0"/>
-              <a:t>예</a:t>
-            </a:r>
-            <a:r>
-              <a:rPr lang="en-US" altLang="ko-KR" dirty="0" smtClean="0"/>
-              <a:t>: </a:t>
-            </a:r>
+              <a:t> commit -m "Add new_file.txt"</a:t>
+            </a:r>
+          </a:p>
+          <a:p>
             <a:r>
               <a:rPr lang="en-US" altLang="ko-KR" dirty="0" err="1" smtClean="0"/>
               <a:t>git</a:t>
             </a:r>
             <a:r>
               <a:rPr lang="en-US" altLang="ko-KR" dirty="0" smtClean="0"/>
-              <a:t> pull)</a:t>
-            </a:r>
-          </a:p>
-          <a:p>
-            <a:r>
-              <a:rPr lang="en-US" altLang="ko-KR" dirty="0" smtClean="0"/>
-              <a:t>push   </a:t>
-            </a:r>
-            <a:r>
-              <a:rPr lang="ko-KR" altLang="en-US" b="1" dirty="0" smtClean="0"/>
-              <a:t>내 로컬에서 </a:t>
-            </a:r>
-            <a:r>
-              <a:rPr lang="en-US" altLang="ko-KR" b="1" dirty="0" smtClean="0"/>
-              <a:t>GitHub</a:t>
-            </a:r>
-            <a:r>
-              <a:rPr lang="ko-KR" altLang="en-US" b="1" dirty="0" smtClean="0"/>
-              <a:t>로 올리는 용도</a:t>
-            </a:r>
-            <a:r>
-              <a:rPr lang="ko-KR" altLang="en-US" dirty="0" smtClean="0"/>
-              <a:t> </a:t>
-            </a:r>
-            <a:r>
-              <a:rPr lang="en-US" altLang="ko-KR" dirty="0" smtClean="0"/>
-              <a:t>(</a:t>
-            </a:r>
-            <a:r>
-              <a:rPr lang="ko-KR" altLang="en-US" dirty="0" smtClean="0"/>
-              <a:t>예</a:t>
-            </a:r>
-            <a:r>
-              <a:rPr lang="en-US" altLang="ko-KR" dirty="0" smtClean="0"/>
-              <a:t>: </a:t>
-            </a:r>
-            <a:r>
-              <a:rPr lang="en-US" altLang="ko-KR" dirty="0" err="1" smtClean="0"/>
-              <a:t>git</a:t>
-            </a:r>
-            <a:r>
-              <a:rPr lang="en-US" altLang="ko-KR" dirty="0" smtClean="0"/>
-              <a:t> push)</a:t>
-            </a:r>
-          </a:p>
-          <a:p>
-            <a:r>
-              <a:rPr lang="ko-KR" altLang="en-US" dirty="0" smtClean="0"/>
-              <a:t>보통은 두 주소가 </a:t>
-            </a:r>
-            <a:r>
-              <a:rPr lang="ko-KR" altLang="en-US" b="1" dirty="0" smtClean="0"/>
-              <a:t>같지만</a:t>
-            </a:r>
-            <a:r>
-              <a:rPr lang="en-US" altLang="ko-KR" dirty="0" smtClean="0"/>
-              <a:t>,</a:t>
-            </a:r>
-            <a:br>
-              <a:rPr lang="en-US" altLang="ko-KR" dirty="0" smtClean="0"/>
-            </a:br>
-            <a:r>
-              <a:rPr lang="en-US" altLang="ko-KR" dirty="0" err="1" smtClean="0"/>
-              <a:t>Git</a:t>
-            </a:r>
-            <a:r>
-              <a:rPr lang="ko-KR" altLang="en-US" dirty="0" smtClean="0"/>
-              <a:t>은 </a:t>
-            </a:r>
-            <a:r>
-              <a:rPr lang="en-US" altLang="ko-KR" b="1" dirty="0" smtClean="0"/>
-              <a:t>fetch</a:t>
-            </a:r>
-            <a:r>
-              <a:rPr lang="ko-KR" altLang="en-US" b="1" dirty="0" smtClean="0"/>
-              <a:t>용 </a:t>
-            </a:r>
-            <a:r>
-              <a:rPr lang="en-US" altLang="ko-KR" b="1" dirty="0" smtClean="0"/>
-              <a:t>URL</a:t>
-            </a:r>
-            <a:r>
-              <a:rPr lang="ko-KR" altLang="en-US" dirty="0" smtClean="0"/>
-              <a:t>과 </a:t>
-            </a:r>
-            <a:r>
-              <a:rPr lang="en-US" altLang="ko-KR" b="1" dirty="0" smtClean="0"/>
-              <a:t>push</a:t>
-            </a:r>
-            <a:r>
-              <a:rPr lang="ko-KR" altLang="en-US" b="1" dirty="0" smtClean="0"/>
-              <a:t>용 </a:t>
-            </a:r>
-            <a:r>
-              <a:rPr lang="en-US" altLang="ko-KR" b="1" dirty="0" smtClean="0"/>
-              <a:t>URL</a:t>
-            </a:r>
-            <a:r>
-              <a:rPr lang="ko-KR" altLang="en-US" dirty="0" smtClean="0"/>
-              <a:t>을 </a:t>
-            </a:r>
-            <a:r>
-              <a:rPr lang="ko-KR" altLang="en-US" b="1" dirty="0" smtClean="0"/>
-              <a:t>따로 설정할 수 있는 기능</a:t>
-            </a:r>
-            <a:r>
-              <a:rPr lang="ko-KR" altLang="en-US" dirty="0" smtClean="0"/>
-              <a:t>을 지원합니다</a:t>
-            </a:r>
-            <a:r>
-              <a:rPr lang="en-US" altLang="ko-KR" dirty="0" smtClean="0"/>
-              <a:t>.</a:t>
-            </a:r>
-            <a:endParaRPr lang="ko-KR" altLang="en-US" dirty="0" smtClean="0"/>
-          </a:p>
-          <a:p>
-            <a:endParaRPr lang="ko-KR" altLang="en-US" dirty="0"/>
+              <a:t> push origin main</a:t>
+            </a:r>
+          </a:p>
+          <a:p>
+            <a:endParaRPr lang="en-US" altLang="ko-KR" dirty="0"/>
           </a:p>
         </p:txBody>
       </p:sp>
@@ -9058,7 +8712,7 @@
           <a:p>
             <a:fld id="{80927ADC-3725-4C53-90DA-A7CB1E9F9FDE}" type="slidenum">
               <a:rPr lang="ko-KR" altLang="en-US" smtClean="0"/>
-              <a:t>61</a:t>
+              <a:t>59</a:t>
             </a:fld>
             <a:endParaRPr lang="ko-KR" altLang="en-US"/>
           </a:p>
@@ -9067,7 +8721,7 @@
     </p:spTree>
     <p:extLst>
       <p:ext uri="{BB962C8B-B14F-4D97-AF65-F5344CB8AC3E}">
-        <p14:creationId xmlns:p14="http://schemas.microsoft.com/office/powerpoint/2010/main" val="1149557836"/>
+        <p14:creationId xmlns:p14="http://schemas.microsoft.com/office/powerpoint/2010/main" val="840810868"/>
       </p:ext>
     </p:extLst>
   </p:cSld>
@@ -9123,27 +8777,489 @@
           <a:p>
             <a:r>
               <a:rPr lang="ko-KR" altLang="en-US" b="1" dirty="0" smtClean="0"/>
-              <a:t>로컬과 원격 저장소가 서로 다른 </a:t>
+              <a:t>✅ </a:t>
+            </a:r>
+            <a:r>
+              <a:rPr lang="en-US" altLang="ko-KR" b="1" dirty="0" smtClean="0"/>
+              <a:t>origin</a:t>
+            </a:r>
+            <a:r>
+              <a:rPr lang="ko-KR" altLang="en-US" b="1" dirty="0" smtClean="0"/>
+              <a:t>이란</a:t>
+            </a:r>
+            <a:r>
+              <a:rPr lang="en-US" altLang="ko-KR" b="1" dirty="0" smtClean="0"/>
+              <a:t>?</a:t>
+            </a:r>
+          </a:p>
+          <a:p>
+            <a:r>
+              <a:rPr lang="ko-KR" altLang="en-US" b="1" dirty="0" smtClean="0"/>
+              <a:t>원격 저장소</a:t>
+            </a:r>
+            <a:r>
+              <a:rPr lang="en-US" altLang="ko-KR" b="1" dirty="0" smtClean="0"/>
+              <a:t>(Remote Repository)</a:t>
+            </a:r>
+            <a:r>
+              <a:rPr lang="ko-KR" altLang="en-US" b="1" dirty="0" smtClean="0"/>
+              <a:t>의 </a:t>
             </a:r>
             <a:r>
               <a:rPr lang="en-US" altLang="ko-KR" b="1" dirty="0" smtClean="0"/>
               <a:t>"</a:t>
             </a:r>
             <a:r>
+              <a:rPr lang="ko-KR" altLang="en-US" b="1" dirty="0" smtClean="0"/>
+              <a:t>별명</a:t>
+            </a:r>
+            <a:r>
+              <a:rPr lang="en-US" altLang="ko-KR" b="1" dirty="0" smtClean="0"/>
+              <a:t>(</a:t>
+            </a:r>
+            <a:r>
+              <a:rPr lang="ko-KR" altLang="en-US" b="1" dirty="0" smtClean="0"/>
+              <a:t>이름</a:t>
+            </a:r>
+            <a:r>
+              <a:rPr lang="en-US" altLang="ko-KR" b="1" dirty="0" smtClean="0"/>
+              <a:t>)"</a:t>
+            </a:r>
+            <a:r>
+              <a:rPr lang="ko-KR" altLang="en-US" b="1" dirty="0" smtClean="0"/>
+              <a:t>입니다</a:t>
+            </a:r>
+            <a:r>
+              <a:rPr lang="en-US" altLang="ko-KR" b="1" dirty="0" smtClean="0"/>
+              <a:t>.</a:t>
+            </a:r>
+            <a:endParaRPr lang="ko-KR" altLang="en-US" dirty="0" smtClean="0"/>
+          </a:p>
+          <a:p>
+            <a:r>
+              <a:rPr lang="en-US" altLang="ko-KR" dirty="0" err="1" smtClean="0"/>
+              <a:t>Git</a:t>
+            </a:r>
+            <a:r>
+              <a:rPr lang="ko-KR" altLang="en-US" dirty="0" smtClean="0"/>
+              <a:t>에서 원격 저장소</a:t>
+            </a:r>
+            <a:r>
+              <a:rPr lang="en-US" altLang="ko-KR" dirty="0" smtClean="0"/>
+              <a:t>(</a:t>
+            </a:r>
+            <a:r>
+              <a:rPr lang="ko-KR" altLang="en-US" dirty="0" smtClean="0"/>
+              <a:t>예</a:t>
+            </a:r>
+            <a:r>
+              <a:rPr lang="en-US" altLang="ko-KR" dirty="0" smtClean="0"/>
+              <a:t>: GitHub</a:t>
+            </a:r>
+            <a:r>
+              <a:rPr lang="ko-KR" altLang="en-US" dirty="0" smtClean="0"/>
+              <a:t>에 있는 저장소</a:t>
+            </a:r>
+            <a:r>
+              <a:rPr lang="en-US" altLang="ko-KR" dirty="0" smtClean="0"/>
+              <a:t>)</a:t>
+            </a:r>
+            <a:r>
+              <a:rPr lang="ko-KR" altLang="en-US" dirty="0" smtClean="0"/>
+              <a:t>를 연결할 때</a:t>
+            </a:r>
+            <a:br>
+              <a:rPr lang="ko-KR" altLang="en-US" dirty="0" smtClean="0"/>
+            </a:br>
+            <a:r>
+              <a:rPr lang="ko-KR" altLang="en-US" dirty="0" smtClean="0"/>
+              <a:t>매번 긴 주소를 쓰기 불편하니까</a:t>
+            </a:r>
+            <a:r>
+              <a:rPr lang="en-US" altLang="ko-KR" dirty="0" smtClean="0"/>
+              <a:t>,</a:t>
+            </a:r>
+            <a:br>
+              <a:rPr lang="en-US" altLang="ko-KR" dirty="0" smtClean="0"/>
+            </a:br>
+            <a:r>
+              <a:rPr lang="ko-KR" altLang="en-US" b="1" dirty="0" smtClean="0"/>
+              <a:t>짧은 별명을 하나 붙여두는 것</a:t>
+            </a:r>
+            <a:r>
+              <a:rPr lang="ko-KR" altLang="en-US" dirty="0" smtClean="0"/>
+              <a:t>이에요</a:t>
+            </a:r>
+            <a:r>
+              <a:rPr lang="en-US" altLang="ko-KR" dirty="0" smtClean="0"/>
+              <a:t>.</a:t>
+            </a:r>
+          </a:p>
+          <a:p>
+            <a:endParaRPr lang="en-US" altLang="ko-KR" dirty="0" smtClean="0"/>
+          </a:p>
+          <a:p>
+            <a:r>
+              <a:rPr lang="ko-KR" altLang="en-US" b="1" dirty="0" smtClean="0"/>
+              <a:t>✅ 그러면 </a:t>
+            </a:r>
+            <a:r>
+              <a:rPr lang="en-US" altLang="ko-KR" b="1" dirty="0" smtClean="0"/>
+              <a:t>origin</a:t>
+            </a:r>
+            <a:r>
+              <a:rPr lang="ko-KR" altLang="en-US" b="1" dirty="0" smtClean="0"/>
+              <a:t>은 뭘 의미하나요</a:t>
+            </a:r>
+            <a:r>
+              <a:rPr lang="en-US" altLang="ko-KR" b="1" dirty="0" smtClean="0"/>
+              <a:t>?</a:t>
+            </a:r>
+          </a:p>
+          <a:p>
+            <a:r>
+              <a:rPr lang="en-US" altLang="ko-KR" dirty="0" smtClean="0"/>
+              <a:t>"</a:t>
+            </a:r>
+            <a:r>
+              <a:rPr lang="ko-KR" altLang="en-US" dirty="0" smtClean="0"/>
+              <a:t>이 </a:t>
+            </a:r>
+            <a:r>
+              <a:rPr lang="en-US" altLang="ko-KR" dirty="0" smtClean="0"/>
+              <a:t>GitHub </a:t>
+            </a:r>
+            <a:r>
+              <a:rPr lang="ko-KR" altLang="en-US" dirty="0" smtClean="0"/>
+              <a:t>주소를 </a:t>
+            </a:r>
+            <a:r>
+              <a:rPr lang="en-US" altLang="ko-KR" dirty="0" smtClean="0"/>
+              <a:t>origin</a:t>
+            </a:r>
+            <a:r>
+              <a:rPr lang="ko-KR" altLang="en-US" dirty="0" smtClean="0"/>
+              <a:t>이라고 부르자</a:t>
+            </a:r>
+            <a:r>
+              <a:rPr lang="en-US" altLang="ko-KR" dirty="0" smtClean="0"/>
+              <a:t>" </a:t>
+            </a:r>
+            <a:r>
+              <a:rPr lang="ko-KR" altLang="en-US" dirty="0" smtClean="0"/>
+              <a:t>라고 약속하는 거예요</a:t>
+            </a:r>
+            <a:r>
+              <a:rPr lang="en-US" altLang="ko-KR" dirty="0" smtClean="0"/>
+              <a:t>.</a:t>
+            </a:r>
+          </a:p>
+          <a:p>
+            <a:endParaRPr lang="en-US" altLang="ko-KR" dirty="0" smtClean="0"/>
+          </a:p>
+          <a:p>
+            <a:r>
+              <a:rPr lang="ko-KR" altLang="en-US" b="1" dirty="0" smtClean="0"/>
+              <a:t>✅ 꼭 이름이 </a:t>
+            </a:r>
+            <a:r>
+              <a:rPr lang="en-US" altLang="ko-KR" b="1" dirty="0" smtClean="0"/>
+              <a:t>origin</a:t>
+            </a:r>
+            <a:r>
+              <a:rPr lang="ko-KR" altLang="en-US" b="1" dirty="0" smtClean="0"/>
+              <a:t>이어야 하나요</a:t>
+            </a:r>
+            <a:r>
+              <a:rPr lang="en-US" altLang="ko-KR" b="1" dirty="0" smtClean="0"/>
+              <a:t>?</a:t>
+            </a:r>
+          </a:p>
+          <a:p>
+            <a:r>
+              <a:rPr lang="ko-KR" altLang="en-US" dirty="0" smtClean="0"/>
+              <a:t>❌ 아닙니다</a:t>
+            </a:r>
+            <a:r>
+              <a:rPr lang="en-US" altLang="ko-KR" dirty="0" smtClean="0"/>
+              <a:t>!</a:t>
+            </a:r>
+            <a:br>
+              <a:rPr lang="en-US" altLang="ko-KR" dirty="0" smtClean="0"/>
+            </a:br>
+            <a:r>
+              <a:rPr lang="ko-KR" altLang="en-US" dirty="0" smtClean="0"/>
+              <a:t>원한다면 다른 이름도 붙일 수 있습니다</a:t>
+            </a:r>
+            <a:r>
+              <a:rPr lang="en-US" altLang="ko-KR" dirty="0" smtClean="0"/>
+              <a:t>.</a:t>
+            </a:r>
+          </a:p>
+          <a:p>
+            <a:r>
+              <a:rPr lang="ko-KR" altLang="en-US" dirty="0" smtClean="0"/>
+              <a:t>예</a:t>
+            </a:r>
+            <a:r>
+              <a:rPr lang="en-US" altLang="ko-KR" dirty="0" smtClean="0"/>
+              <a:t>:</a:t>
+            </a:r>
+          </a:p>
+          <a:p>
+            <a:r>
+              <a:rPr lang="en-US" altLang="ko-KR" dirty="0" err="1" smtClean="0"/>
+              <a:t>git</a:t>
+            </a:r>
+            <a:r>
+              <a:rPr lang="en-US" altLang="ko-KR" dirty="0" smtClean="0"/>
+              <a:t> remote add </a:t>
+            </a:r>
+            <a:r>
+              <a:rPr lang="en-US" altLang="ko-KR" dirty="0" err="1" smtClean="0"/>
+              <a:t>github</a:t>
+            </a:r>
+            <a:r>
+              <a:rPr lang="en-US" altLang="ko-KR" dirty="0" smtClean="0"/>
+              <a:t> https://github.com/Damon0527/TestSF5th.git </a:t>
+            </a:r>
+          </a:p>
+          <a:p>
+            <a:r>
+              <a:rPr lang="en-US" altLang="ko-KR" dirty="0" err="1" smtClean="0"/>
+              <a:t>git</a:t>
+            </a:r>
+            <a:r>
+              <a:rPr lang="en-US" altLang="ko-KR" dirty="0" smtClean="0"/>
+              <a:t> push </a:t>
+            </a:r>
+            <a:r>
+              <a:rPr lang="en-US" altLang="ko-KR" dirty="0" err="1" smtClean="0"/>
+              <a:t>github</a:t>
+            </a:r>
+            <a:r>
+              <a:rPr lang="en-US" altLang="ko-KR" dirty="0" smtClean="0"/>
+              <a:t> main </a:t>
+            </a:r>
+          </a:p>
+          <a:p>
+            <a:r>
+              <a:rPr lang="ko-KR" altLang="en-US" dirty="0" smtClean="0"/>
+              <a:t>하지만 실무에서는 거의 다 </a:t>
+            </a:r>
+            <a:r>
+              <a:rPr lang="en-US" altLang="ko-KR" dirty="0" smtClean="0"/>
+              <a:t>origin</a:t>
+            </a:r>
+            <a:r>
+              <a:rPr lang="ko-KR" altLang="en-US" dirty="0" smtClean="0"/>
+              <a:t>을 쓰는 것이 </a:t>
+            </a:r>
+            <a:r>
               <a:rPr lang="ko-KR" altLang="en-US" b="1" dirty="0" err="1" smtClean="0"/>
-              <a:t>커밋</a:t>
+              <a:t>관례이자</a:t>
             </a:r>
             <a:r>
               <a:rPr lang="ko-KR" altLang="en-US" b="1" dirty="0" smtClean="0"/>
-              <a:t> 이력</a:t>
+              <a:t> 표준처럼 자리잡고</a:t>
+            </a:r>
+            <a:r>
+              <a:rPr lang="ko-KR" altLang="en-US" dirty="0" smtClean="0"/>
+              <a:t> 있어서</a:t>
+            </a:r>
+            <a:br>
+              <a:rPr lang="ko-KR" altLang="en-US" dirty="0" smtClean="0"/>
+            </a:br>
+            <a:r>
+              <a:rPr lang="ko-KR" altLang="en-US" dirty="0" smtClean="0"/>
+              <a:t>학생들에게도 기본은 </a:t>
+            </a:r>
+            <a:r>
+              <a:rPr lang="en-US" altLang="ko-KR" dirty="0" smtClean="0"/>
+              <a:t>origin</a:t>
+            </a:r>
+            <a:r>
+              <a:rPr lang="ko-KR" altLang="en-US" dirty="0" smtClean="0"/>
+              <a:t>으로 알려주는 것이 좋습니다</a:t>
+            </a:r>
+            <a:r>
+              <a:rPr lang="en-US" altLang="ko-KR" dirty="0" smtClean="0"/>
+              <a:t>.</a:t>
+            </a:r>
+          </a:p>
+          <a:p>
+            <a:endParaRPr lang="en-US" altLang="ko-KR" dirty="0" smtClean="0"/>
+          </a:p>
+          <a:p>
+            <a:r>
+              <a:rPr lang="ko-KR" altLang="en-US" b="1" dirty="0" smtClean="0"/>
+              <a:t>✅ 확인하고 싶다면</a:t>
             </a:r>
             <a:r>
               <a:rPr lang="en-US" altLang="ko-KR" b="1" dirty="0" smtClean="0"/>
-              <a:t>"</a:t>
+              <a:t>? </a:t>
+            </a:r>
+            <a:r>
+              <a:rPr lang="en-US" altLang="ko-KR" dirty="0" err="1" smtClean="0"/>
+              <a:t>git</a:t>
+            </a:r>
+            <a:r>
+              <a:rPr lang="en-US" altLang="ko-KR" dirty="0" smtClean="0"/>
+              <a:t> remote -v </a:t>
+            </a:r>
+          </a:p>
+          <a:p>
+            <a:r>
+              <a:rPr lang="en-US" altLang="ko-KR" dirty="0" smtClean="0"/>
+              <a:t>→ </a:t>
+            </a:r>
+            <a:r>
+              <a:rPr lang="ko-KR" altLang="en-US" dirty="0" smtClean="0"/>
+              <a:t>연결된 원격 저장소 목록과 별명</a:t>
+            </a:r>
+            <a:r>
+              <a:rPr lang="en-US" altLang="ko-KR" dirty="0" smtClean="0"/>
+              <a:t>(origin </a:t>
+            </a:r>
+            <a:r>
+              <a:rPr lang="ko-KR" altLang="en-US" dirty="0" smtClean="0"/>
+              <a:t>등</a:t>
+            </a:r>
+            <a:r>
+              <a:rPr lang="en-US" altLang="ko-KR" dirty="0" smtClean="0"/>
+              <a:t>)</a:t>
+            </a:r>
+            <a:r>
+              <a:rPr lang="ko-KR" altLang="en-US" dirty="0" smtClean="0"/>
+              <a:t>을 확인할 수 있어요</a:t>
+            </a:r>
+            <a:r>
+              <a:rPr lang="en-US" altLang="ko-KR" dirty="0" smtClean="0"/>
+              <a:t>.</a:t>
+            </a:r>
+          </a:p>
+          <a:p>
+            <a:endParaRPr lang="en-US" altLang="ko-KR" dirty="0" smtClean="0"/>
+          </a:p>
+          <a:p>
+            <a:r>
+              <a:rPr lang="en-US" altLang="ko-KR" dirty="0" smtClean="0"/>
+              <a:t>fetch   </a:t>
+            </a:r>
+            <a:r>
+              <a:rPr lang="en-US" altLang="ko-KR" b="1" dirty="0" smtClean="0"/>
+              <a:t>GitHub</a:t>
             </a:r>
             <a:r>
               <a:rPr lang="ko-KR" altLang="en-US" b="1" dirty="0" smtClean="0"/>
-              <a:t>을 가지고 있으면 </a:t>
+              <a:t>에서 내 로컬로 가져오는 용도</a:t>
+            </a:r>
+            <a:r>
+              <a:rPr lang="ko-KR" altLang="en-US" dirty="0" smtClean="0"/>
+              <a:t> </a:t>
+            </a:r>
+            <a:r>
+              <a:rPr lang="en-US" altLang="ko-KR" dirty="0" smtClean="0"/>
+              <a:t>(</a:t>
+            </a:r>
+            <a:r>
+              <a:rPr lang="ko-KR" altLang="en-US" dirty="0" smtClean="0"/>
+              <a:t>예</a:t>
+            </a:r>
+            <a:r>
+              <a:rPr lang="en-US" altLang="ko-KR" dirty="0" smtClean="0"/>
+              <a:t>: </a:t>
+            </a:r>
+            <a:r>
+              <a:rPr lang="en-US" altLang="ko-KR" dirty="0" err="1" smtClean="0"/>
+              <a:t>git</a:t>
+            </a:r>
+            <a:r>
+              <a:rPr lang="en-US" altLang="ko-KR" dirty="0" smtClean="0"/>
+              <a:t> pull)</a:t>
+            </a:r>
+          </a:p>
+          <a:p>
+            <a:r>
+              <a:rPr lang="en-US" altLang="ko-KR" dirty="0" smtClean="0"/>
+              <a:t>push   </a:t>
+            </a:r>
+            <a:r>
+              <a:rPr lang="ko-KR" altLang="en-US" b="1" dirty="0" smtClean="0"/>
+              <a:t>내 로컬에서 </a:t>
+            </a:r>
+            <a:r>
+              <a:rPr lang="en-US" altLang="ko-KR" b="1" dirty="0" smtClean="0"/>
+              <a:t>GitHub</a:t>
+            </a:r>
+            <a:r>
+              <a:rPr lang="ko-KR" altLang="en-US" b="1" dirty="0" smtClean="0"/>
+              <a:t>로 올리는 용도</a:t>
+            </a:r>
+            <a:r>
+              <a:rPr lang="ko-KR" altLang="en-US" dirty="0" smtClean="0"/>
+              <a:t> </a:t>
+            </a:r>
+            <a:r>
+              <a:rPr lang="en-US" altLang="ko-KR" dirty="0" smtClean="0"/>
+              <a:t>(</a:t>
+            </a:r>
+            <a:r>
+              <a:rPr lang="ko-KR" altLang="en-US" dirty="0" smtClean="0"/>
+              <a:t>예</a:t>
+            </a:r>
+            <a:r>
+              <a:rPr lang="en-US" altLang="ko-KR" dirty="0" smtClean="0"/>
+              <a:t>: </a:t>
+            </a:r>
+            <a:r>
+              <a:rPr lang="en-US" altLang="ko-KR" dirty="0" err="1" smtClean="0"/>
+              <a:t>git</a:t>
+            </a:r>
+            <a:r>
+              <a:rPr lang="en-US" altLang="ko-KR" dirty="0" smtClean="0"/>
+              <a:t> push)</a:t>
+            </a:r>
+          </a:p>
+          <a:p>
+            <a:r>
+              <a:rPr lang="ko-KR" altLang="en-US" dirty="0" smtClean="0"/>
+              <a:t>보통은 두 주소가 </a:t>
+            </a:r>
+            <a:r>
+              <a:rPr lang="ko-KR" altLang="en-US" b="1" dirty="0" smtClean="0"/>
+              <a:t>같지만</a:t>
+            </a:r>
+            <a:r>
+              <a:rPr lang="en-US" altLang="ko-KR" dirty="0" smtClean="0"/>
+              <a:t>,</a:t>
+            </a:r>
+            <a:br>
+              <a:rPr lang="en-US" altLang="ko-KR" dirty="0" smtClean="0"/>
+            </a:br>
+            <a:r>
+              <a:rPr lang="en-US" altLang="ko-KR" dirty="0" err="1" smtClean="0"/>
+              <a:t>Git</a:t>
+            </a:r>
+            <a:r>
+              <a:rPr lang="ko-KR" altLang="en-US" dirty="0" smtClean="0"/>
+              <a:t>은 </a:t>
+            </a:r>
+            <a:r>
+              <a:rPr lang="en-US" altLang="ko-KR" b="1" dirty="0" smtClean="0"/>
+              <a:t>fetch</a:t>
+            </a:r>
+            <a:r>
+              <a:rPr lang="ko-KR" altLang="en-US" b="1" dirty="0" smtClean="0"/>
+              <a:t>용 </a:t>
+            </a:r>
+            <a:r>
+              <a:rPr lang="en-US" altLang="ko-KR" b="1" dirty="0" smtClean="0"/>
+              <a:t>URL</a:t>
+            </a:r>
+            <a:r>
+              <a:rPr lang="ko-KR" altLang="en-US" dirty="0" smtClean="0"/>
+              <a:t>과 </a:t>
             </a:r>
             <a:r>
               <a:rPr lang="en-US" altLang="ko-KR" b="1" dirty="0" smtClean="0"/>
@@ -9151,197 +9267,29 @@
             </a:r>
             <a:r>
               <a:rPr lang="ko-KR" altLang="en-US" b="1" dirty="0" smtClean="0"/>
-              <a:t>가 안 된다</a:t>
+              <a:t>용 </a:t>
             </a:r>
             <a:r>
               <a:rPr lang="en-US" altLang="ko-KR" b="1" dirty="0" smtClean="0"/>
-              <a:t>!</a:t>
-            </a:r>
-          </a:p>
-          <a:p>
-            <a:r>
-              <a:rPr lang="en-US" altLang="ko-KR" dirty="0" err="1" smtClean="0"/>
-              <a:t>Git</a:t>
+              <a:t>URL</a:t>
             </a:r>
             <a:r>
               <a:rPr lang="ko-KR" altLang="en-US" dirty="0" smtClean="0"/>
-              <a:t>은 </a:t>
-            </a:r>
-            <a:r>
-              <a:rPr lang="en-US" altLang="ko-KR" dirty="0" smtClean="0"/>
-              <a:t>push</a:t>
+              <a:t>을 </a:t>
+            </a:r>
+            <a:r>
+              <a:rPr lang="ko-KR" altLang="en-US" b="1" dirty="0" smtClean="0"/>
+              <a:t>따로 설정할 수 있는 기능</a:t>
             </a:r>
             <a:r>
               <a:rPr lang="ko-KR" altLang="en-US" dirty="0" smtClean="0"/>
-              <a:t>할 때</a:t>
-            </a:r>
-            <a:r>
-              <a:rPr lang="en-US" altLang="ko-KR" dirty="0" smtClean="0"/>
-              <a:t>, </a:t>
-            </a:r>
-            <a:r>
-              <a:rPr lang="ko-KR" altLang="en-US" dirty="0" smtClean="0"/>
-              <a:t>로컬과 원격 저장소의 **</a:t>
-            </a:r>
-            <a:r>
-              <a:rPr lang="ko-KR" altLang="en-US" dirty="0" err="1" smtClean="0"/>
-              <a:t>히스토리</a:t>
-            </a:r>
-            <a:r>
-              <a:rPr lang="en-US" altLang="ko-KR" dirty="0" smtClean="0"/>
-              <a:t>(</a:t>
-            </a:r>
-            <a:r>
-              <a:rPr lang="ko-KR" altLang="en-US" dirty="0" err="1" smtClean="0"/>
-              <a:t>커밋</a:t>
-            </a:r>
-            <a:r>
-              <a:rPr lang="ko-KR" altLang="en-US" dirty="0" smtClean="0"/>
-              <a:t> 흐름</a:t>
-            </a:r>
-            <a:r>
-              <a:rPr lang="en-US" altLang="ko-KR" dirty="0" smtClean="0"/>
-              <a:t>)**</a:t>
-            </a:r>
-            <a:r>
-              <a:rPr lang="ko-KR" altLang="en-US" dirty="0" smtClean="0"/>
-              <a:t>를 비교합니다</a:t>
+              <a:t>을 지원합니다</a:t>
             </a:r>
             <a:r>
               <a:rPr lang="en-US" altLang="ko-KR" dirty="0" smtClean="0"/>
               <a:t>.</a:t>
             </a:r>
-          </a:p>
-          <a:p>
-            <a:r>
-              <a:rPr lang="ko-KR" altLang="en-US" dirty="0" smtClean="0"/>
-              <a:t>서로 </a:t>
-            </a:r>
-            <a:r>
-              <a:rPr lang="ko-KR" altLang="en-US" b="1" dirty="0" smtClean="0"/>
-              <a:t>공통된 </a:t>
-            </a:r>
-            <a:r>
-              <a:rPr lang="ko-KR" altLang="en-US" b="1" dirty="0" err="1" smtClean="0"/>
-              <a:t>커밋</a:t>
-            </a:r>
-            <a:r>
-              <a:rPr lang="ko-KR" altLang="en-US" b="1" dirty="0" smtClean="0"/>
-              <a:t> 지점이 없으면</a:t>
-            </a:r>
-            <a:r>
-              <a:rPr lang="en-US" altLang="ko-KR" dirty="0" smtClean="0"/>
-              <a:t>, </a:t>
-            </a:r>
-            <a:r>
-              <a:rPr lang="en-US" altLang="ko-KR" dirty="0" err="1" smtClean="0"/>
-              <a:t>Git</a:t>
-            </a:r>
-            <a:r>
-              <a:rPr lang="ko-KR" altLang="en-US" dirty="0" smtClean="0"/>
-              <a:t>은 </a:t>
-            </a:r>
-            <a:r>
-              <a:rPr lang="en-US" altLang="ko-KR" dirty="0" smtClean="0"/>
-              <a:t>"</a:t>
-            </a:r>
-            <a:r>
-              <a:rPr lang="ko-KR" altLang="en-US" dirty="0" smtClean="0"/>
-              <a:t>이건 완전히 다른 이력</a:t>
-            </a:r>
-            <a:r>
-              <a:rPr lang="en-US" altLang="ko-KR" dirty="0" smtClean="0"/>
-              <a:t>"</a:t>
-            </a:r>
-            <a:r>
-              <a:rPr lang="ko-KR" altLang="en-US" dirty="0" smtClean="0"/>
-              <a:t>이라고 판단해서 </a:t>
-            </a:r>
-            <a:r>
-              <a:rPr lang="en-US" altLang="ko-KR" dirty="0" smtClean="0"/>
-              <a:t>push</a:t>
-            </a:r>
-            <a:r>
-              <a:rPr lang="ko-KR" altLang="en-US" dirty="0" smtClean="0"/>
-              <a:t>를 거부합니다</a:t>
-            </a:r>
-            <a:r>
-              <a:rPr lang="en-US" altLang="ko-KR" dirty="0" smtClean="0"/>
-              <a:t>.</a:t>
-            </a:r>
-          </a:p>
-          <a:p>
-            <a:endParaRPr lang="en-US" altLang="ko-KR" dirty="0" smtClean="0"/>
-          </a:p>
-          <a:p>
-            <a:r>
-              <a:rPr lang="ko-KR" altLang="en-US" dirty="0" smtClean="0"/>
-              <a:t>강제로 </a:t>
-            </a:r>
-            <a:r>
-              <a:rPr lang="ko-KR" altLang="en-US" b="1" dirty="0" smtClean="0"/>
-              <a:t>내 로컬 저장소 상태를 원격 저장소에 덮어쓰기</a:t>
-            </a:r>
-            <a:r>
-              <a:rPr lang="ko-KR" altLang="en-US" dirty="0" smtClean="0"/>
-              <a:t> 합니다</a:t>
-            </a:r>
-            <a:r>
-              <a:rPr lang="en-US" altLang="ko-KR" dirty="0" smtClean="0"/>
-              <a:t>.</a:t>
-            </a:r>
-          </a:p>
-          <a:p>
-            <a:r>
-              <a:rPr lang="ko-KR" altLang="en-US" dirty="0" smtClean="0"/>
-              <a:t>즉</a:t>
-            </a:r>
-            <a:r>
-              <a:rPr lang="en-US" altLang="ko-KR" dirty="0" smtClean="0"/>
-              <a:t>, </a:t>
-            </a:r>
-            <a:r>
-              <a:rPr lang="ko-KR" altLang="en-US" dirty="0" smtClean="0"/>
-              <a:t>원격 저장소에 있던 기존 </a:t>
-            </a:r>
-            <a:r>
-              <a:rPr lang="ko-KR" altLang="en-US" dirty="0" err="1" smtClean="0"/>
-              <a:t>히스토리는</a:t>
-            </a:r>
-            <a:r>
-              <a:rPr lang="ko-KR" altLang="en-US" dirty="0" smtClean="0"/>
-              <a:t> </a:t>
-            </a:r>
-            <a:r>
-              <a:rPr lang="ko-KR" altLang="en-US" b="1" dirty="0" smtClean="0"/>
-              <a:t>모두 사라지고 내 것만 남음</a:t>
-            </a:r>
-            <a:r>
-              <a:rPr lang="en-US" altLang="ko-KR" b="1" dirty="0" smtClean="0"/>
-              <a:t>!</a:t>
-            </a:r>
-            <a:r>
-              <a:rPr lang="ko-KR" altLang="en-US" dirty="0" smtClean="0"/>
-              <a:t> 💣</a:t>
-            </a:r>
-          </a:p>
-          <a:p>
-            <a:r>
-              <a:rPr lang="ko-KR" altLang="en-US" dirty="0" smtClean="0"/>
-              <a:t>✔ 주의</a:t>
-            </a:r>
-            <a:r>
-              <a:rPr lang="en-US" altLang="ko-KR" dirty="0" smtClean="0"/>
-              <a:t>: </a:t>
-            </a:r>
-            <a:r>
-              <a:rPr lang="ko-KR" altLang="en-US" dirty="0" smtClean="0"/>
-              <a:t>협업 중에는 위험하므로 혼자 쓰는 저장소일 때만 사용하는 것이 좋아요</a:t>
-            </a:r>
-            <a:r>
-              <a:rPr lang="en-US" altLang="ko-KR" dirty="0" smtClean="0"/>
-              <a:t>!</a:t>
-            </a:r>
+            <a:endParaRPr lang="ko-KR" altLang="en-US" dirty="0" smtClean="0"/>
           </a:p>
           <a:p>
             <a:endParaRPr lang="ko-KR" altLang="en-US" dirty="0"/>
@@ -9355,7 +9303,7 @@
             <a:spLocks noGrp="1"/>
           </p:cNvSpPr>
           <p:nvPr>
-            <p:ph type="sldNum" sz="quarter" idx="5"/>
+            <p:ph type="sldNum" sz="quarter" idx="10"/>
           </p:nvPr>
         </p:nvSpPr>
         <p:spPr/>
@@ -9363,9 +9311,9 @@
           <a:bodyPr/>
           <a:lstStyle/>
           <a:p>
-            <a:fld id="{C09E5BFC-1559-42F1-8940-AB342D56BF02}" type="slidenum">
+            <a:fld id="{80927ADC-3725-4C53-90DA-A7CB1E9F9FDE}" type="slidenum">
               <a:rPr lang="ko-KR" altLang="en-US" smtClean="0"/>
-              <a:t>62</a:t>
+              <a:t>61</a:t>
             </a:fld>
             <a:endParaRPr lang="ko-KR" altLang="en-US"/>
           </a:p>
@@ -9374,7 +9322,7 @@
     </p:spTree>
     <p:extLst>
       <p:ext uri="{BB962C8B-B14F-4D97-AF65-F5344CB8AC3E}">
-        <p14:creationId xmlns:p14="http://schemas.microsoft.com/office/powerpoint/2010/main" val="718502675"/>
+        <p14:creationId xmlns:p14="http://schemas.microsoft.com/office/powerpoint/2010/main" val="1149557836"/>
       </p:ext>
     </p:extLst>
   </p:cSld>
@@ -9428,6 +9376,299 @@
           <a:bodyPr/>
           <a:lstStyle/>
           <a:p>
+            <a:r>
+              <a:rPr lang="ko-KR" altLang="en-US" b="1" dirty="0" smtClean="0"/>
+              <a:t>로컬과 </a:t>
+            </a:r>
+            <a:r>
+              <a:rPr lang="ko-KR" altLang="en-US" b="1" dirty="0" smtClean="0"/>
+              <a:t>원격 저장소가 서로 다른 </a:t>
+            </a:r>
+            <a:r>
+              <a:rPr lang="en-US" altLang="ko-KR" b="1" dirty="0" smtClean="0"/>
+              <a:t>"</a:t>
+            </a:r>
+            <a:r>
+              <a:rPr lang="ko-KR" altLang="en-US" b="1" dirty="0" err="1" smtClean="0"/>
+              <a:t>커밋</a:t>
+            </a:r>
+            <a:r>
+              <a:rPr lang="ko-KR" altLang="en-US" b="1" dirty="0" smtClean="0"/>
+              <a:t> 이력</a:t>
+            </a:r>
+            <a:r>
+              <a:rPr lang="en-US" altLang="ko-KR" b="1" dirty="0" smtClean="0"/>
+              <a:t>"</a:t>
+            </a:r>
+            <a:r>
+              <a:rPr lang="ko-KR" altLang="en-US" b="1" dirty="0" smtClean="0"/>
+              <a:t>을 가지고 있으면 </a:t>
+            </a:r>
+            <a:r>
+              <a:rPr lang="en-US" altLang="ko-KR" b="1" dirty="0" smtClean="0"/>
+              <a:t>push</a:t>
+            </a:r>
+            <a:r>
+              <a:rPr lang="ko-KR" altLang="en-US" b="1" dirty="0" smtClean="0"/>
+              <a:t>가 안 된다</a:t>
+            </a:r>
+            <a:r>
+              <a:rPr lang="en-US" altLang="ko-KR" b="1" dirty="0" smtClean="0"/>
+              <a:t>!</a:t>
+            </a:r>
+          </a:p>
+          <a:p>
+            <a:r>
+              <a:rPr lang="en-US" altLang="ko-KR" dirty="0" err="1" smtClean="0"/>
+              <a:t>Git</a:t>
+            </a:r>
+            <a:r>
+              <a:rPr lang="ko-KR" altLang="en-US" dirty="0" smtClean="0"/>
+              <a:t>은 </a:t>
+            </a:r>
+            <a:r>
+              <a:rPr lang="en-US" altLang="ko-KR" dirty="0" smtClean="0"/>
+              <a:t>push</a:t>
+            </a:r>
+            <a:r>
+              <a:rPr lang="ko-KR" altLang="en-US" dirty="0" smtClean="0"/>
+              <a:t>할 때</a:t>
+            </a:r>
+            <a:r>
+              <a:rPr lang="en-US" altLang="ko-KR" dirty="0" smtClean="0"/>
+              <a:t>, </a:t>
+            </a:r>
+            <a:r>
+              <a:rPr lang="ko-KR" altLang="en-US" dirty="0" smtClean="0"/>
+              <a:t>로컬과 원격 저장소의 **</a:t>
+            </a:r>
+            <a:r>
+              <a:rPr lang="ko-KR" altLang="en-US" dirty="0" err="1" smtClean="0"/>
+              <a:t>히스토리</a:t>
+            </a:r>
+            <a:r>
+              <a:rPr lang="en-US" altLang="ko-KR" dirty="0" smtClean="0"/>
+              <a:t>(</a:t>
+            </a:r>
+            <a:r>
+              <a:rPr lang="ko-KR" altLang="en-US" dirty="0" err="1" smtClean="0"/>
+              <a:t>커밋</a:t>
+            </a:r>
+            <a:r>
+              <a:rPr lang="ko-KR" altLang="en-US" dirty="0" smtClean="0"/>
+              <a:t> 흐름</a:t>
+            </a:r>
+            <a:r>
+              <a:rPr lang="en-US" altLang="ko-KR" dirty="0" smtClean="0"/>
+              <a:t>)**</a:t>
+            </a:r>
+            <a:r>
+              <a:rPr lang="ko-KR" altLang="en-US" dirty="0" smtClean="0"/>
+              <a:t>를 비교합니다</a:t>
+            </a:r>
+            <a:r>
+              <a:rPr lang="en-US" altLang="ko-KR" dirty="0" smtClean="0"/>
+              <a:t>.</a:t>
+            </a:r>
+          </a:p>
+          <a:p>
+            <a:r>
+              <a:rPr lang="ko-KR" altLang="en-US" dirty="0" smtClean="0"/>
+              <a:t>서로 </a:t>
+            </a:r>
+            <a:r>
+              <a:rPr lang="ko-KR" altLang="en-US" b="1" dirty="0" smtClean="0"/>
+              <a:t>공통된 </a:t>
+            </a:r>
+            <a:r>
+              <a:rPr lang="ko-KR" altLang="en-US" b="1" dirty="0" err="1" smtClean="0"/>
+              <a:t>커밋</a:t>
+            </a:r>
+            <a:r>
+              <a:rPr lang="ko-KR" altLang="en-US" b="1" dirty="0" smtClean="0"/>
+              <a:t> 지점이 없으면</a:t>
+            </a:r>
+            <a:r>
+              <a:rPr lang="en-US" altLang="ko-KR" dirty="0" smtClean="0"/>
+              <a:t>, </a:t>
+            </a:r>
+            <a:r>
+              <a:rPr lang="en-US" altLang="ko-KR" dirty="0" err="1" smtClean="0"/>
+              <a:t>Git</a:t>
+            </a:r>
+            <a:r>
+              <a:rPr lang="ko-KR" altLang="en-US" dirty="0" smtClean="0"/>
+              <a:t>은 </a:t>
+            </a:r>
+            <a:r>
+              <a:rPr lang="en-US" altLang="ko-KR" dirty="0" smtClean="0"/>
+              <a:t>"</a:t>
+            </a:r>
+            <a:r>
+              <a:rPr lang="ko-KR" altLang="en-US" dirty="0" smtClean="0"/>
+              <a:t>이건 완전히 다른 이력</a:t>
+            </a:r>
+            <a:r>
+              <a:rPr lang="en-US" altLang="ko-KR" dirty="0" smtClean="0"/>
+              <a:t>"</a:t>
+            </a:r>
+            <a:r>
+              <a:rPr lang="ko-KR" altLang="en-US" dirty="0" smtClean="0"/>
+              <a:t>이라고 판단해서 </a:t>
+            </a:r>
+            <a:r>
+              <a:rPr lang="en-US" altLang="ko-KR" dirty="0" smtClean="0"/>
+              <a:t>push</a:t>
+            </a:r>
+            <a:r>
+              <a:rPr lang="ko-KR" altLang="en-US" dirty="0" smtClean="0"/>
+              <a:t>를 거부합니다</a:t>
+            </a:r>
+            <a:r>
+              <a:rPr lang="en-US" altLang="ko-KR" dirty="0" smtClean="0"/>
+              <a:t>.</a:t>
+            </a:r>
+          </a:p>
+          <a:p>
+            <a:endParaRPr lang="en-US" altLang="ko-KR" dirty="0" smtClean="0"/>
+          </a:p>
+          <a:p>
+            <a:r>
+              <a:rPr lang="ko-KR" altLang="en-US" dirty="0" smtClean="0"/>
+              <a:t>예</a:t>
+            </a:r>
+            <a:r>
+              <a:rPr lang="en-US" altLang="ko-KR" dirty="0" smtClean="0"/>
+              <a:t>: GitHub</a:t>
+            </a:r>
+            <a:r>
+              <a:rPr lang="ko-KR" altLang="en-US" dirty="0" smtClean="0"/>
+              <a:t>에서 저장소를 만들면서 </a:t>
+            </a:r>
+            <a:r>
+              <a:rPr lang="en-US" altLang="ko-KR" dirty="0" smtClean="0"/>
+              <a:t>README.md </a:t>
+            </a:r>
+            <a:r>
+              <a:rPr lang="ko-KR" altLang="en-US" dirty="0" smtClean="0"/>
+              <a:t>체크함 → 자동 </a:t>
+            </a:r>
+            <a:r>
+              <a:rPr lang="ko-KR" altLang="en-US" dirty="0" err="1" smtClean="0"/>
+              <a:t>커밋</a:t>
+            </a:r>
+            <a:r>
+              <a:rPr lang="ko-KR" altLang="en-US" dirty="0" smtClean="0"/>
+              <a:t> 생김</a:t>
+            </a:r>
+          </a:p>
+          <a:p>
+            <a:r>
+              <a:rPr lang="ko-KR" altLang="en-US" dirty="0" smtClean="0"/>
+              <a:t>그런데 나는 </a:t>
+            </a:r>
+            <a:r>
+              <a:rPr lang="en-US" altLang="ko-KR" dirty="0" err="1" smtClean="0"/>
+              <a:t>git</a:t>
+            </a:r>
+            <a:r>
+              <a:rPr lang="en-US" altLang="ko-KR" dirty="0" smtClean="0"/>
+              <a:t> </a:t>
+            </a:r>
+            <a:r>
+              <a:rPr lang="en-US" altLang="ko-KR" dirty="0" err="1" smtClean="0"/>
+              <a:t>init</a:t>
+            </a:r>
+            <a:r>
+              <a:rPr lang="ko-KR" altLang="en-US" dirty="0" smtClean="0"/>
+              <a:t>해서 따로 작업함 → 둘 사이에 공통 </a:t>
+            </a:r>
+            <a:r>
+              <a:rPr lang="ko-KR" altLang="en-US" dirty="0" err="1" smtClean="0"/>
+              <a:t>커밋이</a:t>
+            </a:r>
+            <a:r>
+              <a:rPr lang="ko-KR" altLang="en-US" dirty="0" smtClean="0"/>
+              <a:t> 없음</a:t>
+            </a:r>
+          </a:p>
+          <a:p>
+            <a:endParaRPr lang="en-US" altLang="ko-KR" dirty="0" smtClean="0"/>
+          </a:p>
+          <a:p>
+            <a:endParaRPr lang="en-US" altLang="ko-KR" dirty="0" smtClean="0"/>
+          </a:p>
+          <a:p>
+            <a:r>
+              <a:rPr lang="ko-KR" altLang="en-US" dirty="0" smtClean="0"/>
+              <a:t>강제로 </a:t>
+            </a:r>
+            <a:r>
+              <a:rPr lang="ko-KR" altLang="en-US" b="1" dirty="0" smtClean="0"/>
+              <a:t>내 로컬 저장소 상태를 원격 저장소에 덮어쓰기</a:t>
+            </a:r>
+            <a:r>
+              <a:rPr lang="ko-KR" altLang="en-US" dirty="0" smtClean="0"/>
+              <a:t> 합니다</a:t>
+            </a:r>
+            <a:r>
+              <a:rPr lang="en-US" altLang="ko-KR" dirty="0" smtClean="0"/>
+              <a:t>.</a:t>
+            </a:r>
+          </a:p>
+          <a:p>
+            <a:r>
+              <a:rPr lang="ko-KR" altLang="en-US" dirty="0" smtClean="0"/>
+              <a:t>즉</a:t>
+            </a:r>
+            <a:r>
+              <a:rPr lang="en-US" altLang="ko-KR" dirty="0" smtClean="0"/>
+              <a:t>, </a:t>
+            </a:r>
+            <a:r>
+              <a:rPr lang="ko-KR" altLang="en-US" dirty="0" smtClean="0"/>
+              <a:t>원격 저장소에 있던 기존 </a:t>
+            </a:r>
+            <a:r>
+              <a:rPr lang="ko-KR" altLang="en-US" dirty="0" err="1" smtClean="0"/>
+              <a:t>히스토리는</a:t>
+            </a:r>
+            <a:r>
+              <a:rPr lang="ko-KR" altLang="en-US" dirty="0" smtClean="0"/>
+              <a:t> </a:t>
+            </a:r>
+            <a:r>
+              <a:rPr lang="ko-KR" altLang="en-US" b="1" dirty="0" smtClean="0"/>
+              <a:t>모두 사라지고 내 것만 남음</a:t>
+            </a:r>
+            <a:r>
+              <a:rPr lang="en-US" altLang="ko-KR" b="1" dirty="0" smtClean="0"/>
+              <a:t>!</a:t>
+            </a:r>
+            <a:r>
+              <a:rPr lang="ko-KR" altLang="en-US" dirty="0" smtClean="0"/>
+              <a:t> 💣</a:t>
+            </a:r>
+          </a:p>
+          <a:p>
+            <a:r>
+              <a:rPr lang="ko-KR" altLang="en-US" dirty="0" smtClean="0"/>
+              <a:t>✔ 주의</a:t>
+            </a:r>
+            <a:r>
+              <a:rPr lang="en-US" altLang="ko-KR" dirty="0" smtClean="0"/>
+              <a:t>: </a:t>
+            </a:r>
+            <a:r>
+              <a:rPr lang="ko-KR" altLang="en-US" dirty="0" smtClean="0"/>
+              <a:t>협업 중에는 위험하므로 혼자 쓰는 저장소일 때만 사용하는 것이 좋아요</a:t>
+            </a:r>
+            <a:r>
+              <a:rPr lang="en-US" altLang="ko-KR" dirty="0" smtClean="0"/>
+              <a:t>!</a:t>
+            </a:r>
+          </a:p>
+          <a:p>
             <a:endParaRPr lang="ko-KR" altLang="en-US" dirty="0"/>
           </a:p>
         </p:txBody>
@@ -9449,7 +9690,7 @@
           <a:p>
             <a:fld id="{C09E5BFC-1559-42F1-8940-AB342D56BF02}" type="slidenum">
               <a:rPr lang="ko-KR" altLang="en-US" smtClean="0"/>
-              <a:t>63</a:t>
+              <a:t>62</a:t>
             </a:fld>
             <a:endParaRPr lang="ko-KR" altLang="en-US"/>
           </a:p>
@@ -9458,7 +9699,7 @@
     </p:spTree>
     <p:extLst>
       <p:ext uri="{BB962C8B-B14F-4D97-AF65-F5344CB8AC3E}">
-        <p14:creationId xmlns:p14="http://schemas.microsoft.com/office/powerpoint/2010/main" val="114423695"/>
+        <p14:creationId xmlns:p14="http://schemas.microsoft.com/office/powerpoint/2010/main" val="718502675"/>
       </p:ext>
     </p:extLst>
   </p:cSld>
@@ -9512,10 +9753,192 @@
           <a:bodyPr/>
           <a:lstStyle/>
           <a:p>
-            <a:endParaRPr lang="ko-KR" altLang="en-US"/>
-          </a:p>
-          <a:p>
-            <a:endParaRPr lang="ko-KR" altLang="en-US"/>
+            <a:r>
+              <a:rPr lang="en-US" altLang="ko-KR" dirty="0" smtClean="0"/>
+              <a:t>fetch</a:t>
+            </a:r>
+          </a:p>
+          <a:p>
+            <a:r>
+              <a:rPr lang="ko-KR" altLang="en-US" dirty="0" smtClean="0"/>
+              <a:t>원격저장소의 최신 상태를 내 로컬로 가져오는 명령어</a:t>
+            </a:r>
+            <a:endParaRPr lang="en-US" altLang="ko-KR" dirty="0" smtClean="0"/>
+          </a:p>
+          <a:p>
+            <a:r>
+              <a:rPr lang="ko-KR" altLang="en-US" dirty="0" smtClean="0"/>
+              <a:t>하지만</a:t>
+            </a:r>
+            <a:r>
+              <a:rPr lang="en-US" altLang="ko-KR" dirty="0" smtClean="0"/>
+              <a:t>! </a:t>
+            </a:r>
+            <a:r>
+              <a:rPr lang="ko-KR" altLang="en-US" dirty="0" smtClean="0"/>
+              <a:t>가져오기만 할 뿐</a:t>
+            </a:r>
+            <a:r>
+              <a:rPr lang="en-US" altLang="ko-KR" dirty="0" smtClean="0"/>
+              <a:t>, “</a:t>
+            </a:r>
+            <a:r>
+              <a:rPr lang="ko-KR" altLang="en-US" dirty="0" smtClean="0"/>
+              <a:t>내 작업 디렉토리</a:t>
+            </a:r>
+            <a:r>
+              <a:rPr lang="en-US" altLang="ko-KR" dirty="0" smtClean="0"/>
+              <a:t>＂</a:t>
+            </a:r>
+            <a:r>
+              <a:rPr lang="ko-KR" altLang="en-US" dirty="0" smtClean="0"/>
+              <a:t>에는 아무런 변화도 주지 </a:t>
+            </a:r>
+            <a:r>
+              <a:rPr lang="ko-KR" altLang="en-US" dirty="0" err="1" smtClean="0"/>
+              <a:t>ㅇㄶ음</a:t>
+            </a:r>
+            <a:r>
+              <a:rPr lang="en-US" altLang="ko-KR" dirty="0" smtClean="0"/>
+              <a:t>.</a:t>
+            </a:r>
+          </a:p>
+          <a:p>
+            <a:endParaRPr lang="en-US" altLang="ko-KR" dirty="0" smtClean="0"/>
+          </a:p>
+          <a:p>
+            <a:r>
+              <a:rPr lang="en-US" altLang="ko-KR" dirty="0" err="1" smtClean="0"/>
+              <a:t>git</a:t>
+            </a:r>
+            <a:r>
+              <a:rPr lang="en-US" altLang="ko-KR" dirty="0" smtClean="0"/>
+              <a:t> fetch</a:t>
+            </a:r>
+          </a:p>
+          <a:p>
+            <a:r>
+              <a:rPr lang="ko-KR" altLang="en-US" dirty="0" smtClean="0"/>
+              <a:t>원격 저장소의 </a:t>
+            </a:r>
+            <a:r>
+              <a:rPr lang="ko-KR" altLang="en-US" dirty="0" err="1" smtClean="0"/>
+              <a:t>커밋</a:t>
+            </a:r>
+            <a:r>
+              <a:rPr lang="en-US" altLang="ko-KR" dirty="0" smtClean="0"/>
+              <a:t>/</a:t>
+            </a:r>
+            <a:r>
+              <a:rPr lang="ko-KR" altLang="en-US" dirty="0" err="1" smtClean="0"/>
+              <a:t>브랜치</a:t>
+            </a:r>
+            <a:r>
+              <a:rPr lang="ko-KR" altLang="en-US" dirty="0" smtClean="0"/>
+              <a:t> 정보만 가져옴</a:t>
+            </a:r>
+            <a:endParaRPr lang="en-US" altLang="ko-KR" dirty="0" smtClean="0"/>
+          </a:p>
+          <a:p>
+            <a:r>
+              <a:rPr lang="ko-KR" altLang="en-US" dirty="0" smtClean="0"/>
+              <a:t>❌ </a:t>
+            </a:r>
+            <a:r>
+              <a:rPr lang="en-US" altLang="ko-KR" dirty="0" smtClean="0"/>
+              <a:t>(</a:t>
+            </a:r>
+            <a:r>
+              <a:rPr lang="ko-KR" altLang="en-US" dirty="0" smtClean="0"/>
+              <a:t>변경 없음</a:t>
+            </a:r>
+            <a:r>
+              <a:rPr lang="en-US" altLang="ko-KR" dirty="0" smtClean="0"/>
+              <a:t>)</a:t>
+            </a:r>
+          </a:p>
+          <a:p>
+            <a:endParaRPr lang="en-US" altLang="ko-KR" dirty="0" smtClean="0"/>
+          </a:p>
+          <a:p>
+            <a:r>
+              <a:rPr lang="en-US" altLang="ko-KR" dirty="0" err="1" smtClean="0"/>
+              <a:t>git</a:t>
+            </a:r>
+            <a:r>
+              <a:rPr lang="en-US" altLang="ko-KR" dirty="0" smtClean="0"/>
+              <a:t> pull</a:t>
+            </a:r>
+          </a:p>
+          <a:p>
+            <a:r>
+              <a:rPr lang="en-US" altLang="ko-KR" dirty="0" smtClean="0"/>
+              <a:t>fetch + merge (</a:t>
+            </a:r>
+            <a:r>
+              <a:rPr lang="ko-KR" altLang="en-US" dirty="0" smtClean="0"/>
+              <a:t>바로 병합까지</a:t>
+            </a:r>
+            <a:r>
+              <a:rPr lang="en-US" altLang="ko-KR" dirty="0" smtClean="0"/>
+              <a:t>)</a:t>
+            </a:r>
+          </a:p>
+          <a:p>
+            <a:r>
+              <a:rPr lang="en-US" altLang="ko-KR" dirty="0" smtClean="0"/>
+              <a:t>✅ (</a:t>
+            </a:r>
+            <a:r>
+              <a:rPr lang="ko-KR" altLang="en-US" dirty="0" smtClean="0"/>
+              <a:t>변경 있음</a:t>
+            </a:r>
+            <a:r>
+              <a:rPr lang="en-US" altLang="ko-KR" dirty="0" smtClean="0"/>
+              <a:t>)</a:t>
+            </a:r>
+            <a:endParaRPr lang="ko-KR" altLang="en-US" dirty="0" smtClean="0"/>
+          </a:p>
+          <a:p>
+            <a:endParaRPr lang="en-US" altLang="ko-KR" dirty="0" smtClean="0"/>
+          </a:p>
+          <a:p>
+            <a:r>
+              <a:rPr lang="en-US" altLang="ko-KR" dirty="0" smtClean="0">
+                <a:sym typeface="Wingdings" panose="05000000000000000000" pitchFamily="2" charset="2"/>
+              </a:rPr>
+              <a:t> </a:t>
+            </a:r>
+            <a:r>
+              <a:rPr lang="ko-KR" altLang="en-US" dirty="0" err="1" smtClean="0">
+                <a:sym typeface="Wingdings" panose="05000000000000000000" pitchFamily="2" charset="2"/>
+              </a:rPr>
+              <a:t>노션에서</a:t>
+            </a:r>
+            <a:r>
+              <a:rPr lang="ko-KR" altLang="en-US" dirty="0" smtClean="0">
+                <a:sym typeface="Wingdings" panose="05000000000000000000" pitchFamily="2" charset="2"/>
+              </a:rPr>
+              <a:t> 충돌 실습 보여주기</a:t>
+            </a:r>
+            <a:r>
+              <a:rPr lang="en-US" altLang="ko-KR" dirty="0" smtClean="0">
+                <a:sym typeface="Wingdings" panose="05000000000000000000" pitchFamily="2" charset="2"/>
+              </a:rPr>
+              <a:t>.</a:t>
+            </a:r>
+            <a:br>
+              <a:rPr lang="en-US" altLang="ko-KR" dirty="0" smtClean="0">
+                <a:sym typeface="Wingdings" panose="05000000000000000000" pitchFamily="2" charset="2"/>
+              </a:rPr>
+            </a:br>
+            <a:r>
+              <a:rPr lang="en-US" altLang="ko-KR" dirty="0" smtClean="0">
+                <a:sym typeface="Wingdings" panose="05000000000000000000" pitchFamily="2" charset="2"/>
+              </a:rPr>
+              <a:t>https://www.notion.so/git-fetch-1dcd6fe891f280d887c9ff48c16149f9</a:t>
+            </a:r>
+            <a:endParaRPr lang="ko-KR" altLang="en-US" dirty="0"/>
           </a:p>
         </p:txBody>
       </p:sp>
@@ -9536,7 +9959,7 @@
           <a:p>
             <a:fld id="{C09E5BFC-1559-42F1-8940-AB342D56BF02}" type="slidenum">
               <a:rPr lang="ko-KR" altLang="en-US" smtClean="0"/>
-              <a:t>64</a:t>
+              <a:t>63</a:t>
             </a:fld>
             <a:endParaRPr lang="ko-KR" altLang="en-US"/>
           </a:p>
@@ -9545,7 +9968,7 @@
     </p:spTree>
     <p:extLst>
       <p:ext uri="{BB962C8B-B14F-4D97-AF65-F5344CB8AC3E}">
-        <p14:creationId xmlns:p14="http://schemas.microsoft.com/office/powerpoint/2010/main" val="2796151402"/>
+        <p14:creationId xmlns:p14="http://schemas.microsoft.com/office/powerpoint/2010/main" val="2649389259"/>
       </p:ext>
     </p:extLst>
   </p:cSld>
@@ -9610,6 +10033,177 @@
             <a:spLocks noGrp="1"/>
           </p:cNvSpPr>
           <p:nvPr>
+            <p:ph type="sldNum" sz="quarter" idx="5"/>
+          </p:nvPr>
+        </p:nvSpPr>
+        <p:spPr/>
+        <p:txBody>
+          <a:bodyPr/>
+          <a:lstStyle/>
+          <a:p>
+            <a:fld id="{C09E5BFC-1559-42F1-8940-AB342D56BF02}" type="slidenum">
+              <a:rPr lang="ko-KR" altLang="en-US" smtClean="0"/>
+              <a:t>64</a:t>
+            </a:fld>
+            <a:endParaRPr lang="ko-KR" altLang="en-US"/>
+          </a:p>
+        </p:txBody>
+      </p:sp>
+    </p:spTree>
+    <p:extLst>
+      <p:ext uri="{BB962C8B-B14F-4D97-AF65-F5344CB8AC3E}">
+        <p14:creationId xmlns:p14="http://schemas.microsoft.com/office/powerpoint/2010/main" val="114423695"/>
+      </p:ext>
+    </p:extLst>
+  </p:cSld>
+  <p:clrMapOvr>
+    <a:masterClrMapping/>
+  </p:clrMapOvr>
+</p:notes>
+</file>
+
+<file path=ppt/notesSlides/notesSlide58.xml><?xml version="1.0" encoding="utf-8"?>
+<p:notes xmlns:a="http://schemas.openxmlformats.org/drawingml/2006/main" xmlns:r="http://schemas.openxmlformats.org/officeDocument/2006/relationships" xmlns:p="http://schemas.openxmlformats.org/presentationml/2006/main">
+  <p:cSld>
+    <p:spTree>
+      <p:nvGrpSpPr>
+        <p:cNvPr id="1" name=""/>
+        <p:cNvGrpSpPr/>
+        <p:nvPr/>
+      </p:nvGrpSpPr>
+      <p:grpSpPr>
+        <a:xfrm>
+          <a:off x="0" y="0"/>
+          <a:ext cx="0" cy="0"/>
+          <a:chOff x="0" y="0"/>
+          <a:chExt cx="0" cy="0"/>
+        </a:xfrm>
+      </p:grpSpPr>
+      <p:sp>
+        <p:nvSpPr>
+          <p:cNvPr id="2" name="슬라이드 이미지 개체 틀 1"/>
+          <p:cNvSpPr>
+            <a:spLocks noGrp="1" noRot="1" noChangeAspect="1"/>
+          </p:cNvSpPr>
+          <p:nvPr>
+            <p:ph type="sldImg"/>
+          </p:nvPr>
+        </p:nvSpPr>
+        <p:spPr/>
+      </p:sp>
+      <p:sp>
+        <p:nvSpPr>
+          <p:cNvPr id="3" name="슬라이드 노트 개체 틀 2"/>
+          <p:cNvSpPr>
+            <a:spLocks noGrp="1"/>
+          </p:cNvSpPr>
+          <p:nvPr>
+            <p:ph type="body" idx="1"/>
+          </p:nvPr>
+        </p:nvSpPr>
+        <p:spPr/>
+        <p:txBody>
+          <a:bodyPr/>
+          <a:lstStyle/>
+          <a:p>
+            <a:endParaRPr lang="ko-KR" altLang="en-US"/>
+          </a:p>
+          <a:p>
+            <a:endParaRPr lang="ko-KR" altLang="en-US"/>
+          </a:p>
+        </p:txBody>
+      </p:sp>
+      <p:sp>
+        <p:nvSpPr>
+          <p:cNvPr id="4" name="슬라이드 번호 개체 틀 3"/>
+          <p:cNvSpPr>
+            <a:spLocks noGrp="1"/>
+          </p:cNvSpPr>
+          <p:nvPr>
+            <p:ph type="sldNum" sz="quarter" idx="5"/>
+          </p:nvPr>
+        </p:nvSpPr>
+        <p:spPr/>
+        <p:txBody>
+          <a:bodyPr/>
+          <a:lstStyle/>
+          <a:p>
+            <a:fld id="{C09E5BFC-1559-42F1-8940-AB342D56BF02}" type="slidenum">
+              <a:rPr lang="ko-KR" altLang="en-US" smtClean="0"/>
+              <a:t>65</a:t>
+            </a:fld>
+            <a:endParaRPr lang="ko-KR" altLang="en-US"/>
+          </a:p>
+        </p:txBody>
+      </p:sp>
+    </p:spTree>
+    <p:extLst>
+      <p:ext uri="{BB962C8B-B14F-4D97-AF65-F5344CB8AC3E}">
+        <p14:creationId xmlns:p14="http://schemas.microsoft.com/office/powerpoint/2010/main" val="2796151402"/>
+      </p:ext>
+    </p:extLst>
+  </p:cSld>
+  <p:clrMapOvr>
+    <a:masterClrMapping/>
+  </p:clrMapOvr>
+</p:notes>
+</file>
+
+<file path=ppt/notesSlides/notesSlide59.xml><?xml version="1.0" encoding="utf-8"?>
+<p:notes xmlns:a="http://schemas.openxmlformats.org/drawingml/2006/main" xmlns:r="http://schemas.openxmlformats.org/officeDocument/2006/relationships" xmlns:p="http://schemas.openxmlformats.org/presentationml/2006/main">
+  <p:cSld>
+    <p:spTree>
+      <p:nvGrpSpPr>
+        <p:cNvPr id="1" name=""/>
+        <p:cNvGrpSpPr/>
+        <p:nvPr/>
+      </p:nvGrpSpPr>
+      <p:grpSpPr>
+        <a:xfrm>
+          <a:off x="0" y="0"/>
+          <a:ext cx="0" cy="0"/>
+          <a:chOff x="0" y="0"/>
+          <a:chExt cx="0" cy="0"/>
+        </a:xfrm>
+      </p:grpSpPr>
+      <p:sp>
+        <p:nvSpPr>
+          <p:cNvPr id="2" name="슬라이드 이미지 개체 틀 1"/>
+          <p:cNvSpPr>
+            <a:spLocks noGrp="1" noRot="1" noChangeAspect="1"/>
+          </p:cNvSpPr>
+          <p:nvPr>
+            <p:ph type="sldImg"/>
+          </p:nvPr>
+        </p:nvSpPr>
+        <p:spPr/>
+      </p:sp>
+      <p:sp>
+        <p:nvSpPr>
+          <p:cNvPr id="3" name="슬라이드 노트 개체 틀 2"/>
+          <p:cNvSpPr>
+            <a:spLocks noGrp="1"/>
+          </p:cNvSpPr>
+          <p:nvPr>
+            <p:ph type="body" idx="1"/>
+          </p:nvPr>
+        </p:nvSpPr>
+        <p:spPr/>
+        <p:txBody>
+          <a:bodyPr/>
+          <a:lstStyle/>
+          <a:p>
+            <a:endParaRPr lang="ko-KR" altLang="en-US" dirty="0"/>
+          </a:p>
+        </p:txBody>
+      </p:sp>
+      <p:sp>
+        <p:nvSpPr>
+          <p:cNvPr id="4" name="슬라이드 번호 개체 틀 3"/>
+          <p:cNvSpPr>
+            <a:spLocks noGrp="1"/>
+          </p:cNvSpPr>
+          <p:nvPr>
             <p:ph type="sldNum" sz="quarter" idx="10"/>
           </p:nvPr>
         </p:nvSpPr>
@@ -9620,7 +10214,7 @@
           <a:p>
             <a:fld id="{80927ADC-3725-4C53-90DA-A7CB1E9F9FDE}" type="slidenum">
               <a:rPr lang="ko-KR" altLang="en-US" smtClean="0"/>
-              <a:t>65</a:t>
+              <a:t>66</a:t>
             </a:fld>
             <a:endParaRPr lang="ko-KR" altLang="en-US"/>
           </a:p>
@@ -10341,7 +10935,7 @@
           <a:p>
             <a:fld id="{442BEE3F-2E9A-4FD8-8B8A-8619F3E161C0}" type="datetime1">
               <a:rPr lang="ko-KR" altLang="en-US" smtClean="0"/>
-              <a:t>2025-04-20</a:t>
+              <a:t>2025-04-21</a:t>
             </a:fld>
             <a:endParaRPr lang="ko-KR" altLang="en-US"/>
           </a:p>
@@ -10527,7 +11121,7 @@
           <a:p>
             <a:fld id="{2EAE422B-0E68-47B5-84BB-CA2BDA8EE46C}" type="datetime1">
               <a:rPr lang="ko-KR" altLang="en-US" smtClean="0"/>
-              <a:t>2025-04-20</a:t>
+              <a:t>2025-04-21</a:t>
             </a:fld>
             <a:endParaRPr lang="ko-KR" altLang="en-US"/>
           </a:p>
@@ -10735,7 +11329,7 @@
           <a:p>
             <a:fld id="{AF7C623F-179B-417F-99B6-50F6DF228D4B}" type="datetime1">
               <a:rPr lang="ko-KR" altLang="en-US" smtClean="0"/>
-              <a:t>2025-04-20</a:t>
+              <a:t>2025-04-21</a:t>
             </a:fld>
             <a:endParaRPr lang="ko-KR" altLang="en-US"/>
           </a:p>
@@ -10971,7 +11565,7 @@
           <a:p>
             <a:fld id="{0F78D9C4-20C1-4B15-A116-16DC77AD9A1E}" type="datetime1">
               <a:rPr lang="ko-KR" altLang="en-US" smtClean="0"/>
-              <a:t>2025-04-20</a:t>
+              <a:t>2025-04-21</a:t>
             </a:fld>
             <a:endParaRPr lang="ko-KR" altLang="en-US"/>
           </a:p>
@@ -11246,7 +11840,7 @@
           <a:p>
             <a:fld id="{C7F43723-C509-4DEA-8428-B50818F79709}" type="datetime1">
               <a:rPr lang="ko-KR" altLang="en-US" smtClean="0"/>
-              <a:t>2025-04-20</a:t>
+              <a:t>2025-04-21</a:t>
             </a:fld>
             <a:endParaRPr lang="ko-KR" altLang="en-US"/>
           </a:p>
@@ -11511,7 +12105,7 @@
           <a:p>
             <a:fld id="{5D2B7482-EE74-4DBD-97F4-D0DAC0C0E4E5}" type="datetime1">
               <a:rPr lang="ko-KR" altLang="en-US" smtClean="0"/>
-              <a:t>2025-04-20</a:t>
+              <a:t>2025-04-21</a:t>
             </a:fld>
             <a:endParaRPr lang="ko-KR" altLang="en-US"/>
           </a:p>
@@ -11924,7 +12518,7 @@
           <a:p>
             <a:fld id="{051A8C49-CED7-4A86-9B4A-621D7F62EE92}" type="datetime1">
               <a:rPr lang="ko-KR" altLang="en-US" smtClean="0"/>
-              <a:t>2025-04-20</a:t>
+              <a:t>2025-04-21</a:t>
             </a:fld>
             <a:endParaRPr lang="ko-KR" altLang="en-US"/>
           </a:p>
@@ -12071,7 +12665,7 @@
           <a:p>
             <a:fld id="{84082D76-7079-412D-848B-E1B9E7A6A286}" type="datetime1">
               <a:rPr lang="ko-KR" altLang="en-US" smtClean="0"/>
-              <a:t>2025-04-20</a:t>
+              <a:t>2025-04-21</a:t>
             </a:fld>
             <a:endParaRPr lang="ko-KR" altLang="en-US"/>
           </a:p>
@@ -12184,7 +12778,7 @@
           <a:p>
             <a:fld id="{10C5FEB5-5F88-4F49-9108-1795E314F09F}" type="datetime1">
               <a:rPr lang="ko-KR" altLang="en-US" smtClean="0"/>
-              <a:t>2025-04-20</a:t>
+              <a:t>2025-04-21</a:t>
             </a:fld>
             <a:endParaRPr lang="ko-KR" altLang="en-US"/>
           </a:p>
@@ -12495,7 +13089,7 @@
           <a:p>
             <a:fld id="{E37ABBEE-D8D4-48AD-9887-4DC578B8A684}" type="datetime1">
               <a:rPr lang="ko-KR" altLang="en-US" smtClean="0"/>
-              <a:t>2025-04-20</a:t>
+              <a:t>2025-04-21</a:t>
             </a:fld>
             <a:endParaRPr lang="ko-KR" altLang="en-US"/>
           </a:p>
@@ -12786,7 +13380,7 @@
           <a:p>
             <a:fld id="{A2D6A55C-F3DD-45DD-9D50-F8680410167D}" type="datetime1">
               <a:rPr lang="ko-KR" altLang="en-US" smtClean="0"/>
-              <a:t>2025-04-20</a:t>
+              <a:t>2025-04-21</a:t>
             </a:fld>
             <a:endParaRPr lang="ko-KR" altLang="en-US"/>
           </a:p>
@@ -13030,7 +13624,7 @@
             <a:fld id="{7F5E23C3-0E3D-4E4E-8486-D7FB4C073DC1}" type="datetime1">
               <a:rPr lang="ko-KR" altLang="en-US" smtClean="0"/>
               <a:pPr/>
-              <a:t>2025-04-20</a:t>
+              <a:t>2025-04-21</a:t>
             </a:fld>
             <a:endParaRPr lang="ko-KR" altLang="en-US" dirty="0"/>
           </a:p>
@@ -17841,7 +18435,7 @@
           <a:p>
             <a:fld id="{0F78D9C4-20C1-4B15-A116-16DC77AD9A1E}" type="datetime1">
               <a:rPr lang="ko-KR" altLang="en-US" smtClean="0"/>
-              <a:t>2025-04-20</a:t>
+              <a:t>2025-04-21</a:t>
             </a:fld>
             <a:endParaRPr lang="ko-KR" altLang="en-US"/>
           </a:p>
@@ -17910,14 +18504,7 @@
                 <a:latin typeface="G마켓 산스 TTF Bold" panose="02000000000000000000" pitchFamily="2" charset="-127"/>
                 <a:ea typeface="G마켓 산스 TTF Bold" panose="02000000000000000000" pitchFamily="2" charset="-127"/>
               </a:rPr>
-              <a:t>GUI</a:t>
-            </a:r>
-            <a:r>
-              <a:rPr lang="en-US" altLang="ko-KR" sz="6600" dirty="0" smtClean="0">
-                <a:latin typeface="G마켓 산스 TTF Bold" panose="02000000000000000000" pitchFamily="2" charset="-127"/>
-                <a:ea typeface="G마켓 산스 TTF Bold" panose="02000000000000000000" pitchFamily="2" charset="-127"/>
-              </a:rPr>
-              <a:t> </a:t>
+              <a:t>GUI </a:t>
             </a:r>
             <a:r>
               <a:rPr lang="en-US" altLang="ko-KR" sz="6600" dirty="0">
@@ -18905,11 +19492,7 @@
             <a:pPr lvl="1"/>
             <a:r>
               <a:rPr lang="en-US" altLang="ko-KR" dirty="0" smtClean="0"/>
-              <a:t>l</a:t>
-            </a:r>
-            <a:r>
-              <a:rPr lang="en-US" altLang="ko-KR" dirty="0" smtClean="0"/>
-              <a:t>s (list) </a:t>
+              <a:t>ls (list) </a:t>
             </a:r>
             <a:r>
               <a:rPr lang="en-US" altLang="ko-KR" dirty="0"/>
@@ -18917,11 +19500,7 @@
             </a:r>
             <a:r>
               <a:rPr lang="ko-KR" altLang="en-US" dirty="0" smtClean="0"/>
-              <a:t>현재 위치 </a:t>
-            </a:r>
-            <a:r>
-              <a:rPr lang="ko-KR" altLang="en-US" dirty="0" smtClean="0"/>
-              <a:t>폴더에 </a:t>
+              <a:t>현재 위치 폴더에 </a:t>
             </a:r>
             <a:r>
               <a:rPr lang="ko-KR" altLang="en-US" dirty="0"/>
@@ -21367,11 +21946,7 @@
             </a:r>
             <a:r>
               <a:rPr lang="en-US" altLang="ko-KR" dirty="0" smtClean="0"/>
-              <a:t>) </a:t>
-            </a:r>
-            <a:r>
-              <a:rPr lang="en-US" altLang="ko-KR" dirty="0" smtClean="0"/>
-              <a:t>default </a:t>
+              <a:t>) default </a:t>
             </a:r>
             <a:r>
               <a:rPr lang="ko-KR" altLang="en-US" dirty="0" err="1"/>
@@ -21685,11 +22260,7 @@
             </a:r>
             <a:r>
               <a:rPr lang="ko-KR" altLang="en-US" sz="4800" dirty="0" smtClean="0"/>
-              <a:t> </a:t>
-            </a:r>
-            <a:r>
-              <a:rPr lang="ko-KR" altLang="en-US" sz="4800" dirty="0" smtClean="0"/>
-              <a:t>생성</a:t>
+              <a:t> 생성</a:t>
             </a:r>
             <a:endParaRPr lang="ko-KR" altLang="en-US" sz="4800" dirty="0"/>
           </a:p>
@@ -22582,7 +23153,6 @@
               <a:rPr lang="ko-KR" altLang="en-US" sz="4800" dirty="0"/>
               <a:t>원격저장소와 내 폴더 연결</a:t>
             </a:r>
-            <a:endParaRPr lang="ko-KR" altLang="en-US" sz="4800" dirty="0"/>
           </a:p>
         </p:txBody>
       </p:sp>
@@ -23715,7 +24285,7 @@
                 <a:hlinkClick r:id="rId3">
                   <a:extLst>
                     <a:ext uri="{A12FA001-AC4F-418D-AE19-62706E023703}">
-                      <ahyp:hlinkClr xmlns:ahyp="http://schemas.microsoft.com/office/drawing/2018/hyperlinkcolor" xmlns="" val="tx"/>
+                      <ahyp:hlinkClr xmlns="" xmlns:ahyp="http://schemas.microsoft.com/office/drawing/2018/hyperlinkcolor" val="tx"/>
                     </a:ext>
                   </a:extLst>
                 </a:hlinkClick>
@@ -24521,7 +25091,7 @@
                 <a14:useLocalDpi xmlns:a14="http://schemas.microsoft.com/office/drawing/2010/main" val="0"/>
               </a:ext>
               <a:ext uri="{96DAC541-7B7A-43D3-8B79-37D633B846F1}">
-                <asvg:svgBlip xmlns:asvg="http://schemas.microsoft.com/office/drawing/2016/SVG/main" xmlns="" r:embed="rId5"/>
+                <asvg:svgBlip xmlns="" xmlns:asvg="http://schemas.microsoft.com/office/drawing/2016/SVG/main" r:embed="rId5"/>
               </a:ext>
             </a:extLst>
           </a:blip>
@@ -24560,7 +25130,7 @@
                 <a14:useLocalDpi xmlns:a14="http://schemas.microsoft.com/office/drawing/2010/main" val="0"/>
               </a:ext>
               <a:ext uri="{96DAC541-7B7A-43D3-8B79-37D633B846F1}">
-                <asvg:svgBlip xmlns:asvg="http://schemas.microsoft.com/office/drawing/2016/SVG/main" xmlns="" r:embed="rId7"/>
+                <asvg:svgBlip xmlns="" xmlns:asvg="http://schemas.microsoft.com/office/drawing/2016/SVG/main" r:embed="rId7"/>
               </a:ext>
             </a:extLst>
           </a:blip>
@@ -24599,7 +25169,7 @@
                 <a14:useLocalDpi xmlns:a14="http://schemas.microsoft.com/office/drawing/2010/main" val="0"/>
               </a:ext>
               <a:ext uri="{96DAC541-7B7A-43D3-8B79-37D633B846F1}">
-                <asvg:svgBlip xmlns:asvg="http://schemas.microsoft.com/office/drawing/2016/SVG/main" xmlns="" r:embed="rId9"/>
+                <asvg:svgBlip xmlns="" xmlns:asvg="http://schemas.microsoft.com/office/drawing/2016/SVG/main" r:embed="rId9"/>
               </a:ext>
             </a:extLst>
           </a:blip>
@@ -24638,7 +25208,7 @@
                 <a14:useLocalDpi xmlns:a14="http://schemas.microsoft.com/office/drawing/2010/main" val="0"/>
               </a:ext>
               <a:ext uri="{96DAC541-7B7A-43D3-8B79-37D633B846F1}">
-                <asvg:svgBlip xmlns:asvg="http://schemas.microsoft.com/office/drawing/2016/SVG/main" xmlns="" r:embed="rId11"/>
+                <asvg:svgBlip xmlns="" xmlns:asvg="http://schemas.microsoft.com/office/drawing/2016/SVG/main" r:embed="rId11"/>
               </a:ext>
             </a:extLst>
           </a:blip>
@@ -27769,7 +28339,7 @@
                   <a14:useLocalDpi xmlns:a14="http://schemas.microsoft.com/office/drawing/2010/main" val="0"/>
                 </a:ext>
                 <a:ext uri="{96DAC541-7B7A-43D3-8B79-37D633B846F1}">
-                  <asvg:svgBlip xmlns:asvg="http://schemas.microsoft.com/office/drawing/2016/SVG/main" xmlns="" r:embed="rId4"/>
+                  <asvg:svgBlip xmlns="" xmlns:asvg="http://schemas.microsoft.com/office/drawing/2016/SVG/main" r:embed="rId4"/>
                 </a:ext>
               </a:extLst>
             </a:blip>
@@ -27865,7 +28435,7 @@
                   <a14:useLocalDpi xmlns:a14="http://schemas.microsoft.com/office/drawing/2010/main" val="0"/>
                 </a:ext>
                 <a:ext uri="{96DAC541-7B7A-43D3-8B79-37D633B846F1}">
-                  <asvg:svgBlip xmlns:asvg="http://schemas.microsoft.com/office/drawing/2016/SVG/main" xmlns="" r:embed="rId4"/>
+                  <asvg:svgBlip xmlns="" xmlns:asvg="http://schemas.microsoft.com/office/drawing/2016/SVG/main" r:embed="rId4"/>
                 </a:ext>
               </a:extLst>
             </a:blip>
@@ -28051,7 +28621,7 @@
                   <a14:useLocalDpi xmlns:a14="http://schemas.microsoft.com/office/drawing/2010/main" val="0"/>
                 </a:ext>
                 <a:ext uri="{96DAC541-7B7A-43D3-8B79-37D633B846F1}">
-                  <asvg:svgBlip xmlns:asvg="http://schemas.microsoft.com/office/drawing/2016/SVG/main" xmlns="" r:embed="rId4"/>
+                  <asvg:svgBlip xmlns="" xmlns:asvg="http://schemas.microsoft.com/office/drawing/2016/SVG/main" r:embed="rId4"/>
                 </a:ext>
               </a:extLst>
             </a:blip>
@@ -28147,7 +28717,7 @@
                   <a14:useLocalDpi xmlns:a14="http://schemas.microsoft.com/office/drawing/2010/main" val="0"/>
                 </a:ext>
                 <a:ext uri="{96DAC541-7B7A-43D3-8B79-37D633B846F1}">
-                  <asvg:svgBlip xmlns:asvg="http://schemas.microsoft.com/office/drawing/2016/SVG/main" xmlns="" r:embed="rId4"/>
+                  <asvg:svgBlip xmlns="" xmlns:asvg="http://schemas.microsoft.com/office/drawing/2016/SVG/main" r:embed="rId4"/>
                 </a:ext>
               </a:extLst>
             </a:blip>
@@ -29186,7 +29756,7 @@
                   <a14:useLocalDpi xmlns:a14="http://schemas.microsoft.com/office/drawing/2010/main" val="0"/>
                 </a:ext>
                 <a:ext uri="{96DAC541-7B7A-43D3-8B79-37D633B846F1}">
-                  <asvg:svgBlip xmlns:asvg="http://schemas.microsoft.com/office/drawing/2016/SVG/main" xmlns="" r:embed="rId3"/>
+                  <asvg:svgBlip xmlns="" xmlns:asvg="http://schemas.microsoft.com/office/drawing/2016/SVG/main" r:embed="rId3"/>
                 </a:ext>
               </a:extLst>
             </a:blip>
@@ -29282,7 +29852,7 @@
                   <a14:useLocalDpi xmlns:a14="http://schemas.microsoft.com/office/drawing/2010/main" val="0"/>
                 </a:ext>
                 <a:ext uri="{96DAC541-7B7A-43D3-8B79-37D633B846F1}">
-                  <asvg:svgBlip xmlns:asvg="http://schemas.microsoft.com/office/drawing/2016/SVG/main" xmlns="" r:embed="rId3"/>
+                  <asvg:svgBlip xmlns="" xmlns:asvg="http://schemas.microsoft.com/office/drawing/2016/SVG/main" r:embed="rId3"/>
                 </a:ext>
               </a:extLst>
             </a:blip>
@@ -29378,7 +29948,7 @@
                   <a14:useLocalDpi xmlns:a14="http://schemas.microsoft.com/office/drawing/2010/main" val="0"/>
                 </a:ext>
                 <a:ext uri="{96DAC541-7B7A-43D3-8B79-37D633B846F1}">
-                  <asvg:svgBlip xmlns:asvg="http://schemas.microsoft.com/office/drawing/2016/SVG/main" xmlns="" r:embed="rId3"/>
+                  <asvg:svgBlip xmlns="" xmlns:asvg="http://schemas.microsoft.com/office/drawing/2016/SVG/main" r:embed="rId3"/>
                 </a:ext>
               </a:extLst>
             </a:blip>
@@ -29474,7 +30044,7 @@
                   <a14:useLocalDpi xmlns:a14="http://schemas.microsoft.com/office/drawing/2010/main" val="0"/>
                 </a:ext>
                 <a:ext uri="{96DAC541-7B7A-43D3-8B79-37D633B846F1}">
-                  <asvg:svgBlip xmlns:asvg="http://schemas.microsoft.com/office/drawing/2016/SVG/main" xmlns="" r:embed="rId3"/>
+                  <asvg:svgBlip xmlns="" xmlns:asvg="http://schemas.microsoft.com/office/drawing/2016/SVG/main" r:embed="rId3"/>
                 </a:ext>
               </a:extLst>
             </a:blip>
@@ -33497,7 +34067,7 @@
                 <a14:useLocalDpi xmlns:a14="http://schemas.microsoft.com/office/drawing/2010/main" val="0"/>
               </a:ext>
               <a:ext uri="{96DAC541-7B7A-43D3-8B79-37D633B846F1}">
-                <asvg:svgBlip xmlns:asvg="http://schemas.microsoft.com/office/drawing/2016/SVG/main" xmlns="" r:embed="rId5"/>
+                <asvg:svgBlip xmlns="" xmlns:asvg="http://schemas.microsoft.com/office/drawing/2016/SVG/main" r:embed="rId5"/>
               </a:ext>
             </a:extLst>
           </a:blip>
@@ -33536,7 +34106,7 @@
                 <a14:useLocalDpi xmlns:a14="http://schemas.microsoft.com/office/drawing/2010/main" val="0"/>
               </a:ext>
               <a:ext uri="{96DAC541-7B7A-43D3-8B79-37D633B846F1}">
-                <asvg:svgBlip xmlns:asvg="http://schemas.microsoft.com/office/drawing/2016/SVG/main" xmlns="" r:embed="rId7"/>
+                <asvg:svgBlip xmlns="" xmlns:asvg="http://schemas.microsoft.com/office/drawing/2016/SVG/main" r:embed="rId7"/>
               </a:ext>
             </a:extLst>
           </a:blip>
@@ -33575,7 +34145,7 @@
                 <a14:useLocalDpi xmlns:a14="http://schemas.microsoft.com/office/drawing/2010/main" val="0"/>
               </a:ext>
               <a:ext uri="{96DAC541-7B7A-43D3-8B79-37D633B846F1}">
-                <asvg:svgBlip xmlns:asvg="http://schemas.microsoft.com/office/drawing/2016/SVG/main" xmlns="" r:embed="rId9"/>
+                <asvg:svgBlip xmlns="" xmlns:asvg="http://schemas.microsoft.com/office/drawing/2016/SVG/main" r:embed="rId9"/>
               </a:ext>
             </a:extLst>
           </a:blip>
@@ -33614,7 +34184,7 @@
                 <a14:useLocalDpi xmlns:a14="http://schemas.microsoft.com/office/drawing/2010/main" val="0"/>
               </a:ext>
               <a:ext uri="{96DAC541-7B7A-43D3-8B79-37D633B846F1}">
-                <asvg:svgBlip xmlns:asvg="http://schemas.microsoft.com/office/drawing/2016/SVG/main" xmlns="" r:embed="rId11"/>
+                <asvg:svgBlip xmlns="" xmlns:asvg="http://schemas.microsoft.com/office/drawing/2016/SVG/main" r:embed="rId11"/>
               </a:ext>
             </a:extLst>
           </a:blip>
@@ -34056,7 +34626,7 @@
                   <a14:useLocalDpi xmlns:a14="http://schemas.microsoft.com/office/drawing/2010/main" val="0"/>
                 </a:ext>
                 <a:ext uri="{96DAC541-7B7A-43D3-8B79-37D633B846F1}">
-                  <asvg:svgBlip xmlns:asvg="http://schemas.microsoft.com/office/drawing/2016/SVG/main" xmlns="" r:embed="rId4"/>
+                  <asvg:svgBlip xmlns="" xmlns:asvg="http://schemas.microsoft.com/office/drawing/2016/SVG/main" r:embed="rId4"/>
                 </a:ext>
               </a:extLst>
             </a:blip>
@@ -34152,7 +34722,7 @@
                   <a14:useLocalDpi xmlns:a14="http://schemas.microsoft.com/office/drawing/2010/main" val="0"/>
                 </a:ext>
                 <a:ext uri="{96DAC541-7B7A-43D3-8B79-37D633B846F1}">
-                  <asvg:svgBlip xmlns:asvg="http://schemas.microsoft.com/office/drawing/2016/SVG/main" xmlns="" r:embed="rId4"/>
+                  <asvg:svgBlip xmlns="" xmlns:asvg="http://schemas.microsoft.com/office/drawing/2016/SVG/main" r:embed="rId4"/>
                 </a:ext>
               </a:extLst>
             </a:blip>
@@ -34248,7 +34818,7 @@
                   <a14:useLocalDpi xmlns:a14="http://schemas.microsoft.com/office/drawing/2010/main" val="0"/>
                 </a:ext>
                 <a:ext uri="{96DAC541-7B7A-43D3-8B79-37D633B846F1}">
-                  <asvg:svgBlip xmlns:asvg="http://schemas.microsoft.com/office/drawing/2016/SVG/main" xmlns="" r:embed="rId4"/>
+                  <asvg:svgBlip xmlns="" xmlns:asvg="http://schemas.microsoft.com/office/drawing/2016/SVG/main" r:embed="rId4"/>
                 </a:ext>
               </a:extLst>
             </a:blip>
@@ -34344,7 +34914,7 @@
                   <a14:useLocalDpi xmlns:a14="http://schemas.microsoft.com/office/drawing/2010/main" val="0"/>
                 </a:ext>
                 <a:ext uri="{96DAC541-7B7A-43D3-8B79-37D633B846F1}">
-                  <asvg:svgBlip xmlns:asvg="http://schemas.microsoft.com/office/drawing/2016/SVG/main" xmlns="" r:embed="rId4"/>
+                  <asvg:svgBlip xmlns="" xmlns:asvg="http://schemas.microsoft.com/office/drawing/2016/SVG/main" r:embed="rId4"/>
                 </a:ext>
               </a:extLst>
             </a:blip>
@@ -35014,22 +35584,38 @@
           <a:p>
             <a:pPr marL="342900" lvl="1" indent="-342900"/>
             <a:r>
-              <a:rPr lang="ko-KR" altLang="en-US"/>
-              <a:t>원격저장소에 있는 프로젝트를 처음으로 내려받거나 다른 팀원의 저장소를 내 컴퓨터에 내려받을 때</a:t>
-            </a:r>
-            <a:endParaRPr lang="en-US" altLang="ko-KR"/>
+              <a:rPr lang="ko-KR" altLang="en-US" dirty="0"/>
+              <a:t>원격저장소에 있는 프로젝트를 처음으로 </a:t>
+            </a:r>
+            <a:r>
+              <a:rPr lang="ko-KR" altLang="en-US" dirty="0" err="1"/>
+              <a:t>내려받거나</a:t>
+            </a:r>
+            <a:r>
+              <a:rPr lang="ko-KR" altLang="en-US" dirty="0"/>
+              <a:t> 다른 팀원의 저장소를 내 컴퓨터에 </a:t>
+            </a:r>
+            <a:r>
+              <a:rPr lang="ko-KR" altLang="en-US" dirty="0" err="1"/>
+              <a:t>내려받을</a:t>
+            </a:r>
+            <a:r>
+              <a:rPr lang="ko-KR" altLang="en-US" dirty="0"/>
+              <a:t> 때</a:t>
+            </a:r>
+            <a:endParaRPr lang="en-US" altLang="ko-KR" dirty="0"/>
           </a:p>
           <a:p>
             <a:pPr marL="342900" lvl="1" indent="-342900"/>
             <a:r>
-              <a:rPr lang="ko-KR" altLang="en-US"/>
+              <a:rPr lang="ko-KR" altLang="en-US" dirty="0"/>
               <a:t>저장소 주소 찾는 방법</a:t>
             </a:r>
-            <a:endParaRPr lang="en-US" altLang="ko-KR"/>
+            <a:endParaRPr lang="en-US" altLang="ko-KR" dirty="0"/>
           </a:p>
           <a:p>
             <a:pPr marL="342900" lvl="1" indent="-342900"/>
-            <a:endParaRPr lang="en-US" altLang="ko-KR"/>
+            <a:endParaRPr lang="en-US" altLang="ko-KR" dirty="0"/>
           </a:p>
         </p:txBody>
       </p:sp>
@@ -38421,13 +39007,26 @@
           <a:lstStyle/>
           <a:p>
             <a:r>
+              <a:rPr lang="en-US" altLang="ko-KR" dirty="0">
+                <a:solidFill>
+                  <a:srgbClr val="00B050"/>
+                </a:solidFill>
+              </a:rPr>
+              <a:t>push</a:t>
+            </a:r>
+            <a:r>
               <a:rPr lang="en-US" altLang="ko-KR" dirty="0"/>
-              <a:t>push </a:t>
-            </a:r>
-            <a:r>
-              <a:rPr lang="ko-KR" altLang="en-US" dirty="0"/>
-              <a:t>명령어</a:t>
-            </a:r>
+              <a:t> </a:t>
+            </a:r>
+            <a:r>
+              <a:rPr lang="ko-KR" altLang="en-US" dirty="0" smtClean="0"/>
+              <a:t>명령어 좀 더 알아보자</a:t>
+            </a:r>
+            <a:r>
+              <a:rPr lang="en-US" altLang="ko-KR" dirty="0" smtClean="0"/>
+              <a:t>!</a:t>
+            </a:r>
+            <a:endParaRPr lang="ko-KR" altLang="en-US" dirty="0"/>
           </a:p>
         </p:txBody>
       </p:sp>
@@ -39181,7 +39780,7 @@
                   <a14:useLocalDpi xmlns:a14="http://schemas.microsoft.com/office/drawing/2010/main" val="0"/>
                 </a:ext>
                 <a:ext uri="{96DAC541-7B7A-43D3-8B79-37D633B846F1}">
-                  <asvg:svgBlip xmlns:asvg="http://schemas.microsoft.com/office/drawing/2016/SVG/main" xmlns="" r:embed="rId4"/>
+                  <asvg:svgBlip xmlns="" xmlns:asvg="http://schemas.microsoft.com/office/drawing/2016/SVG/main" r:embed="rId4"/>
                 </a:ext>
               </a:extLst>
             </a:blip>
@@ -39277,7 +39876,7 @@
                   <a14:useLocalDpi xmlns:a14="http://schemas.microsoft.com/office/drawing/2010/main" val="0"/>
                 </a:ext>
                 <a:ext uri="{96DAC541-7B7A-43D3-8B79-37D633B846F1}">
-                  <asvg:svgBlip xmlns:asvg="http://schemas.microsoft.com/office/drawing/2016/SVG/main" xmlns="" r:embed="rId4"/>
+                  <asvg:svgBlip xmlns="" xmlns:asvg="http://schemas.microsoft.com/office/drawing/2016/SVG/main" r:embed="rId4"/>
                 </a:ext>
               </a:extLst>
             </a:blip>
@@ -39447,7 +40046,7 @@
                   <a14:useLocalDpi xmlns:a14="http://schemas.microsoft.com/office/drawing/2010/main" val="0"/>
                 </a:ext>
                 <a:ext uri="{96DAC541-7B7A-43D3-8B79-37D633B846F1}">
-                  <asvg:svgBlip xmlns:asvg="http://schemas.microsoft.com/office/drawing/2016/SVG/main" xmlns="" r:embed="rId4"/>
+                  <asvg:svgBlip xmlns="" xmlns:asvg="http://schemas.microsoft.com/office/drawing/2016/SVG/main" r:embed="rId4"/>
                 </a:ext>
               </a:extLst>
             </a:blip>
@@ -39543,7 +40142,7 @@
                   <a14:useLocalDpi xmlns:a14="http://schemas.microsoft.com/office/drawing/2010/main" val="0"/>
                 </a:ext>
                 <a:ext uri="{96DAC541-7B7A-43D3-8B79-37D633B846F1}">
-                  <asvg:svgBlip xmlns:asvg="http://schemas.microsoft.com/office/drawing/2016/SVG/main" xmlns="" r:embed="rId4"/>
+                  <asvg:svgBlip xmlns="" xmlns:asvg="http://schemas.microsoft.com/office/drawing/2016/SVG/main" r:embed="rId4"/>
                 </a:ext>
               </a:extLst>
             </a:blip>
@@ -41840,6 +42439,271 @@
   <p:cSld>
     <p:spTree>
       <p:nvGrpSpPr>
+        <p:cNvPr id="1" name="">
+          <a:extLst>
+            <a:ext uri="{FF2B5EF4-FFF2-40B4-BE49-F238E27FC236}">
+              <a16:creationId xmlns:a16="http://schemas.microsoft.com/office/drawing/2014/main" id="{0CC1CEDB-82F4-A2F2-6087-6176C5D0A695}"/>
+            </a:ext>
+          </a:extLst>
+        </p:cNvPr>
+        <p:cNvGrpSpPr/>
+        <p:nvPr/>
+      </p:nvGrpSpPr>
+      <p:grpSpPr>
+        <a:xfrm>
+          <a:off x="0" y="0"/>
+          <a:ext cx="0" cy="0"/>
+          <a:chOff x="0" y="0"/>
+          <a:chExt cx="0" cy="0"/>
+        </a:xfrm>
+      </p:grpSpPr>
+      <p:sp>
+        <p:nvSpPr>
+          <p:cNvPr id="2" name="제목 1">
+            <a:extLst>
+              <a:ext uri="{FF2B5EF4-FFF2-40B4-BE49-F238E27FC236}">
+                <a16:creationId xmlns:a16="http://schemas.microsoft.com/office/drawing/2014/main" id="{B3CF0037-9199-60FC-011D-8E5DFE4234DA}"/>
+              </a:ext>
+            </a:extLst>
+          </p:cNvPr>
+          <p:cNvSpPr>
+            <a:spLocks noGrp="1"/>
+          </p:cNvSpPr>
+          <p:nvPr>
+            <p:ph type="title"/>
+          </p:nvPr>
+        </p:nvSpPr>
+        <p:spPr/>
+        <p:txBody>
+          <a:bodyPr/>
+          <a:lstStyle/>
+          <a:p>
+            <a:r>
+              <a:rPr lang="en-US" altLang="ko-KR" dirty="0"/>
+              <a:t>fetch, pull </a:t>
+            </a:r>
+            <a:r>
+              <a:rPr lang="ko-KR" altLang="en-US" dirty="0"/>
+              <a:t>명령어</a:t>
+            </a:r>
+          </a:p>
+        </p:txBody>
+      </p:sp>
+      <p:sp>
+        <p:nvSpPr>
+          <p:cNvPr id="3" name="내용 개체 틀 2">
+            <a:extLst>
+              <a:ext uri="{FF2B5EF4-FFF2-40B4-BE49-F238E27FC236}">
+                <a16:creationId xmlns:a16="http://schemas.microsoft.com/office/drawing/2014/main" id="{02F1E1E0-3DBA-A79B-86C3-A489DDC15C33}"/>
+              </a:ext>
+            </a:extLst>
+          </p:cNvPr>
+          <p:cNvSpPr>
+            <a:spLocks noGrp="1"/>
+          </p:cNvSpPr>
+          <p:nvPr>
+            <p:ph idx="1"/>
+          </p:nvPr>
+        </p:nvSpPr>
+        <p:spPr/>
+        <p:txBody>
+          <a:bodyPr/>
+          <a:lstStyle/>
+          <a:p>
+            <a:r>
+              <a:rPr lang="en-US" altLang="ko-KR" dirty="0"/>
+              <a:t>fetch</a:t>
+            </a:r>
+          </a:p>
+          <a:p>
+            <a:pPr lvl="1"/>
+            <a:r>
+              <a:rPr lang="en-US" altLang="ko-KR" dirty="0"/>
+              <a:t>git</a:t>
+            </a:r>
+            <a:r>
+              <a:rPr lang="ko-KR" altLang="en-US" dirty="0"/>
+              <a:t> </a:t>
+            </a:r>
+            <a:r>
+              <a:rPr lang="en-US" altLang="ko-KR" dirty="0"/>
+              <a:t>fetch </a:t>
+            </a:r>
+          </a:p>
+          <a:p>
+            <a:pPr lvl="1"/>
+            <a:r>
+              <a:rPr lang="en-US" altLang="ko-KR" dirty="0"/>
+              <a:t>Remote</a:t>
+            </a:r>
+            <a:r>
+              <a:rPr lang="ko-KR" altLang="en-US" dirty="0"/>
+              <a:t> </a:t>
+            </a:r>
+            <a:r>
+              <a:rPr lang="en-US" altLang="ko-KR" dirty="0"/>
+              <a:t>Repo.</a:t>
+            </a:r>
+            <a:r>
+              <a:rPr lang="ko-KR" altLang="en-US" dirty="0"/>
+              <a:t>의 </a:t>
+            </a:r>
+            <a:r>
+              <a:rPr lang="en-US" altLang="ko-KR" dirty="0"/>
+              <a:t>Branch </a:t>
+            </a:r>
+            <a:r>
+              <a:rPr lang="ko-KR" altLang="en-US" dirty="0"/>
+              <a:t>와 </a:t>
+            </a:r>
+            <a:r>
+              <a:rPr lang="en-US" altLang="ko-KR" dirty="0"/>
+              <a:t>Local Repo. Branch </a:t>
+            </a:r>
+            <a:r>
+              <a:rPr lang="ko-KR" altLang="en-US" dirty="0"/>
+              <a:t>사이의 변동 사항만 가져옴</a:t>
+            </a:r>
+            <a:endParaRPr lang="en-US" altLang="ko-KR" dirty="0"/>
+          </a:p>
+          <a:p>
+            <a:pPr lvl="1"/>
+            <a:r>
+              <a:rPr lang="en-US" altLang="ko-KR" dirty="0"/>
+              <a:t>Merge</a:t>
+            </a:r>
+            <a:r>
+              <a:rPr lang="ko-KR" altLang="en-US" dirty="0"/>
+              <a:t>가 이루어지지는 않음</a:t>
+            </a:r>
+            <a:endParaRPr lang="en-US" altLang="ko-KR" dirty="0"/>
+          </a:p>
+          <a:p>
+            <a:pPr lvl="1"/>
+            <a:endParaRPr lang="en-US" altLang="ko-KR" dirty="0"/>
+          </a:p>
+          <a:p>
+            <a:r>
+              <a:rPr lang="en-US" altLang="ko-KR" dirty="0"/>
+              <a:t>pull</a:t>
+            </a:r>
+          </a:p>
+          <a:p>
+            <a:pPr lvl="1"/>
+            <a:r>
+              <a:rPr lang="en-US" altLang="ko-KR" dirty="0"/>
+              <a:t>git pull</a:t>
+            </a:r>
+          </a:p>
+          <a:p>
+            <a:pPr lvl="1"/>
+            <a:r>
+              <a:rPr lang="en-US" altLang="ko-KR" dirty="0"/>
+              <a:t>Remote Repo.</a:t>
+            </a:r>
+            <a:r>
+              <a:rPr lang="ko-KR" altLang="en-US" dirty="0"/>
+              <a:t>의 </a:t>
+            </a:r>
+            <a:r>
+              <a:rPr lang="en-US" altLang="ko-KR" dirty="0"/>
+              <a:t>Branch </a:t>
+            </a:r>
+            <a:r>
+              <a:rPr lang="ko-KR" altLang="en-US" dirty="0"/>
+              <a:t>와 </a:t>
+            </a:r>
+            <a:r>
+              <a:rPr lang="en-US" altLang="ko-KR" dirty="0"/>
+              <a:t>Local Repo. Branch</a:t>
+            </a:r>
+            <a:r>
+              <a:rPr lang="ko-KR" altLang="en-US" dirty="0"/>
+              <a:t>를 </a:t>
+            </a:r>
+            <a:r>
+              <a:rPr lang="en-US" altLang="ko-KR" dirty="0"/>
+              <a:t>Merge</a:t>
+            </a:r>
+          </a:p>
+        </p:txBody>
+      </p:sp>
+      <p:sp>
+        <p:nvSpPr>
+          <p:cNvPr id="4" name="날짜 개체 틀 3">
+            <a:extLst>
+              <a:ext uri="{FF2B5EF4-FFF2-40B4-BE49-F238E27FC236}">
+                <a16:creationId xmlns:a16="http://schemas.microsoft.com/office/drawing/2014/main" id="{F0FDCA83-9094-1A25-F1EE-D910E6B6E64C}"/>
+              </a:ext>
+            </a:extLst>
+          </p:cNvPr>
+          <p:cNvSpPr>
+            <a:spLocks noGrp="1"/>
+          </p:cNvSpPr>
+          <p:nvPr>
+            <p:ph type="dt" sz="half" idx="10"/>
+          </p:nvPr>
+        </p:nvSpPr>
+        <p:spPr/>
+        <p:txBody>
+          <a:bodyPr/>
+          <a:lstStyle/>
+          <a:p>
+            <a:fld id="{0F78D9C4-20C1-4B15-A116-16DC77AD9A1E}" type="datetime1">
+              <a:rPr lang="ko-KR" altLang="en-US" smtClean="0"/>
+              <a:t>2025-04-22</a:t>
+            </a:fld>
+            <a:endParaRPr lang="ko-KR" altLang="en-US"/>
+          </a:p>
+        </p:txBody>
+      </p:sp>
+      <p:sp>
+        <p:nvSpPr>
+          <p:cNvPr id="5" name="슬라이드 번호 개체 틀 4">
+            <a:extLst>
+              <a:ext uri="{FF2B5EF4-FFF2-40B4-BE49-F238E27FC236}">
+                <a16:creationId xmlns:a16="http://schemas.microsoft.com/office/drawing/2014/main" id="{019277E8-A558-D6FD-2D7F-9EA7BEDE64A9}"/>
+              </a:ext>
+            </a:extLst>
+          </p:cNvPr>
+          <p:cNvSpPr>
+            <a:spLocks noGrp="1"/>
+          </p:cNvSpPr>
+          <p:nvPr>
+            <p:ph type="sldNum" sz="quarter" idx="12"/>
+          </p:nvPr>
+        </p:nvSpPr>
+        <p:spPr/>
+        <p:txBody>
+          <a:bodyPr/>
+          <a:lstStyle/>
+          <a:p>
+            <a:fld id="{083A2CE0-18CD-4102-B738-4ACFF9E68BA4}" type="slidenum">
+              <a:rPr lang="ko-KR" altLang="en-US" smtClean="0"/>
+              <a:t>63</a:t>
+            </a:fld>
+            <a:endParaRPr lang="ko-KR" altLang="en-US"/>
+          </a:p>
+        </p:txBody>
+      </p:sp>
+    </p:spTree>
+    <p:extLst>
+      <p:ext uri="{BB962C8B-B14F-4D97-AF65-F5344CB8AC3E}">
+        <p14:creationId xmlns:p14="http://schemas.microsoft.com/office/powerpoint/2010/main" val="485638779"/>
+      </p:ext>
+    </p:extLst>
+  </p:cSld>
+  <p:clrMapOvr>
+    <a:masterClrMapping/>
+  </p:clrMapOvr>
+</p:sld>
+</file>
+
+<file path=ppt/slides/slide64.xml><?xml version="1.0" encoding="utf-8"?>
+<p:sld xmlns:a="http://schemas.openxmlformats.org/drawingml/2006/main" xmlns:r="http://schemas.openxmlformats.org/officeDocument/2006/relationships" xmlns:p="http://schemas.openxmlformats.org/presentationml/2006/main">
+  <p:cSld>
+    <p:spTree>
+      <p:nvGrpSpPr>
         <p:cNvPr id="1" name=""/>
         <p:cNvGrpSpPr/>
         <p:nvPr/>
@@ -42200,7 +43064,7 @@
           <a:p>
             <a:fld id="{083A2CE0-18CD-4102-B738-4ACFF9E68BA4}" type="slidenum">
               <a:rPr lang="ko-KR" altLang="en-US" smtClean="0"/>
-              <a:t>63</a:t>
+              <a:t>64</a:t>
             </a:fld>
             <a:endParaRPr lang="ko-KR" altLang="en-US"/>
           </a:p>
@@ -42249,109 +43113,6 @@
 </p:sld>
 </file>
 
-<file path=ppt/slides/slide64.xml><?xml version="1.0" encoding="utf-8"?>
-<p:sld xmlns:a="http://schemas.openxmlformats.org/drawingml/2006/main" xmlns:r="http://schemas.openxmlformats.org/officeDocument/2006/relationships" xmlns:p="http://schemas.openxmlformats.org/presentationml/2006/main">
-  <p:cSld>
-    <p:spTree>
-      <p:nvGrpSpPr>
-        <p:cNvPr id="1" name=""/>
-        <p:cNvGrpSpPr/>
-        <p:nvPr/>
-      </p:nvGrpSpPr>
-      <p:grpSpPr>
-        <a:xfrm>
-          <a:off x="0" y="0"/>
-          <a:ext cx="0" cy="0"/>
-          <a:chOff x="0" y="0"/>
-          <a:chExt cx="0" cy="0"/>
-        </a:xfrm>
-      </p:grpSpPr>
-      <p:sp>
-        <p:nvSpPr>
-          <p:cNvPr id="3" name="TextBox 2">
-            <a:extLst>
-              <a:ext uri="{FF2B5EF4-FFF2-40B4-BE49-F238E27FC236}">
-                <a16:creationId xmlns:a16="http://schemas.microsoft.com/office/drawing/2014/main" id="{E103333C-F6B8-9752-6C28-4A0F3C96C564}"/>
-              </a:ext>
-            </a:extLst>
-          </p:cNvPr>
-          <p:cNvSpPr txBox="1"/>
-          <p:nvPr/>
-        </p:nvSpPr>
-        <p:spPr>
-          <a:xfrm>
-            <a:off x="592016" y="2875002"/>
-            <a:ext cx="11007968" cy="1107996"/>
-          </a:xfrm>
-          <a:prstGeom prst="rect">
-            <a:avLst/>
-          </a:prstGeom>
-          <a:noFill/>
-        </p:spPr>
-        <p:txBody>
-          <a:bodyPr wrap="square" rtlCol="0">
-            <a:spAutoFit/>
-          </a:bodyPr>
-          <a:lstStyle/>
-          <a:p>
-            <a:pPr algn="ctr"/>
-            <a:r>
-              <a:rPr lang="en-US" altLang="ko-KR" sz="6600">
-                <a:latin typeface="G마켓 산스 TTF Bold" panose="02000000000000000000" pitchFamily="2" charset="-127"/>
-                <a:ea typeface="G마켓 산스 TTF Bold" panose="02000000000000000000" pitchFamily="2" charset="-127"/>
-              </a:rPr>
-              <a:t>README.md</a:t>
-            </a:r>
-            <a:endParaRPr lang="ko-KR" altLang="en-US" sz="6600">
-              <a:latin typeface="G마켓 산스 TTF Bold" panose="02000000000000000000" pitchFamily="2" charset="-127"/>
-              <a:ea typeface="G마켓 산스 TTF Bold" panose="02000000000000000000" pitchFamily="2" charset="-127"/>
-            </a:endParaRPr>
-          </a:p>
-        </p:txBody>
-      </p:sp>
-      <p:sp>
-        <p:nvSpPr>
-          <p:cNvPr id="6" name="슬라이드 번호 개체 틀 5">
-            <a:extLst>
-              <a:ext uri="{FF2B5EF4-FFF2-40B4-BE49-F238E27FC236}">
-                <a16:creationId xmlns:a16="http://schemas.microsoft.com/office/drawing/2014/main" id="{C9C973D1-BDD5-8C04-DBD4-F0F467CB242D}"/>
-              </a:ext>
-            </a:extLst>
-          </p:cNvPr>
-          <p:cNvSpPr>
-            <a:spLocks noGrp="1"/>
-          </p:cNvSpPr>
-          <p:nvPr>
-            <p:ph type="sldNum" sz="quarter" idx="12"/>
-          </p:nvPr>
-        </p:nvSpPr>
-        <p:spPr/>
-        <p:txBody>
-          <a:bodyPr/>
-          <a:lstStyle/>
-          <a:p>
-            <a:fld id="{083A2CE0-18CD-4102-B738-4ACFF9E68BA4}" type="slidenum">
-              <a:rPr lang="ko-KR" altLang="en-US" smtClean="0"/>
-              <a:pPr/>
-              <a:t>64</a:t>
-            </a:fld>
-            <a:endParaRPr lang="ko-KR" altLang="en-US"/>
-          </a:p>
-        </p:txBody>
-      </p:sp>
-    </p:spTree>
-    <p:extLst>
-      <p:ext uri="{BB962C8B-B14F-4D97-AF65-F5344CB8AC3E}">
-        <p14:creationId xmlns:p14="http://schemas.microsoft.com/office/powerpoint/2010/main" val="1896709601"/>
-      </p:ext>
-    </p:extLst>
-  </p:cSld>
-  <p:clrMapOvr>
-    <a:masterClrMapping/>
-  </p:clrMapOvr>
-</p:sld>
-</file>
-
 <file path=ppt/slides/slide65.xml><?xml version="1.0" encoding="utf-8"?>
 <p:sld xmlns:a="http://schemas.openxmlformats.org/drawingml/2006/main" xmlns:r="http://schemas.openxmlformats.org/officeDocument/2006/relationships" xmlns:p="http://schemas.openxmlformats.org/presentationml/2006/main">
   <p:cSld>
@@ -42371,138 +43132,53 @@
       </p:grpSpPr>
       <p:sp>
         <p:nvSpPr>
-          <p:cNvPr id="2" name="제목 1">
-            <a:extLst>
-              <a:ext uri="{FF2B5EF4-FFF2-40B4-BE49-F238E27FC236}">
-                <a16:creationId xmlns:a16="http://schemas.microsoft.com/office/drawing/2014/main" id="{A24AB2F2-A5E0-AB9D-38EA-35ADDFA2CAA4}"/>
-              </a:ext>
-            </a:extLst>
-          </p:cNvPr>
-          <p:cNvSpPr>
-            <a:spLocks noGrp="1"/>
-          </p:cNvSpPr>
-          <p:nvPr>
-            <p:ph type="title"/>
-          </p:nvPr>
-        </p:nvSpPr>
-        <p:spPr/>
-        <p:txBody>
-          <a:bodyPr/>
-          <a:lstStyle/>
-          <a:p>
-            <a:r>
-              <a:rPr lang="en-US" altLang="ko-KR"/>
-              <a:t>README</a:t>
-            </a:r>
-            <a:endParaRPr lang="ko-KR" altLang="en-US"/>
-          </a:p>
-        </p:txBody>
-      </p:sp>
-      <p:sp>
-        <p:nvSpPr>
-          <p:cNvPr id="3" name="내용 개체 틀 2">
-            <a:extLst>
-              <a:ext uri="{FF2B5EF4-FFF2-40B4-BE49-F238E27FC236}">
-                <a16:creationId xmlns:a16="http://schemas.microsoft.com/office/drawing/2014/main" id="{BAC9AFAA-4049-7711-CFE3-FA8CAA188449}"/>
-              </a:ext>
-            </a:extLst>
-          </p:cNvPr>
-          <p:cNvSpPr>
-            <a:spLocks noGrp="1"/>
-          </p:cNvSpPr>
-          <p:nvPr>
-            <p:ph idx="1"/>
-          </p:nvPr>
+          <p:cNvPr id="3" name="TextBox 2">
+            <a:extLst>
+              <a:ext uri="{FF2B5EF4-FFF2-40B4-BE49-F238E27FC236}">
+                <a16:creationId xmlns:a16="http://schemas.microsoft.com/office/drawing/2014/main" id="{E103333C-F6B8-9752-6C28-4A0F3C96C564}"/>
+              </a:ext>
+            </a:extLst>
+          </p:cNvPr>
+          <p:cNvSpPr txBox="1"/>
+          <p:nvPr/>
         </p:nvSpPr>
         <p:spPr>
           <a:xfrm>
-            <a:off x="838200" y="1325563"/>
-            <a:ext cx="10515600" cy="4851400"/>
+            <a:off x="592016" y="2875002"/>
+            <a:ext cx="11007968" cy="1107996"/>
           </a:xfrm>
+          <a:prstGeom prst="rect">
+            <a:avLst/>
+          </a:prstGeom>
+          <a:noFill/>
         </p:spPr>
         <p:txBody>
-          <a:bodyPr/>
-          <a:lstStyle/>
-          <a:p>
-            <a:pPr>
-              <a:lnSpc>
-                <a:spcPct val="150000"/>
-              </a:lnSpc>
-            </a:pPr>
-            <a:r>
-              <a:rPr lang="en-US" altLang="ko-KR" dirty="0" err="1"/>
-              <a:t>Git</a:t>
-            </a:r>
-            <a:r>
-              <a:rPr lang="en-US" altLang="ko-KR" dirty="0"/>
-              <a:t> </a:t>
-            </a:r>
-            <a:r>
-              <a:rPr lang="ko-KR" altLang="en-US" dirty="0"/>
-              <a:t>저장소에서 프로젝트의 개요와 사용법을 문서화</a:t>
-            </a:r>
-            <a:endParaRPr lang="en-US" altLang="ko-KR" dirty="0"/>
-          </a:p>
-          <a:p>
-            <a:pPr>
-              <a:lnSpc>
-                <a:spcPct val="150000"/>
-              </a:lnSpc>
-            </a:pPr>
-            <a:r>
-              <a:rPr lang="en-US" altLang="ko-KR" dirty="0"/>
-              <a:t>Markdown </a:t>
-            </a:r>
-            <a:r>
-              <a:rPr lang="ko-KR" altLang="en-US" dirty="0"/>
-              <a:t>언어로 작성</a:t>
-            </a:r>
-            <a:endParaRPr lang="en-US" altLang="ko-KR" dirty="0"/>
-          </a:p>
-          <a:p>
-            <a:pPr>
-              <a:lnSpc>
-                <a:spcPct val="150000"/>
-              </a:lnSpc>
-            </a:pPr>
-            <a:r>
-              <a:rPr lang="ko-KR" altLang="en-US" dirty="0"/>
-              <a:t>프로젝트를 보는 사람들이 해당 프로젝트의 내용을 이해할 수 있도록 설명해주는 것이 일반적</a:t>
-            </a:r>
-            <a:endParaRPr lang="en-US" altLang="ko-KR" dirty="0"/>
-          </a:p>
-          <a:p>
-            <a:pPr>
-              <a:lnSpc>
-                <a:spcPct val="150000"/>
-              </a:lnSpc>
-            </a:pPr>
-            <a:r>
-              <a:rPr lang="en-US" altLang="ko-KR" dirty="0"/>
-              <a:t>README</a:t>
-            </a:r>
-            <a:r>
-              <a:rPr lang="ko-KR" altLang="en-US" dirty="0"/>
-              <a:t>를 작성하는 방법에 양식은 없음</a:t>
-            </a:r>
-            <a:endParaRPr lang="en-US" altLang="ko-KR" dirty="0"/>
-          </a:p>
-          <a:p>
-            <a:pPr>
-              <a:lnSpc>
-                <a:spcPct val="150000"/>
-              </a:lnSpc>
-            </a:pPr>
-            <a:endParaRPr lang="ko-KR" altLang="en-US" dirty="0"/>
-          </a:p>
-        </p:txBody>
-      </p:sp>
-      <p:sp>
-        <p:nvSpPr>
-          <p:cNvPr id="4" name="슬라이드 번호 개체 틀 3">
-            <a:extLst>
-              <a:ext uri="{FF2B5EF4-FFF2-40B4-BE49-F238E27FC236}">
-                <a16:creationId xmlns:a16="http://schemas.microsoft.com/office/drawing/2014/main" id="{57FD43E0-16C1-094C-0AC1-9566585EA9E7}"/>
+          <a:bodyPr wrap="square" rtlCol="0">
+            <a:spAutoFit/>
+          </a:bodyPr>
+          <a:lstStyle/>
+          <a:p>
+            <a:pPr algn="ctr"/>
+            <a:r>
+              <a:rPr lang="en-US" altLang="ko-KR" sz="6600">
+                <a:latin typeface="G마켓 산스 TTF Bold" panose="02000000000000000000" pitchFamily="2" charset="-127"/>
+                <a:ea typeface="G마켓 산스 TTF Bold" panose="02000000000000000000" pitchFamily="2" charset="-127"/>
+              </a:rPr>
+              <a:t>README.md</a:t>
+            </a:r>
+            <a:endParaRPr lang="ko-KR" altLang="en-US" sz="6600">
+              <a:latin typeface="G마켓 산스 TTF Bold" panose="02000000000000000000" pitchFamily="2" charset="-127"/>
+              <a:ea typeface="G마켓 산스 TTF Bold" panose="02000000000000000000" pitchFamily="2" charset="-127"/>
+            </a:endParaRPr>
+          </a:p>
+        </p:txBody>
+      </p:sp>
+      <p:sp>
+        <p:nvSpPr>
+          <p:cNvPr id="6" name="슬라이드 번호 개체 틀 5">
+            <a:extLst>
+              <a:ext uri="{FF2B5EF4-FFF2-40B4-BE49-F238E27FC236}">
+                <a16:creationId xmlns:a16="http://schemas.microsoft.com/office/drawing/2014/main" id="{C9C973D1-BDD5-8C04-DBD4-F0F467CB242D}"/>
               </a:ext>
             </a:extLst>
           </p:cNvPr>
@@ -42530,20 +43206,13 @@
     </p:spTree>
     <p:extLst>
       <p:ext uri="{BB962C8B-B14F-4D97-AF65-F5344CB8AC3E}">
-        <p14:creationId xmlns:p14="http://schemas.microsoft.com/office/powerpoint/2010/main" val="387671808"/>
+        <p14:creationId xmlns:p14="http://schemas.microsoft.com/office/powerpoint/2010/main" val="1896709601"/>
       </p:ext>
     </p:extLst>
   </p:cSld>
   <p:clrMapOvr>
     <a:masterClrMapping/>
   </p:clrMapOvr>
-  <p:timing>
-    <p:tnLst>
-      <p:par>
-        <p:cTn id="1" dur="indefinite" restart="never" nodeType="tmRoot"/>
-      </p:par>
-    </p:tnLst>
-  </p:timing>
 </p:sld>
 </file>
 
@@ -42569,7 +43238,7 @@
           <p:cNvPr id="2" name="제목 1">
             <a:extLst>
               <a:ext uri="{FF2B5EF4-FFF2-40B4-BE49-F238E27FC236}">
-                <a16:creationId xmlns:a16="http://schemas.microsoft.com/office/drawing/2014/main" id="{65B593AB-5185-9820-C506-23272634862C}"/>
+                <a16:creationId xmlns:a16="http://schemas.microsoft.com/office/drawing/2014/main" id="{A24AB2F2-A5E0-AB9D-38EA-35ADDFA2CAA4}"/>
               </a:ext>
             </a:extLst>
           </p:cNvPr>
@@ -42587,12 +43256,9 @@
           <a:p>
             <a:r>
               <a:rPr lang="en-US" altLang="ko-KR"/>
-              <a:t>Markdown </a:t>
-            </a:r>
-            <a:r>
-              <a:rPr lang="ko-KR" altLang="en-US"/>
-              <a:t>문법</a:t>
-            </a:r>
+              <a:t>README</a:t>
+            </a:r>
+            <a:endParaRPr lang="ko-KR" altLang="en-US"/>
           </a:p>
         </p:txBody>
       </p:sp>
@@ -42601,7 +43267,7 @@
           <p:cNvPr id="3" name="내용 개체 틀 2">
             <a:extLst>
               <a:ext uri="{FF2B5EF4-FFF2-40B4-BE49-F238E27FC236}">
-                <a16:creationId xmlns:a16="http://schemas.microsoft.com/office/drawing/2014/main" id="{B15C32B3-44A7-DA1C-F752-26C1382BBD5F}"/>
+                <a16:creationId xmlns:a16="http://schemas.microsoft.com/office/drawing/2014/main" id="{BAC9AFAA-4049-7711-CFE3-FA8CAA188449}"/>
               </a:ext>
             </a:extLst>
           </p:cNvPr>
@@ -42619,245 +43285,76 @@
           </a:xfrm>
         </p:spPr>
         <p:txBody>
-          <a:bodyPr>
-            <a:normAutofit lnSpcReduction="10000"/>
-          </a:bodyPr>
+          <a:bodyPr/>
           <a:lstStyle/>
           <a:p>
             <a:pPr>
               <a:lnSpc>
-                <a:spcPct val="120000"/>
+                <a:spcPct val="150000"/>
               </a:lnSpc>
             </a:pPr>
             <a:r>
+              <a:rPr lang="en-US" altLang="ko-KR" dirty="0" err="1"/>
+              <a:t>Git</a:t>
+            </a:r>
+            <a:r>
+              <a:rPr lang="en-US" altLang="ko-KR" dirty="0"/>
+              <a:t> </a:t>
+            </a:r>
+            <a:r>
               <a:rPr lang="ko-KR" altLang="en-US" dirty="0"/>
-              <a:t>제목 </a:t>
-            </a:r>
-            <a:r>
-              <a:rPr lang="en-US" altLang="ko-KR" dirty="0"/>
-              <a:t>: # 1</a:t>
-            </a:r>
-            <a:r>
-              <a:rPr lang="ko-KR" altLang="en-US" dirty="0"/>
-              <a:t> 개</a:t>
-            </a:r>
-            <a:r>
-              <a:rPr lang="en-US" altLang="ko-KR" dirty="0"/>
-              <a:t>~ 6 </a:t>
-            </a:r>
-            <a:r>
-              <a:rPr lang="ko-KR" altLang="en-US" dirty="0"/>
-              <a:t>개</a:t>
+              <a:t>저장소에서 프로젝트의 개요와 사용법을 문서화</a:t>
             </a:r>
             <a:endParaRPr lang="en-US" altLang="ko-KR" dirty="0"/>
           </a:p>
           <a:p>
             <a:pPr>
               <a:lnSpc>
-                <a:spcPct val="120000"/>
+                <a:spcPct val="150000"/>
               </a:lnSpc>
             </a:pPr>
             <a:r>
+              <a:rPr lang="en-US" altLang="ko-KR" dirty="0"/>
+              <a:t>Markdown </a:t>
+            </a:r>
+            <a:r>
               <a:rPr lang="ko-KR" altLang="en-US" dirty="0"/>
-              <a:t>기울임 </a:t>
-            </a:r>
-            <a:r>
-              <a:rPr lang="en-US" altLang="ko-KR" dirty="0"/>
-              <a:t>: *</a:t>
-            </a:r>
-            <a:r>
-              <a:rPr lang="ko-KR" altLang="en-US" dirty="0"/>
-              <a:t>기울임</a:t>
-            </a:r>
-            <a:r>
-              <a:rPr lang="en-US" altLang="ko-KR" dirty="0"/>
-              <a:t>* or _</a:t>
-            </a:r>
-            <a:r>
-              <a:rPr lang="ko-KR" altLang="en-US" dirty="0"/>
-              <a:t>기울임</a:t>
-            </a:r>
-            <a:r>
-              <a:rPr lang="en-US" altLang="ko-KR" dirty="0"/>
-              <a:t>_</a:t>
-            </a:r>
+              <a:t>언어로 작성</a:t>
+            </a:r>
+            <a:endParaRPr lang="en-US" altLang="ko-KR" dirty="0"/>
           </a:p>
           <a:p>
             <a:pPr>
               <a:lnSpc>
-                <a:spcPct val="120000"/>
+                <a:spcPct val="150000"/>
               </a:lnSpc>
             </a:pPr>
             <a:r>
               <a:rPr lang="ko-KR" altLang="en-US" dirty="0"/>
-              <a:t>굵게 </a:t>
-            </a:r>
-            <a:r>
-              <a:rPr lang="en-US" altLang="ko-KR" dirty="0"/>
-              <a:t>: **</a:t>
-            </a:r>
-            <a:r>
-              <a:rPr lang="ko-KR" altLang="en-US" dirty="0"/>
-              <a:t>굵게</a:t>
-            </a:r>
-            <a:r>
-              <a:rPr lang="en-US" altLang="ko-KR" dirty="0"/>
-              <a:t>** or</a:t>
-            </a:r>
-            <a:r>
-              <a:rPr lang="ko-KR" altLang="en-US" dirty="0"/>
-              <a:t> </a:t>
-            </a:r>
-            <a:r>
-              <a:rPr lang="en-US" altLang="ko-KR" dirty="0"/>
-              <a:t>__</a:t>
-            </a:r>
-            <a:r>
-              <a:rPr lang="ko-KR" altLang="en-US" dirty="0"/>
-              <a:t>굵게</a:t>
-            </a:r>
-            <a:r>
-              <a:rPr lang="en-US" altLang="ko-KR" dirty="0"/>
-              <a:t>__</a:t>
-            </a:r>
+              <a:t>프로젝트를 보는 사람들이 해당 프로젝트의 내용을 이해할 수 있도록 설명해주는 것이 일반적</a:t>
+            </a:r>
+            <a:endParaRPr lang="en-US" altLang="ko-KR" dirty="0"/>
           </a:p>
           <a:p>
             <a:pPr>
               <a:lnSpc>
-                <a:spcPct val="120000"/>
+                <a:spcPct val="150000"/>
               </a:lnSpc>
             </a:pPr>
             <a:r>
+              <a:rPr lang="en-US" altLang="ko-KR" dirty="0"/>
+              <a:t>README</a:t>
+            </a:r>
+            <a:r>
               <a:rPr lang="ko-KR" altLang="en-US" dirty="0"/>
-              <a:t>기울임</a:t>
-            </a:r>
-            <a:r>
-              <a:rPr lang="en-US" altLang="ko-KR" dirty="0"/>
-              <a:t>+</a:t>
-            </a:r>
-            <a:r>
-              <a:rPr lang="ko-KR" altLang="en-US" dirty="0"/>
-              <a:t>굵게 </a:t>
-            </a:r>
-            <a:r>
-              <a:rPr lang="en-US" altLang="ko-KR" dirty="0"/>
-              <a:t>: ***</a:t>
-            </a:r>
-            <a:r>
-              <a:rPr lang="ko-KR" altLang="en-US" dirty="0"/>
-              <a:t>기울임과 굵게</a:t>
-            </a:r>
-            <a:r>
-              <a:rPr lang="en-US" altLang="ko-KR" dirty="0"/>
-              <a:t>*** or ___</a:t>
-            </a:r>
-            <a:r>
-              <a:rPr lang="ko-KR" altLang="en-US" dirty="0"/>
-              <a:t>기울임과 굵게</a:t>
-            </a:r>
-            <a:r>
-              <a:rPr lang="en-US" altLang="ko-KR" dirty="0"/>
-              <a:t>___</a:t>
-            </a:r>
+              <a:t>를 작성하는 방법에 양식은 없음</a:t>
+            </a:r>
+            <a:endParaRPr lang="en-US" altLang="ko-KR" dirty="0"/>
           </a:p>
           <a:p>
             <a:pPr>
               <a:lnSpc>
-                <a:spcPct val="120000"/>
-              </a:lnSpc>
-            </a:pPr>
-            <a:r>
-              <a:rPr lang="ko-KR" altLang="en-US" dirty="0"/>
-              <a:t>취소선 </a:t>
-            </a:r>
-            <a:r>
-              <a:rPr lang="en-US" altLang="ko-KR" dirty="0"/>
-              <a:t>: ~~</a:t>
-            </a:r>
-            <a:r>
-              <a:rPr lang="ko-KR" altLang="en-US" dirty="0"/>
-              <a:t>취소선</a:t>
-            </a:r>
-            <a:r>
-              <a:rPr lang="en-US" altLang="ko-KR" dirty="0"/>
-              <a:t>~~</a:t>
-            </a:r>
-          </a:p>
-          <a:p>
-            <a:pPr>
-              <a:lnSpc>
-                <a:spcPct val="120000"/>
-              </a:lnSpc>
-            </a:pPr>
-            <a:r>
-              <a:rPr lang="ko-KR" altLang="en-US" dirty="0" err="1"/>
-              <a:t>이모지</a:t>
-            </a:r>
-            <a:r>
-              <a:rPr lang="ko-KR" altLang="en-US" dirty="0"/>
-              <a:t> </a:t>
-            </a:r>
-            <a:r>
-              <a:rPr lang="en-US" altLang="ko-KR" dirty="0"/>
-              <a:t>:  :smile:,  :heart:,  :rocket:</a:t>
-            </a:r>
-          </a:p>
-          <a:p>
-            <a:pPr lvl="1">
-              <a:lnSpc>
-                <a:spcPct val="120000"/>
-              </a:lnSpc>
-            </a:pPr>
-            <a:r>
-              <a:rPr lang="ko-KR" altLang="en-US" dirty="0" err="1">
-                <a:hlinkClick r:id="rId2"/>
-              </a:rPr>
-              <a:t>이모지</a:t>
-            </a:r>
-            <a:r>
-              <a:rPr lang="ko-KR" altLang="en-US" dirty="0">
-                <a:hlinkClick r:id="rId2"/>
-              </a:rPr>
-              <a:t> 이름 찾기</a:t>
-            </a:r>
-            <a:endParaRPr lang="en-US" altLang="ko-KR" dirty="0"/>
-          </a:p>
-          <a:p>
-            <a:pPr>
-              <a:lnSpc>
-                <a:spcPct val="120000"/>
-              </a:lnSpc>
-            </a:pPr>
-            <a:r>
-              <a:rPr lang="ko-KR" altLang="en-US" dirty="0" err="1"/>
-              <a:t>줄바꿈은</a:t>
-            </a:r>
-            <a:r>
-              <a:rPr lang="ko-KR" altLang="en-US" dirty="0"/>
-              <a:t> </a:t>
-            </a:r>
-            <a:r>
-              <a:rPr lang="ko-KR" altLang="en-US" dirty="0" err="1"/>
-              <a:t>엔터</a:t>
-            </a:r>
-            <a:r>
-              <a:rPr lang="ko-KR" altLang="en-US" dirty="0"/>
-              <a:t> </a:t>
-            </a:r>
-            <a:r>
-              <a:rPr lang="ko-KR" altLang="en-US" dirty="0" err="1"/>
-              <a:t>두번을</a:t>
-            </a:r>
-            <a:r>
-              <a:rPr lang="ko-KR" altLang="en-US" dirty="0"/>
-              <a:t> 눌러서 공백을 만들어 주기</a:t>
-            </a:r>
-            <a:endParaRPr lang="en-US" altLang="ko-KR" dirty="0"/>
-          </a:p>
-          <a:p>
-            <a:pPr>
-              <a:lnSpc>
-                <a:spcPct val="120000"/>
+                <a:spcPct val="150000"/>
               </a:lnSpc>
             </a:pPr>
             <a:endParaRPr lang="ko-KR" altLang="en-US" dirty="0"/>
@@ -42869,7 +43366,7 @@
           <p:cNvPr id="4" name="슬라이드 번호 개체 틀 3">
             <a:extLst>
               <a:ext uri="{FF2B5EF4-FFF2-40B4-BE49-F238E27FC236}">
-                <a16:creationId xmlns:a16="http://schemas.microsoft.com/office/drawing/2014/main" id="{F06751BC-F6F1-3AFA-7E59-EFC7403708E4}"/>
+                <a16:creationId xmlns:a16="http://schemas.microsoft.com/office/drawing/2014/main" id="{57FD43E0-16C1-094C-0AC1-9566585EA9E7}"/>
               </a:ext>
             </a:extLst>
           </p:cNvPr>
@@ -42897,7 +43394,7 @@
     </p:spTree>
     <p:extLst>
       <p:ext uri="{BB962C8B-B14F-4D97-AF65-F5344CB8AC3E}">
-        <p14:creationId xmlns:p14="http://schemas.microsoft.com/office/powerpoint/2010/main" val="1535628469"/>
+        <p14:creationId xmlns:p14="http://schemas.microsoft.com/office/powerpoint/2010/main" val="387671808"/>
       </p:ext>
     </p:extLst>
   </p:cSld>
@@ -42936,7 +43433,7 @@
           <p:cNvPr id="2" name="제목 1">
             <a:extLst>
               <a:ext uri="{FF2B5EF4-FFF2-40B4-BE49-F238E27FC236}">
-                <a16:creationId xmlns:a16="http://schemas.microsoft.com/office/drawing/2014/main" id="{CAD1DAD8-3FEC-0342-A911-C67F4597DE64}"/>
+                <a16:creationId xmlns:a16="http://schemas.microsoft.com/office/drawing/2014/main" id="{65B593AB-5185-9820-C506-23272634862C}"/>
               </a:ext>
             </a:extLst>
           </p:cNvPr>
@@ -42968,7 +43465,7 @@
           <p:cNvPr id="3" name="내용 개체 틀 2">
             <a:extLst>
               <a:ext uri="{FF2B5EF4-FFF2-40B4-BE49-F238E27FC236}">
-                <a16:creationId xmlns:a16="http://schemas.microsoft.com/office/drawing/2014/main" id="{3425ED10-9120-3C77-FBB0-F7DFAA4D6795}"/>
+                <a16:creationId xmlns:a16="http://schemas.microsoft.com/office/drawing/2014/main" id="{B15C32B3-44A7-DA1C-F752-26C1382BBD5F}"/>
               </a:ext>
             </a:extLst>
           </p:cNvPr>
@@ -42986,7 +43483,9 @@
           </a:xfrm>
         </p:spPr>
         <p:txBody>
-          <a:bodyPr/>
+          <a:bodyPr>
+            <a:normAutofit lnSpcReduction="10000"/>
+          </a:bodyPr>
           <a:lstStyle/>
           <a:p>
             <a:pPr>
@@ -42996,23 +43495,23 @@
             </a:pPr>
             <a:r>
               <a:rPr lang="ko-KR" altLang="en-US" dirty="0"/>
-              <a:t>인덱싱 </a:t>
+              <a:t>제목 </a:t>
             </a:r>
             <a:r>
               <a:rPr lang="en-US" altLang="ko-KR" dirty="0"/>
-              <a:t>: </a:t>
+              <a:t>: # 1</a:t>
             </a:r>
             <a:r>
               <a:rPr lang="ko-KR" altLang="en-US" dirty="0"/>
-              <a:t>순서 있는 인덱싱은 </a:t>
+              <a:t> 개</a:t>
             </a:r>
             <a:r>
               <a:rPr lang="en-US" altLang="ko-KR" dirty="0"/>
-              <a:t>1</a:t>
+              <a:t>~ 6 </a:t>
             </a:r>
             <a:r>
               <a:rPr lang="ko-KR" altLang="en-US" dirty="0"/>
-              <a:t>번부터 번호를 입력해주면 됨</a:t>
+              <a:t>개</a:t>
             </a:r>
             <a:endParaRPr lang="en-US" altLang="ko-KR" dirty="0"/>
           </a:p>
@@ -43023,22 +43522,149 @@
               </a:lnSpc>
             </a:pPr>
             <a:r>
+              <a:rPr lang="ko-KR" altLang="en-US" dirty="0"/>
+              <a:t>기울임 </a:t>
+            </a:r>
+            <a:r>
               <a:rPr lang="en-US" altLang="ko-KR" dirty="0"/>
-              <a:t>+, *, - : </a:t>
+              <a:t>: *</a:t>
             </a:r>
             <a:r>
               <a:rPr lang="ko-KR" altLang="en-US" dirty="0"/>
-              <a:t>순서 없는 인덱싱 </a:t>
-            </a:r>
+              <a:t>기울임</a:t>
+            </a:r>
+            <a:r>
+              <a:rPr lang="en-US" altLang="ko-KR" dirty="0"/>
+              <a:t>* or _</a:t>
+            </a:r>
+            <a:r>
+              <a:rPr lang="ko-KR" altLang="en-US" dirty="0"/>
+              <a:t>기울임</a:t>
+            </a:r>
+            <a:r>
+              <a:rPr lang="en-US" altLang="ko-KR" dirty="0"/>
+              <a:t>_</a:t>
+            </a:r>
+          </a:p>
+          <a:p>
+            <a:pPr>
+              <a:lnSpc>
+                <a:spcPct val="120000"/>
+              </a:lnSpc>
+            </a:pPr>
+            <a:r>
+              <a:rPr lang="ko-KR" altLang="en-US" dirty="0"/>
+              <a:t>굵게 </a:t>
+            </a:r>
+            <a:r>
+              <a:rPr lang="en-US" altLang="ko-KR" dirty="0"/>
+              <a:t>: **</a:t>
+            </a:r>
+            <a:r>
+              <a:rPr lang="ko-KR" altLang="en-US" dirty="0"/>
+              <a:t>굵게</a:t>
+            </a:r>
+            <a:r>
+              <a:rPr lang="en-US" altLang="ko-KR" dirty="0"/>
+              <a:t>** or</a:t>
+            </a:r>
+            <a:r>
+              <a:rPr lang="ko-KR" altLang="en-US" dirty="0"/>
+              <a:t> </a:t>
+            </a:r>
+            <a:r>
+              <a:rPr lang="en-US" altLang="ko-KR" dirty="0"/>
+              <a:t>__</a:t>
+            </a:r>
+            <a:r>
+              <a:rPr lang="ko-KR" altLang="en-US" dirty="0"/>
+              <a:t>굵게</a:t>
+            </a:r>
+            <a:r>
+              <a:rPr lang="en-US" altLang="ko-KR" dirty="0"/>
+              <a:t>__</a:t>
+            </a:r>
+          </a:p>
+          <a:p>
+            <a:pPr>
+              <a:lnSpc>
+                <a:spcPct val="120000"/>
+              </a:lnSpc>
+            </a:pPr>
+            <a:r>
+              <a:rPr lang="ko-KR" altLang="en-US" dirty="0"/>
+              <a:t>기울임</a:t>
+            </a:r>
+            <a:r>
+              <a:rPr lang="en-US" altLang="ko-KR" dirty="0"/>
+              <a:t>+</a:t>
+            </a:r>
+            <a:r>
+              <a:rPr lang="ko-KR" altLang="en-US" dirty="0"/>
+              <a:t>굵게 </a:t>
+            </a:r>
+            <a:r>
+              <a:rPr lang="en-US" altLang="ko-KR" dirty="0"/>
+              <a:t>: ***</a:t>
+            </a:r>
+            <a:r>
+              <a:rPr lang="ko-KR" altLang="en-US" dirty="0"/>
+              <a:t>기울임과 굵게</a:t>
+            </a:r>
+            <a:r>
+              <a:rPr lang="en-US" altLang="ko-KR" dirty="0"/>
+              <a:t>*** or ___</a:t>
+            </a:r>
+            <a:r>
+              <a:rPr lang="ko-KR" altLang="en-US" dirty="0"/>
+              <a:t>기울임과 굵게</a:t>
+            </a:r>
+            <a:r>
+              <a:rPr lang="en-US" altLang="ko-KR" dirty="0"/>
+              <a:t>___</a:t>
+            </a:r>
+          </a:p>
+          <a:p>
+            <a:pPr>
+              <a:lnSpc>
+                <a:spcPct val="120000"/>
+              </a:lnSpc>
+            </a:pPr>
+            <a:r>
+              <a:rPr lang="ko-KR" altLang="en-US" dirty="0"/>
+              <a:t>취소선 </a:t>
+            </a:r>
+            <a:r>
+              <a:rPr lang="en-US" altLang="ko-KR" dirty="0"/>
+              <a:t>: ~~</a:t>
+            </a:r>
+            <a:r>
+              <a:rPr lang="ko-KR" altLang="en-US" dirty="0"/>
+              <a:t>취소선</a:t>
+            </a:r>
+            <a:r>
+              <a:rPr lang="en-US" altLang="ko-KR" dirty="0"/>
+              <a:t>~~</a:t>
+            </a:r>
+          </a:p>
+          <a:p>
+            <a:pPr>
+              <a:lnSpc>
+                <a:spcPct val="120000"/>
+              </a:lnSpc>
+            </a:pPr>
             <a:r>
               <a:rPr lang="ko-KR" altLang="en-US" dirty="0" err="1"/>
-              <a:t>만들때</a:t>
+              <a:t>이모지</a:t>
             </a:r>
             <a:r>
               <a:rPr lang="ko-KR" altLang="en-US" dirty="0"/>
-              <a:t> 사용</a:t>
-            </a:r>
-            <a:endParaRPr lang="en-US" altLang="ko-KR" dirty="0"/>
+              <a:t> </a:t>
+            </a:r>
+            <a:r>
+              <a:rPr lang="en-US" altLang="ko-KR" dirty="0"/>
+              <a:t>:  :smile:,  :heart:,  :rocket:</a:t>
+            </a:r>
           </a:p>
           <a:p>
             <a:pPr lvl="1">
@@ -43047,28 +43673,16 @@
               </a:lnSpc>
             </a:pPr>
             <a:r>
-              <a:rPr lang="ko-KR" altLang="en-US" dirty="0" err="1"/>
-              <a:t>순서있던</a:t>
-            </a:r>
-            <a:r>
-              <a:rPr lang="ko-KR" altLang="en-US" dirty="0"/>
-              <a:t> </a:t>
-            </a:r>
-            <a:r>
-              <a:rPr lang="ko-KR" altLang="en-US" dirty="0" err="1"/>
-              <a:t>없던간에</a:t>
-            </a:r>
-            <a:r>
-              <a:rPr lang="ko-KR" altLang="en-US" dirty="0"/>
-              <a:t> </a:t>
-            </a:r>
-            <a:r>
-              <a:rPr lang="en-US" altLang="ko-KR" dirty="0"/>
-              <a:t>TAB</a:t>
-            </a:r>
-            <a:r>
-              <a:rPr lang="ko-KR" altLang="en-US" dirty="0"/>
-              <a:t>을 사용하여 하위 인덱싱을 제작할 수 도 있음</a:t>
+              <a:rPr lang="ko-KR" altLang="en-US" dirty="0" err="1">
+                <a:hlinkClick r:id="rId2"/>
+              </a:rPr>
+              <a:t>이모지</a:t>
+            </a:r>
+            <a:r>
+              <a:rPr lang="ko-KR" altLang="en-US" dirty="0">
+                <a:hlinkClick r:id="rId2"/>
+              </a:rPr>
+              <a:t> 이름 찾기</a:t>
             </a:r>
             <a:endParaRPr lang="en-US" altLang="ko-KR" dirty="0"/>
           </a:p>
@@ -43079,25 +43693,30 @@
               </a:lnSpc>
             </a:pPr>
             <a:r>
+              <a:rPr lang="ko-KR" altLang="en-US" dirty="0" err="1"/>
+              <a:t>줄바꿈은</a:t>
+            </a:r>
+            <a:r>
               <a:rPr lang="ko-KR" altLang="en-US" dirty="0"/>
-              <a:t>하이퍼링크 </a:t>
-            </a:r>
-            <a:r>
-              <a:rPr lang="en-US" altLang="ko-KR" dirty="0"/>
-              <a:t>: &lt;</a:t>
-            </a:r>
-            <a:r>
-              <a:rPr lang="en-US" altLang="ko-KR" dirty="0" err="1"/>
-              <a:t>url</a:t>
+              <a:t> </a:t>
+            </a:r>
+            <a:r>
+              <a:rPr lang="ko-KR" altLang="en-US" dirty="0" err="1"/>
+              <a:t>엔터</a:t>
             </a:r>
             <a:r>
               <a:rPr lang="ko-KR" altLang="en-US" dirty="0"/>
-              <a:t>주소</a:t>
-            </a:r>
-            <a:r>
-              <a:rPr lang="en-US" altLang="ko-KR" dirty="0"/>
-              <a:t>&gt;</a:t>
-            </a:r>
+              <a:t> </a:t>
+            </a:r>
+            <a:r>
+              <a:rPr lang="ko-KR" altLang="en-US" dirty="0" err="1"/>
+              <a:t>두번을</a:t>
+            </a:r>
+            <a:r>
+              <a:rPr lang="ko-KR" altLang="en-US" dirty="0"/>
+              <a:t> 눌러서 공백을 만들어 주기</a:t>
+            </a:r>
+            <a:endParaRPr lang="en-US" altLang="ko-KR" dirty="0"/>
           </a:p>
           <a:p>
             <a:pPr>
@@ -43105,109 +43724,7 @@
                 <a:spcPct val="120000"/>
               </a:lnSpc>
             </a:pPr>
-            <a:r>
-              <a:rPr lang="ko-KR" altLang="en-US" dirty="0"/>
-              <a:t>링크 </a:t>
-            </a:r>
-            <a:r>
-              <a:rPr lang="en-US" altLang="ko-KR" dirty="0"/>
-              <a:t>: [</a:t>
-            </a:r>
-            <a:r>
-              <a:rPr lang="ko-KR" altLang="en-US" dirty="0" err="1"/>
-              <a:t>링크이름</a:t>
-            </a:r>
-            <a:r>
-              <a:rPr lang="en-US" altLang="ko-KR" dirty="0"/>
-              <a:t>](</a:t>
-            </a:r>
-            <a:r>
-              <a:rPr lang="en-US" altLang="ko-KR" dirty="0" err="1"/>
-              <a:t>url</a:t>
-            </a:r>
-            <a:r>
-              <a:rPr lang="ko-KR" altLang="en-US" dirty="0"/>
-              <a:t>주소</a:t>
-            </a:r>
-            <a:r>
-              <a:rPr lang="en-US" altLang="ko-KR" dirty="0"/>
-              <a:t>, </a:t>
-            </a:r>
-            <a:r>
-              <a:rPr lang="ko-KR" altLang="en-US" dirty="0"/>
-              <a:t>옵션</a:t>
-            </a:r>
-            <a:r>
-              <a:rPr lang="en-US" altLang="ko-KR" dirty="0"/>
-              <a:t>)</a:t>
-            </a:r>
-          </a:p>
-          <a:p>
-            <a:pPr>
-              <a:lnSpc>
-                <a:spcPct val="120000"/>
-              </a:lnSpc>
-            </a:pPr>
-            <a:r>
-              <a:rPr lang="ko-KR" altLang="en-US" dirty="0"/>
-              <a:t>이미지 </a:t>
-            </a:r>
-            <a:r>
-              <a:rPr lang="en-US" altLang="ko-KR" dirty="0"/>
-              <a:t>: ![</a:t>
-            </a:r>
-            <a:r>
-              <a:rPr lang="ko-KR" altLang="en-US" dirty="0" err="1"/>
-              <a:t>이미지이름</a:t>
-            </a:r>
-            <a:r>
-              <a:rPr lang="en-US" altLang="ko-KR" dirty="0"/>
-              <a:t>](</a:t>
-            </a:r>
-            <a:r>
-              <a:rPr lang="ko-KR" altLang="en-US" dirty="0"/>
-              <a:t>이미지</a:t>
-            </a:r>
-            <a:r>
-              <a:rPr lang="en-US" altLang="ko-KR" dirty="0" err="1"/>
-              <a:t>url</a:t>
-            </a:r>
-            <a:r>
-              <a:rPr lang="ko-KR" altLang="en-US" dirty="0"/>
-              <a:t>주소</a:t>
-            </a:r>
-            <a:r>
-              <a:rPr lang="en-US" altLang="ko-KR" dirty="0"/>
-              <a:t>)</a:t>
-            </a:r>
-          </a:p>
-          <a:p>
-            <a:pPr>
-              <a:lnSpc>
-                <a:spcPct val="120000"/>
-              </a:lnSpc>
-            </a:pPr>
-            <a:r>
-              <a:rPr lang="ko-KR" altLang="en-US" dirty="0"/>
-              <a:t>인용 </a:t>
-            </a:r>
-            <a:r>
-              <a:rPr lang="en-US" altLang="ko-KR" dirty="0"/>
-              <a:t>: &gt; </a:t>
-            </a:r>
-            <a:r>
-              <a:rPr lang="ko-KR" altLang="en-US" dirty="0" err="1"/>
-              <a:t>인용내용</a:t>
-            </a:r>
-            <a:r>
-              <a:rPr lang="en-US" altLang="ko-KR" dirty="0"/>
-              <a:t>, &gt;&gt; </a:t>
-            </a:r>
-            <a:r>
-              <a:rPr lang="ko-KR" altLang="en-US" dirty="0" err="1"/>
-              <a:t>중첩인용</a:t>
-            </a:r>
-            <a:endParaRPr lang="en-US" altLang="ko-KR" dirty="0"/>
+            <a:endParaRPr lang="ko-KR" altLang="en-US" dirty="0"/>
           </a:p>
         </p:txBody>
       </p:sp>
@@ -43216,7 +43733,7 @@
           <p:cNvPr id="4" name="슬라이드 번호 개체 틀 3">
             <a:extLst>
               <a:ext uri="{FF2B5EF4-FFF2-40B4-BE49-F238E27FC236}">
-                <a16:creationId xmlns:a16="http://schemas.microsoft.com/office/drawing/2014/main" id="{941EA367-B76B-18E8-7668-CA2E640983CB}"/>
+                <a16:creationId xmlns:a16="http://schemas.microsoft.com/office/drawing/2014/main" id="{F06751BC-F6F1-3AFA-7E59-EFC7403708E4}"/>
               </a:ext>
             </a:extLst>
           </p:cNvPr>
@@ -43244,7 +43761,7 @@
     </p:spTree>
     <p:extLst>
       <p:ext uri="{BB962C8B-B14F-4D97-AF65-F5344CB8AC3E}">
-        <p14:creationId xmlns:p14="http://schemas.microsoft.com/office/powerpoint/2010/main" val="3187779221"/>
+        <p14:creationId xmlns:p14="http://schemas.microsoft.com/office/powerpoint/2010/main" val="1535628469"/>
       </p:ext>
     </p:extLst>
   </p:cSld>
@@ -43283,7 +43800,7 @@
           <p:cNvPr id="2" name="제목 1">
             <a:extLst>
               <a:ext uri="{FF2B5EF4-FFF2-40B4-BE49-F238E27FC236}">
-                <a16:creationId xmlns:a16="http://schemas.microsoft.com/office/drawing/2014/main" id="{56FEFF8F-CEFE-31A5-400F-CBEAD3C09124}"/>
+                <a16:creationId xmlns:a16="http://schemas.microsoft.com/office/drawing/2014/main" id="{CAD1DAD8-3FEC-0342-A911-C67F4597DE64}"/>
               </a:ext>
             </a:extLst>
           </p:cNvPr>
@@ -43315,7 +43832,7 @@
           <p:cNvPr id="3" name="내용 개체 틀 2">
             <a:extLst>
               <a:ext uri="{FF2B5EF4-FFF2-40B4-BE49-F238E27FC236}">
-                <a16:creationId xmlns:a16="http://schemas.microsoft.com/office/drawing/2014/main" id="{7F5FDCC4-5354-5AF3-E4E3-A25C34A7C226}"/>
+                <a16:creationId xmlns:a16="http://schemas.microsoft.com/office/drawing/2014/main" id="{3425ED10-9120-3C77-FBB0-F7DFAA4D6795}"/>
               </a:ext>
             </a:extLst>
           </p:cNvPr>
@@ -43343,20 +43860,25 @@
             </a:pPr>
             <a:r>
               <a:rPr lang="ko-KR" altLang="en-US" dirty="0"/>
-              <a:t>코드 </a:t>
+              <a:t>인덱싱 </a:t>
             </a:r>
             <a:r>
               <a:rPr lang="en-US" altLang="ko-KR" dirty="0"/>
-              <a:t>: `</a:t>
-            </a:r>
-            <a:r>
-              <a:rPr lang="ko-KR" altLang="en-US" dirty="0" err="1"/>
-              <a:t>한줄코드</a:t>
+              <a:t>: </a:t>
+            </a:r>
+            <a:r>
+              <a:rPr lang="ko-KR" altLang="en-US" dirty="0"/>
+              <a:t>순서 있는 인덱싱은 </a:t>
             </a:r>
             <a:r>
               <a:rPr lang="en-US" altLang="ko-KR" dirty="0"/>
-              <a:t>`</a:t>
-            </a:r>
+              <a:t>1</a:t>
+            </a:r>
+            <a:r>
+              <a:rPr lang="ko-KR" altLang="en-US" dirty="0"/>
+              <a:t>번부터 번호를 입력해주면 됨</a:t>
+            </a:r>
+            <a:endParaRPr lang="en-US" altLang="ko-KR" dirty="0"/>
           </a:p>
           <a:p>
             <a:pPr>
@@ -43365,20 +43887,52 @@
               </a:lnSpc>
             </a:pPr>
             <a:r>
+              <a:rPr lang="en-US" altLang="ko-KR" dirty="0"/>
+              <a:t>+, *, - : </a:t>
+            </a:r>
+            <a:r>
+              <a:rPr lang="ko-KR" altLang="en-US" dirty="0"/>
+              <a:t>순서 없는 인덱싱 </a:t>
+            </a:r>
+            <a:r>
               <a:rPr lang="ko-KR" altLang="en-US" dirty="0" err="1"/>
-              <a:t>여러줄</a:t>
+              <a:t>만들때</a:t>
             </a:r>
             <a:r>
               <a:rPr lang="ko-KR" altLang="en-US" dirty="0"/>
-              <a:t> 코드 </a:t>
+              <a:t> 사용</a:t>
+            </a:r>
+            <a:endParaRPr lang="en-US" altLang="ko-KR" dirty="0"/>
+          </a:p>
+          <a:p>
+            <a:pPr lvl="1">
+              <a:lnSpc>
+                <a:spcPct val="120000"/>
+              </a:lnSpc>
+            </a:pPr>
+            <a:r>
+              <a:rPr lang="ko-KR" altLang="en-US" dirty="0" err="1"/>
+              <a:t>순서있던</a:t>
+            </a:r>
+            <a:r>
+              <a:rPr lang="ko-KR" altLang="en-US" dirty="0"/>
+              <a:t> </a:t>
+            </a:r>
+            <a:r>
+              <a:rPr lang="ko-KR" altLang="en-US" dirty="0" err="1"/>
+              <a:t>없던간에</a:t>
+            </a:r>
+            <a:r>
+              <a:rPr lang="ko-KR" altLang="en-US" dirty="0"/>
+              <a:t> </a:t>
             </a:r>
             <a:r>
               <a:rPr lang="en-US" altLang="ko-KR" dirty="0"/>
-              <a:t>: ```</a:t>
-            </a:r>
-            <a:r>
-              <a:rPr lang="ko-KR" altLang="en-US" dirty="0" err="1"/>
-              <a:t>언어명</a:t>
+              <a:t>TAB</a:t>
+            </a:r>
+            <a:r>
+              <a:rPr lang="ko-KR" altLang="en-US" dirty="0"/>
+              <a:t>을 사용하여 하위 인덱싱을 제작할 수 도 있음</a:t>
             </a:r>
             <a:endParaRPr lang="en-US" altLang="ko-KR" dirty="0"/>
           </a:p>
@@ -43390,11 +43944,23 @@
             </a:pPr>
             <a:r>
               <a:rPr lang="ko-KR" altLang="en-US" dirty="0"/>
-              <a:t>수평선 </a:t>
+              <a:t>하이퍼링크 </a:t>
             </a:r>
             <a:r>
               <a:rPr lang="en-US" altLang="ko-KR" dirty="0"/>
-              <a:t>: ---, ***, ___</a:t>
+              <a:t>: &lt;</a:t>
+            </a:r>
+            <a:r>
+              <a:rPr lang="en-US" altLang="ko-KR" dirty="0" err="1"/>
+              <a:t>url</a:t>
+            </a:r>
+            <a:r>
+              <a:rPr lang="ko-KR" altLang="en-US" dirty="0"/>
+              <a:t>주소</a:t>
+            </a:r>
+            <a:r>
+              <a:rPr lang="en-US" altLang="ko-KR" dirty="0"/>
+              <a:t>&gt;</a:t>
             </a:r>
           </a:p>
           <a:p>
@@ -43405,25 +43971,40 @@
             </a:pPr>
             <a:r>
               <a:rPr lang="ko-KR" altLang="en-US" dirty="0"/>
-              <a:t>체크박스 </a:t>
+              <a:t>링크 </a:t>
             </a:r>
             <a:r>
               <a:rPr lang="en-US" altLang="ko-KR" dirty="0"/>
-              <a:t>: [ ] </a:t>
+              <a:t>: [</a:t>
             </a:r>
             <a:r>
               <a:rPr lang="ko-KR" altLang="en-US" dirty="0" err="1"/>
-              <a:t>빈체크</a:t>
+              <a:t>링크이름</a:t>
             </a:r>
             <a:r>
               <a:rPr lang="en-US" altLang="ko-KR" dirty="0"/>
-              <a:t>, [x] </a:t>
+              <a:t>](</a:t>
+            </a:r>
+            <a:r>
+              <a:rPr lang="en-US" altLang="ko-KR" dirty="0" err="1"/>
+              <a:t>url</a:t>
             </a:r>
             <a:r>
               <a:rPr lang="ko-KR" altLang="en-US" dirty="0"/>
-              <a:t>체크</a:t>
-            </a:r>
-            <a:endParaRPr lang="en-US" altLang="ko-KR" dirty="0"/>
+              <a:t>주소</a:t>
+            </a:r>
+            <a:r>
+              <a:rPr lang="en-US" altLang="ko-KR" dirty="0"/>
+              <a:t>, </a:t>
+            </a:r>
+            <a:r>
+              <a:rPr lang="ko-KR" altLang="en-US" dirty="0"/>
+              <a:t>옵션</a:t>
+            </a:r>
+            <a:r>
+              <a:rPr lang="en-US" altLang="ko-KR" dirty="0"/>
+              <a:t>)</a:t>
+            </a:r>
           </a:p>
           <a:p>
             <a:pPr>
@@ -43433,14 +44014,63 @@
             </a:pPr>
             <a:r>
               <a:rPr lang="ko-KR" altLang="en-US" dirty="0"/>
-              <a:t>표 </a:t>
+              <a:t>이미지 </a:t>
             </a:r>
             <a:r>
               <a:rPr lang="en-US" altLang="ko-KR" dirty="0"/>
-              <a:t>:  </a:t>
-            </a:r>
-          </a:p>
-          <a:p>
+              <a:t>: ![</a:t>
+            </a:r>
+            <a:r>
+              <a:rPr lang="ko-KR" altLang="en-US" dirty="0" err="1"/>
+              <a:t>이미지이름</a:t>
+            </a:r>
+            <a:r>
+              <a:rPr lang="en-US" altLang="ko-KR" dirty="0"/>
+              <a:t>](</a:t>
+            </a:r>
+            <a:r>
+              <a:rPr lang="ko-KR" altLang="en-US" dirty="0"/>
+              <a:t>이미지</a:t>
+            </a:r>
+            <a:r>
+              <a:rPr lang="en-US" altLang="ko-KR" dirty="0" err="1"/>
+              <a:t>url</a:t>
+            </a:r>
+            <a:r>
+              <a:rPr lang="ko-KR" altLang="en-US" dirty="0"/>
+              <a:t>주소</a:t>
+            </a:r>
+            <a:r>
+              <a:rPr lang="en-US" altLang="ko-KR" dirty="0"/>
+              <a:t>)</a:t>
+            </a:r>
+          </a:p>
+          <a:p>
+            <a:pPr>
+              <a:lnSpc>
+                <a:spcPct val="120000"/>
+              </a:lnSpc>
+            </a:pPr>
+            <a:r>
+              <a:rPr lang="ko-KR" altLang="en-US" dirty="0"/>
+              <a:t>인용 </a:t>
+            </a:r>
+            <a:r>
+              <a:rPr lang="en-US" altLang="ko-KR" dirty="0"/>
+              <a:t>: &gt; </a:t>
+            </a:r>
+            <a:r>
+              <a:rPr lang="ko-KR" altLang="en-US" dirty="0" err="1"/>
+              <a:t>인용내용</a:t>
+            </a:r>
+            <a:r>
+              <a:rPr lang="en-US" altLang="ko-KR" dirty="0"/>
+              <a:t>, &gt;&gt; </a:t>
+            </a:r>
+            <a:r>
+              <a:rPr lang="ko-KR" altLang="en-US" dirty="0" err="1"/>
+              <a:t>중첩인용</a:t>
+            </a:r>
             <a:endParaRPr lang="en-US" altLang="ko-KR" dirty="0"/>
           </a:p>
         </p:txBody>
@@ -43450,7 +44080,7 @@
           <p:cNvPr id="4" name="슬라이드 번호 개체 틀 3">
             <a:extLst>
               <a:ext uri="{FF2B5EF4-FFF2-40B4-BE49-F238E27FC236}">
-                <a16:creationId xmlns:a16="http://schemas.microsoft.com/office/drawing/2014/main" id="{90854D7E-2FB8-78E8-6128-0F546750E6DF}"/>
+                <a16:creationId xmlns:a16="http://schemas.microsoft.com/office/drawing/2014/main" id="{941EA367-B76B-18E8-7668-CA2E640983CB}"/>
               </a:ext>
             </a:extLst>
           </p:cNvPr>
@@ -43470,6 +44100,240 @@
               <a:rPr lang="ko-KR" altLang="en-US" smtClean="0"/>
               <a:pPr/>
               <a:t>68</a:t>
+            </a:fld>
+            <a:endParaRPr lang="ko-KR" altLang="en-US"/>
+          </a:p>
+        </p:txBody>
+      </p:sp>
+    </p:spTree>
+    <p:extLst>
+      <p:ext uri="{BB962C8B-B14F-4D97-AF65-F5344CB8AC3E}">
+        <p14:creationId xmlns:p14="http://schemas.microsoft.com/office/powerpoint/2010/main" val="3187779221"/>
+      </p:ext>
+    </p:extLst>
+  </p:cSld>
+  <p:clrMapOvr>
+    <a:masterClrMapping/>
+  </p:clrMapOvr>
+  <p:timing>
+    <p:tnLst>
+      <p:par>
+        <p:cTn id="1" dur="indefinite" restart="never" nodeType="tmRoot"/>
+      </p:par>
+    </p:tnLst>
+  </p:timing>
+</p:sld>
+</file>
+
+<file path=ppt/slides/slide69.xml><?xml version="1.0" encoding="utf-8"?>
+<p:sld xmlns:a="http://schemas.openxmlformats.org/drawingml/2006/main" xmlns:r="http://schemas.openxmlformats.org/officeDocument/2006/relationships" xmlns:p="http://schemas.openxmlformats.org/presentationml/2006/main">
+  <p:cSld>
+    <p:spTree>
+      <p:nvGrpSpPr>
+        <p:cNvPr id="1" name=""/>
+        <p:cNvGrpSpPr/>
+        <p:nvPr/>
+      </p:nvGrpSpPr>
+      <p:grpSpPr>
+        <a:xfrm>
+          <a:off x="0" y="0"/>
+          <a:ext cx="0" cy="0"/>
+          <a:chOff x="0" y="0"/>
+          <a:chExt cx="0" cy="0"/>
+        </a:xfrm>
+      </p:grpSpPr>
+      <p:sp>
+        <p:nvSpPr>
+          <p:cNvPr id="2" name="제목 1">
+            <a:extLst>
+              <a:ext uri="{FF2B5EF4-FFF2-40B4-BE49-F238E27FC236}">
+                <a16:creationId xmlns:a16="http://schemas.microsoft.com/office/drawing/2014/main" id="{56FEFF8F-CEFE-31A5-400F-CBEAD3C09124}"/>
+              </a:ext>
+            </a:extLst>
+          </p:cNvPr>
+          <p:cNvSpPr>
+            <a:spLocks noGrp="1"/>
+          </p:cNvSpPr>
+          <p:nvPr>
+            <p:ph type="title"/>
+          </p:nvPr>
+        </p:nvSpPr>
+        <p:spPr/>
+        <p:txBody>
+          <a:bodyPr/>
+          <a:lstStyle/>
+          <a:p>
+            <a:r>
+              <a:rPr lang="en-US" altLang="ko-KR"/>
+              <a:t>Markdown </a:t>
+            </a:r>
+            <a:r>
+              <a:rPr lang="ko-KR" altLang="en-US"/>
+              <a:t>문법</a:t>
+            </a:r>
+          </a:p>
+        </p:txBody>
+      </p:sp>
+      <p:sp>
+        <p:nvSpPr>
+          <p:cNvPr id="3" name="내용 개체 틀 2">
+            <a:extLst>
+              <a:ext uri="{FF2B5EF4-FFF2-40B4-BE49-F238E27FC236}">
+                <a16:creationId xmlns:a16="http://schemas.microsoft.com/office/drawing/2014/main" id="{7F5FDCC4-5354-5AF3-E4E3-A25C34A7C226}"/>
+              </a:ext>
+            </a:extLst>
+          </p:cNvPr>
+          <p:cNvSpPr>
+            <a:spLocks noGrp="1"/>
+          </p:cNvSpPr>
+          <p:nvPr>
+            <p:ph idx="1"/>
+          </p:nvPr>
+        </p:nvSpPr>
+        <p:spPr>
+          <a:xfrm>
+            <a:off x="838200" y="1325563"/>
+            <a:ext cx="10515600" cy="4851400"/>
+          </a:xfrm>
+        </p:spPr>
+        <p:txBody>
+          <a:bodyPr/>
+          <a:lstStyle/>
+          <a:p>
+            <a:pPr>
+              <a:lnSpc>
+                <a:spcPct val="120000"/>
+              </a:lnSpc>
+            </a:pPr>
+            <a:r>
+              <a:rPr lang="ko-KR" altLang="en-US" dirty="0"/>
+              <a:t>코드 </a:t>
+            </a:r>
+            <a:r>
+              <a:rPr lang="en-US" altLang="ko-KR" dirty="0"/>
+              <a:t>: `</a:t>
+            </a:r>
+            <a:r>
+              <a:rPr lang="ko-KR" altLang="en-US" dirty="0" err="1"/>
+              <a:t>한줄코드</a:t>
+            </a:r>
+            <a:r>
+              <a:rPr lang="en-US" altLang="ko-KR" dirty="0"/>
+              <a:t>`</a:t>
+            </a:r>
+          </a:p>
+          <a:p>
+            <a:pPr>
+              <a:lnSpc>
+                <a:spcPct val="120000"/>
+              </a:lnSpc>
+            </a:pPr>
+            <a:r>
+              <a:rPr lang="ko-KR" altLang="en-US" dirty="0" err="1"/>
+              <a:t>여러줄</a:t>
+            </a:r>
+            <a:r>
+              <a:rPr lang="ko-KR" altLang="en-US" dirty="0"/>
+              <a:t> 코드 </a:t>
+            </a:r>
+            <a:r>
+              <a:rPr lang="en-US" altLang="ko-KR" dirty="0"/>
+              <a:t>: ```</a:t>
+            </a:r>
+            <a:r>
+              <a:rPr lang="ko-KR" altLang="en-US" dirty="0" err="1"/>
+              <a:t>언어명</a:t>
+            </a:r>
+            <a:endParaRPr lang="en-US" altLang="ko-KR" dirty="0"/>
+          </a:p>
+          <a:p>
+            <a:pPr>
+              <a:lnSpc>
+                <a:spcPct val="120000"/>
+              </a:lnSpc>
+            </a:pPr>
+            <a:r>
+              <a:rPr lang="ko-KR" altLang="en-US" dirty="0"/>
+              <a:t>수평선 </a:t>
+            </a:r>
+            <a:r>
+              <a:rPr lang="en-US" altLang="ko-KR" dirty="0"/>
+              <a:t>: ---, ***, ___</a:t>
+            </a:r>
+          </a:p>
+          <a:p>
+            <a:pPr>
+              <a:lnSpc>
+                <a:spcPct val="120000"/>
+              </a:lnSpc>
+            </a:pPr>
+            <a:r>
+              <a:rPr lang="ko-KR" altLang="en-US" dirty="0"/>
+              <a:t>체크박스 </a:t>
+            </a:r>
+            <a:r>
+              <a:rPr lang="en-US" altLang="ko-KR" dirty="0"/>
+              <a:t>: [ ] </a:t>
+            </a:r>
+            <a:r>
+              <a:rPr lang="ko-KR" altLang="en-US" dirty="0" err="1"/>
+              <a:t>빈체크</a:t>
+            </a:r>
+            <a:r>
+              <a:rPr lang="en-US" altLang="ko-KR" dirty="0"/>
+              <a:t>, [x] </a:t>
+            </a:r>
+            <a:r>
+              <a:rPr lang="ko-KR" altLang="en-US" dirty="0"/>
+              <a:t>체크</a:t>
+            </a:r>
+            <a:endParaRPr lang="en-US" altLang="ko-KR" dirty="0"/>
+          </a:p>
+          <a:p>
+            <a:pPr>
+              <a:lnSpc>
+                <a:spcPct val="120000"/>
+              </a:lnSpc>
+            </a:pPr>
+            <a:r>
+              <a:rPr lang="ko-KR" altLang="en-US" dirty="0"/>
+              <a:t>표 </a:t>
+            </a:r>
+            <a:r>
+              <a:rPr lang="en-US" altLang="ko-KR" dirty="0"/>
+              <a:t>:  </a:t>
+            </a:r>
+          </a:p>
+          <a:p>
+            <a:endParaRPr lang="en-US" altLang="ko-KR" dirty="0"/>
+          </a:p>
+        </p:txBody>
+      </p:sp>
+      <p:sp>
+        <p:nvSpPr>
+          <p:cNvPr id="4" name="슬라이드 번호 개체 틀 3">
+            <a:extLst>
+              <a:ext uri="{FF2B5EF4-FFF2-40B4-BE49-F238E27FC236}">
+                <a16:creationId xmlns:a16="http://schemas.microsoft.com/office/drawing/2014/main" id="{90854D7E-2FB8-78E8-6128-0F546750E6DF}"/>
+              </a:ext>
+            </a:extLst>
+          </p:cNvPr>
+          <p:cNvSpPr>
+            <a:spLocks noGrp="1"/>
+          </p:cNvSpPr>
+          <p:nvPr>
+            <p:ph type="sldNum" sz="quarter" idx="12"/>
+          </p:nvPr>
+        </p:nvSpPr>
+        <p:spPr/>
+        <p:txBody>
+          <a:bodyPr/>
+          <a:lstStyle/>
+          <a:p>
+            <a:fld id="{083A2CE0-18CD-4102-B738-4ACFF9E68BA4}" type="slidenum">
+              <a:rPr lang="ko-KR" altLang="en-US" smtClean="0"/>
+              <a:pPr/>
+              <a:t>69</a:t>
             </a:fld>
             <a:endParaRPr lang="ko-KR" altLang="en-US"/>
           </a:p>
@@ -43671,7 +44535,7 @@
                 <a14:useLocalDpi xmlns:a14="http://schemas.microsoft.com/office/drawing/2010/main" val="0"/>
               </a:ext>
               <a:ext uri="{96DAC541-7B7A-43D3-8B79-37D633B846F1}">
-                <asvg:svgBlip xmlns:asvg="http://schemas.microsoft.com/office/drawing/2016/SVG/main" xmlns="" r:embed="rId4"/>
+                <asvg:svgBlip xmlns="" xmlns:asvg="http://schemas.microsoft.com/office/drawing/2016/SVG/main" r:embed="rId4"/>
               </a:ext>
             </a:extLst>
           </a:blip>
@@ -43710,7 +44574,7 @@
                 <a14:useLocalDpi xmlns:a14="http://schemas.microsoft.com/office/drawing/2010/main" val="0"/>
               </a:ext>
               <a:ext uri="{96DAC541-7B7A-43D3-8B79-37D633B846F1}">
-                <asvg:svgBlip xmlns:asvg="http://schemas.microsoft.com/office/drawing/2016/SVG/main" xmlns="" r:embed="rId6"/>
+                <asvg:svgBlip xmlns="" xmlns:asvg="http://schemas.microsoft.com/office/drawing/2016/SVG/main" r:embed="rId6"/>
               </a:ext>
             </a:extLst>
           </a:blip>
@@ -43749,7 +44613,7 @@
                 <a14:useLocalDpi xmlns:a14="http://schemas.microsoft.com/office/drawing/2010/main" val="0"/>
               </a:ext>
               <a:ext uri="{96DAC541-7B7A-43D3-8B79-37D633B846F1}">
-                <asvg:svgBlip xmlns:asvg="http://schemas.microsoft.com/office/drawing/2016/SVG/main" xmlns="" r:embed="rId8"/>
+                <asvg:svgBlip xmlns="" xmlns:asvg="http://schemas.microsoft.com/office/drawing/2016/SVG/main" r:embed="rId8"/>
               </a:ext>
             </a:extLst>
           </a:blip>
@@ -43788,7 +44652,7 @@
                 <a14:useLocalDpi xmlns:a14="http://schemas.microsoft.com/office/drawing/2010/main" val="0"/>
               </a:ext>
               <a:ext uri="{96DAC541-7B7A-43D3-8B79-37D633B846F1}">
-                <asvg:svgBlip xmlns:asvg="http://schemas.microsoft.com/office/drawing/2016/SVG/main" xmlns="" r:embed="rId10"/>
+                <asvg:svgBlip xmlns="" xmlns:asvg="http://schemas.microsoft.com/office/drawing/2016/SVG/main" r:embed="rId10"/>
               </a:ext>
             </a:extLst>
           </a:blip>
@@ -43827,7 +44691,7 @@
                 <a14:useLocalDpi xmlns:a14="http://schemas.microsoft.com/office/drawing/2010/main" val="0"/>
               </a:ext>
               <a:ext uri="{96DAC541-7B7A-43D3-8B79-37D633B846F1}">
-                <asvg:svgBlip xmlns:asvg="http://schemas.microsoft.com/office/drawing/2016/SVG/main" xmlns="" r:embed="rId12"/>
+                <asvg:svgBlip xmlns="" xmlns:asvg="http://schemas.microsoft.com/office/drawing/2016/SVG/main" r:embed="rId12"/>
               </a:ext>
             </a:extLst>
           </a:blip>
@@ -44028,7 +44892,7 @@
                 <a14:useLocalDpi xmlns:a14="http://schemas.microsoft.com/office/drawing/2010/main" val="0"/>
               </a:ext>
               <a:ext uri="{96DAC541-7B7A-43D3-8B79-37D633B846F1}">
-                <asvg:svgBlip xmlns:asvg="http://schemas.microsoft.com/office/drawing/2016/SVG/main" xmlns="" r:embed="rId14"/>
+                <asvg:svgBlip xmlns="" xmlns:asvg="http://schemas.microsoft.com/office/drawing/2016/SVG/main" r:embed="rId14"/>
               </a:ext>
             </a:extLst>
           </a:blip>
@@ -44067,7 +44931,7 @@
                 <a14:useLocalDpi xmlns:a14="http://schemas.microsoft.com/office/drawing/2010/main" val="0"/>
               </a:ext>
               <a:ext uri="{96DAC541-7B7A-43D3-8B79-37D633B846F1}">
-                <asvg:svgBlip xmlns:asvg="http://schemas.microsoft.com/office/drawing/2016/SVG/main" xmlns="" r:embed="rId8"/>
+                <asvg:svgBlip xmlns="" xmlns:asvg="http://schemas.microsoft.com/office/drawing/2016/SVG/main" r:embed="rId8"/>
               </a:ext>
             </a:extLst>
           </a:blip>
@@ -44106,7 +44970,7 @@
                 <a14:useLocalDpi xmlns:a14="http://schemas.microsoft.com/office/drawing/2010/main" val="0"/>
               </a:ext>
               <a:ext uri="{96DAC541-7B7A-43D3-8B79-37D633B846F1}">
-                <asvg:svgBlip xmlns:asvg="http://schemas.microsoft.com/office/drawing/2016/SVG/main" xmlns="" r:embed="rId14"/>
+                <asvg:svgBlip xmlns="" xmlns:asvg="http://schemas.microsoft.com/office/drawing/2016/SVG/main" r:embed="rId14"/>
               </a:ext>
             </a:extLst>
           </a:blip>
@@ -44145,7 +45009,7 @@
                 <a14:useLocalDpi xmlns:a14="http://schemas.microsoft.com/office/drawing/2010/main" val="0"/>
               </a:ext>
               <a:ext uri="{96DAC541-7B7A-43D3-8B79-37D633B846F1}">
-                <asvg:svgBlip xmlns:asvg="http://schemas.microsoft.com/office/drawing/2016/SVG/main" xmlns="" r:embed="rId10"/>
+                <asvg:svgBlip xmlns="" xmlns:asvg="http://schemas.microsoft.com/office/drawing/2016/SVG/main" r:embed="rId10"/>
               </a:ext>
             </a:extLst>
           </a:blip>
@@ -44184,7 +45048,7 @@
                 <a14:useLocalDpi xmlns:a14="http://schemas.microsoft.com/office/drawing/2010/main" val="0"/>
               </a:ext>
               <a:ext uri="{96DAC541-7B7A-43D3-8B79-37D633B846F1}">
-                <asvg:svgBlip xmlns:asvg="http://schemas.microsoft.com/office/drawing/2016/SVG/main" xmlns="" r:embed="rId14"/>
+                <asvg:svgBlip xmlns="" xmlns:asvg="http://schemas.microsoft.com/office/drawing/2016/SVG/main" r:embed="rId14"/>
               </a:ext>
             </a:extLst>
           </a:blip>
@@ -44223,7 +45087,7 @@
                 <a14:useLocalDpi xmlns:a14="http://schemas.microsoft.com/office/drawing/2010/main" val="0"/>
               </a:ext>
               <a:ext uri="{96DAC541-7B7A-43D3-8B79-37D633B846F1}">
-                <asvg:svgBlip xmlns:asvg="http://schemas.microsoft.com/office/drawing/2016/SVG/main" xmlns="" r:embed="rId12"/>
+                <asvg:svgBlip xmlns="" xmlns:asvg="http://schemas.microsoft.com/office/drawing/2016/SVG/main" r:embed="rId12"/>
               </a:ext>
             </a:extLst>
           </a:blip>
@@ -44262,7 +45126,7 @@
                 <a14:useLocalDpi xmlns:a14="http://schemas.microsoft.com/office/drawing/2010/main" val="0"/>
               </a:ext>
               <a:ext uri="{96DAC541-7B7A-43D3-8B79-37D633B846F1}">
-                <asvg:svgBlip xmlns:asvg="http://schemas.microsoft.com/office/drawing/2016/SVG/main" xmlns="" r:embed="rId14"/>
+                <asvg:svgBlip xmlns="" xmlns:asvg="http://schemas.microsoft.com/office/drawing/2016/SVG/main" r:embed="rId14"/>
               </a:ext>
             </a:extLst>
           </a:blip>
@@ -44301,7 +45165,7 @@
                 <a14:useLocalDpi xmlns:a14="http://schemas.microsoft.com/office/drawing/2010/main" val="0"/>
               </a:ext>
               <a:ext uri="{96DAC541-7B7A-43D3-8B79-37D633B846F1}">
-                <asvg:svgBlip xmlns:asvg="http://schemas.microsoft.com/office/drawing/2016/SVG/main" xmlns="" r:embed="rId6"/>
+                <asvg:svgBlip xmlns="" xmlns:asvg="http://schemas.microsoft.com/office/drawing/2016/SVG/main" r:embed="rId6"/>
               </a:ext>
             </a:extLst>
           </a:blip>
@@ -44340,7 +45204,7 @@
                 <a14:useLocalDpi xmlns:a14="http://schemas.microsoft.com/office/drawing/2010/main" val="0"/>
               </a:ext>
               <a:ext uri="{96DAC541-7B7A-43D3-8B79-37D633B846F1}">
-                <asvg:svgBlip xmlns:asvg="http://schemas.microsoft.com/office/drawing/2016/SVG/main" xmlns="" r:embed="rId14"/>
+                <asvg:svgBlip xmlns="" xmlns:asvg="http://schemas.microsoft.com/office/drawing/2016/SVG/main" r:embed="rId14"/>
               </a:ext>
             </a:extLst>
           </a:blip>
@@ -44379,7 +45243,7 @@
                 <a14:useLocalDpi xmlns:a14="http://schemas.microsoft.com/office/drawing/2010/main" val="0"/>
               </a:ext>
               <a:ext uri="{96DAC541-7B7A-43D3-8B79-37D633B846F1}">
-                <asvg:svgBlip xmlns:asvg="http://schemas.microsoft.com/office/drawing/2016/SVG/main" xmlns="" r:embed="rId4"/>
+                <asvg:svgBlip xmlns="" xmlns:asvg="http://schemas.microsoft.com/office/drawing/2016/SVG/main" r:embed="rId4"/>
               </a:ext>
             </a:extLst>
           </a:blip>
@@ -44586,7 +45450,7 @@
                 <a14:useLocalDpi xmlns:a14="http://schemas.microsoft.com/office/drawing/2010/main" val="0"/>
               </a:ext>
               <a:ext uri="{96DAC541-7B7A-43D3-8B79-37D633B846F1}">
-                <asvg:svgBlip xmlns:asvg="http://schemas.microsoft.com/office/drawing/2016/SVG/main" xmlns="" r:embed="rId14"/>
+                <asvg:svgBlip xmlns="" xmlns:asvg="http://schemas.microsoft.com/office/drawing/2016/SVG/main" r:embed="rId14"/>
               </a:ext>
             </a:extLst>
           </a:blip>
@@ -44761,7 +45625,7 @@
                 <a14:useLocalDpi xmlns:a14="http://schemas.microsoft.com/office/drawing/2010/main" val="0"/>
               </a:ext>
               <a:ext uri="{96DAC541-7B7A-43D3-8B79-37D633B846F1}">
-                <asvg:svgBlip xmlns:asvg="http://schemas.microsoft.com/office/drawing/2016/SVG/main" xmlns="" r:embed="rId4"/>
+                <asvg:svgBlip xmlns="" xmlns:asvg="http://schemas.microsoft.com/office/drawing/2016/SVG/main" r:embed="rId4"/>
               </a:ext>
             </a:extLst>
           </a:blip>
@@ -44800,7 +45664,7 @@
                 <a14:useLocalDpi xmlns:a14="http://schemas.microsoft.com/office/drawing/2010/main" val="0"/>
               </a:ext>
               <a:ext uri="{96DAC541-7B7A-43D3-8B79-37D633B846F1}">
-                <asvg:svgBlip xmlns:asvg="http://schemas.microsoft.com/office/drawing/2016/SVG/main" xmlns="" r:embed="rId6"/>
+                <asvg:svgBlip xmlns="" xmlns:asvg="http://schemas.microsoft.com/office/drawing/2016/SVG/main" r:embed="rId6"/>
               </a:ext>
             </a:extLst>
           </a:blip>
@@ -44839,7 +45703,7 @@
                 <a14:useLocalDpi xmlns:a14="http://schemas.microsoft.com/office/drawing/2010/main" val="0"/>
               </a:ext>
               <a:ext uri="{96DAC541-7B7A-43D3-8B79-37D633B846F1}">
-                <asvg:svgBlip xmlns:asvg="http://schemas.microsoft.com/office/drawing/2016/SVG/main" xmlns="" r:embed="rId8"/>
+                <asvg:svgBlip xmlns="" xmlns:asvg="http://schemas.microsoft.com/office/drawing/2016/SVG/main" r:embed="rId8"/>
               </a:ext>
             </a:extLst>
           </a:blip>
@@ -44878,7 +45742,7 @@
                 <a14:useLocalDpi xmlns:a14="http://schemas.microsoft.com/office/drawing/2010/main" val="0"/>
               </a:ext>
               <a:ext uri="{96DAC541-7B7A-43D3-8B79-37D633B846F1}">
-                <asvg:svgBlip xmlns:asvg="http://schemas.microsoft.com/office/drawing/2016/SVG/main" xmlns="" r:embed="rId10"/>
+                <asvg:svgBlip xmlns="" xmlns:asvg="http://schemas.microsoft.com/office/drawing/2016/SVG/main" r:embed="rId10"/>
               </a:ext>
             </a:extLst>
           </a:blip>
@@ -44917,7 +45781,7 @@
                 <a14:useLocalDpi xmlns:a14="http://schemas.microsoft.com/office/drawing/2010/main" val="0"/>
               </a:ext>
               <a:ext uri="{96DAC541-7B7A-43D3-8B79-37D633B846F1}">
-                <asvg:svgBlip xmlns:asvg="http://schemas.microsoft.com/office/drawing/2016/SVG/main" xmlns="" r:embed="rId12"/>
+                <asvg:svgBlip xmlns="" xmlns:asvg="http://schemas.microsoft.com/office/drawing/2016/SVG/main" r:embed="rId12"/>
               </a:ext>
             </a:extLst>
           </a:blip>
@@ -45118,7 +45982,7 @@
                 <a14:useLocalDpi xmlns:a14="http://schemas.microsoft.com/office/drawing/2010/main" val="0"/>
               </a:ext>
               <a:ext uri="{96DAC541-7B7A-43D3-8B79-37D633B846F1}">
-                <asvg:svgBlip xmlns:asvg="http://schemas.microsoft.com/office/drawing/2016/SVG/main" xmlns="" r:embed="rId14"/>
+                <asvg:svgBlip xmlns="" xmlns:asvg="http://schemas.microsoft.com/office/drawing/2016/SVG/main" r:embed="rId14"/>
               </a:ext>
             </a:extLst>
           </a:blip>
@@ -45157,7 +46021,7 @@
                 <a14:useLocalDpi xmlns:a14="http://schemas.microsoft.com/office/drawing/2010/main" val="0"/>
               </a:ext>
               <a:ext uri="{96DAC541-7B7A-43D3-8B79-37D633B846F1}">
-                <asvg:svgBlip xmlns:asvg="http://schemas.microsoft.com/office/drawing/2016/SVG/main" xmlns="" r:embed="rId8"/>
+                <asvg:svgBlip xmlns="" xmlns:asvg="http://schemas.microsoft.com/office/drawing/2016/SVG/main" r:embed="rId8"/>
               </a:ext>
             </a:extLst>
           </a:blip>
@@ -45196,7 +46060,7 @@
                 <a14:useLocalDpi xmlns:a14="http://schemas.microsoft.com/office/drawing/2010/main" val="0"/>
               </a:ext>
               <a:ext uri="{96DAC541-7B7A-43D3-8B79-37D633B846F1}">
-                <asvg:svgBlip xmlns:asvg="http://schemas.microsoft.com/office/drawing/2016/SVG/main" xmlns="" r:embed="rId14"/>
+                <asvg:svgBlip xmlns="" xmlns:asvg="http://schemas.microsoft.com/office/drawing/2016/SVG/main" r:embed="rId14"/>
               </a:ext>
             </a:extLst>
           </a:blip>
@@ -45235,7 +46099,7 @@
                 <a14:useLocalDpi xmlns:a14="http://schemas.microsoft.com/office/drawing/2010/main" val="0"/>
               </a:ext>
               <a:ext uri="{96DAC541-7B7A-43D3-8B79-37D633B846F1}">
-                <asvg:svgBlip xmlns:asvg="http://schemas.microsoft.com/office/drawing/2016/SVG/main" xmlns="" r:embed="rId10"/>
+                <asvg:svgBlip xmlns="" xmlns:asvg="http://schemas.microsoft.com/office/drawing/2016/SVG/main" r:embed="rId10"/>
               </a:ext>
             </a:extLst>
           </a:blip>
@@ -45274,7 +46138,7 @@
                 <a14:useLocalDpi xmlns:a14="http://schemas.microsoft.com/office/drawing/2010/main" val="0"/>
               </a:ext>
               <a:ext uri="{96DAC541-7B7A-43D3-8B79-37D633B846F1}">
-                <asvg:svgBlip xmlns:asvg="http://schemas.microsoft.com/office/drawing/2016/SVG/main" xmlns="" r:embed="rId14"/>
+                <asvg:svgBlip xmlns="" xmlns:asvg="http://schemas.microsoft.com/office/drawing/2016/SVG/main" r:embed="rId14"/>
               </a:ext>
             </a:extLst>
           </a:blip>
@@ -45313,7 +46177,7 @@
                 <a14:useLocalDpi xmlns:a14="http://schemas.microsoft.com/office/drawing/2010/main" val="0"/>
               </a:ext>
               <a:ext uri="{96DAC541-7B7A-43D3-8B79-37D633B846F1}">
-                <asvg:svgBlip xmlns:asvg="http://schemas.microsoft.com/office/drawing/2016/SVG/main" xmlns="" r:embed="rId12"/>
+                <asvg:svgBlip xmlns="" xmlns:asvg="http://schemas.microsoft.com/office/drawing/2016/SVG/main" r:embed="rId12"/>
               </a:ext>
             </a:extLst>
           </a:blip>
@@ -45352,7 +46216,7 @@
                 <a14:useLocalDpi xmlns:a14="http://schemas.microsoft.com/office/drawing/2010/main" val="0"/>
               </a:ext>
               <a:ext uri="{96DAC541-7B7A-43D3-8B79-37D633B846F1}">
-                <asvg:svgBlip xmlns:asvg="http://schemas.microsoft.com/office/drawing/2016/SVG/main" xmlns="" r:embed="rId14"/>
+                <asvg:svgBlip xmlns="" xmlns:asvg="http://schemas.microsoft.com/office/drawing/2016/SVG/main" r:embed="rId14"/>
               </a:ext>
             </a:extLst>
           </a:blip>
@@ -45391,7 +46255,7 @@
                 <a14:useLocalDpi xmlns:a14="http://schemas.microsoft.com/office/drawing/2010/main" val="0"/>
               </a:ext>
               <a:ext uri="{96DAC541-7B7A-43D3-8B79-37D633B846F1}">
-                <asvg:svgBlip xmlns:asvg="http://schemas.microsoft.com/office/drawing/2016/SVG/main" xmlns="" r:embed="rId6"/>
+                <asvg:svgBlip xmlns="" xmlns:asvg="http://schemas.microsoft.com/office/drawing/2016/SVG/main" r:embed="rId6"/>
               </a:ext>
             </a:extLst>
           </a:blip>
@@ -45430,7 +46294,7 @@
                 <a14:useLocalDpi xmlns:a14="http://schemas.microsoft.com/office/drawing/2010/main" val="0"/>
               </a:ext>
               <a:ext uri="{96DAC541-7B7A-43D3-8B79-37D633B846F1}">
-                <asvg:svgBlip xmlns:asvg="http://schemas.microsoft.com/office/drawing/2016/SVG/main" xmlns="" r:embed="rId14"/>
+                <asvg:svgBlip xmlns="" xmlns:asvg="http://schemas.microsoft.com/office/drawing/2016/SVG/main" r:embed="rId14"/>
               </a:ext>
             </a:extLst>
           </a:blip>
@@ -45469,7 +46333,7 @@
                 <a14:useLocalDpi xmlns:a14="http://schemas.microsoft.com/office/drawing/2010/main" val="0"/>
               </a:ext>
               <a:ext uri="{96DAC541-7B7A-43D3-8B79-37D633B846F1}">
-                <asvg:svgBlip xmlns:asvg="http://schemas.microsoft.com/office/drawing/2016/SVG/main" xmlns="" r:embed="rId4"/>
+                <asvg:svgBlip xmlns="" xmlns:asvg="http://schemas.microsoft.com/office/drawing/2016/SVG/main" r:embed="rId4"/>
               </a:ext>
             </a:extLst>
           </a:blip>

</xml_diff>